<commit_message>
daily commit 0403, add chapter4
</commit_message>
<xml_diff>
--- a/figures/演示文稿1.pptx
+++ b/figures/演示文稿1.pptx
@@ -10,6 +10,8 @@
     <p:sldId id="260" r:id="rId4"/>
     <p:sldId id="258" r:id="rId5"/>
     <p:sldId id="259" r:id="rId6"/>
+    <p:sldId id="261" r:id="rId7"/>
+    <p:sldId id="262" r:id="rId8"/>
   </p:sldIdLst>
   <p:sldSz cx="9144000" cy="6858000" type="screen4x3"/>
   <p:notesSz cx="6858000" cy="9144000"/>
@@ -247,7 +249,7 @@
           <a:p>
             <a:fld id="{850289C4-C9C2-47F7-B72C-4F7E3D61DF21}" type="datetimeFigureOut">
               <a:rPr lang="zh-CN" altLang="en-US" smtClean="0"/>
-              <a:t>2019/3/27</a:t>
+              <a:t>2019/4/3</a:t>
             </a:fld>
             <a:endParaRPr lang="zh-CN" altLang="en-US"/>
           </a:p>
@@ -417,7 +419,7 @@
           <a:p>
             <a:fld id="{850289C4-C9C2-47F7-B72C-4F7E3D61DF21}" type="datetimeFigureOut">
               <a:rPr lang="zh-CN" altLang="en-US" smtClean="0"/>
-              <a:t>2019/3/27</a:t>
+              <a:t>2019/4/3</a:t>
             </a:fld>
             <a:endParaRPr lang="zh-CN" altLang="en-US"/>
           </a:p>
@@ -597,7 +599,7 @@
           <a:p>
             <a:fld id="{850289C4-C9C2-47F7-B72C-4F7E3D61DF21}" type="datetimeFigureOut">
               <a:rPr lang="zh-CN" altLang="en-US" smtClean="0"/>
-              <a:t>2019/3/27</a:t>
+              <a:t>2019/4/3</a:t>
             </a:fld>
             <a:endParaRPr lang="zh-CN" altLang="en-US"/>
           </a:p>
@@ -767,7 +769,7 @@
           <a:p>
             <a:fld id="{850289C4-C9C2-47F7-B72C-4F7E3D61DF21}" type="datetimeFigureOut">
               <a:rPr lang="zh-CN" altLang="en-US" smtClean="0"/>
-              <a:t>2019/3/27</a:t>
+              <a:t>2019/4/3</a:t>
             </a:fld>
             <a:endParaRPr lang="zh-CN" altLang="en-US"/>
           </a:p>
@@ -1011,7 +1013,7 @@
           <a:p>
             <a:fld id="{850289C4-C9C2-47F7-B72C-4F7E3D61DF21}" type="datetimeFigureOut">
               <a:rPr lang="zh-CN" altLang="en-US" smtClean="0"/>
-              <a:t>2019/3/27</a:t>
+              <a:t>2019/4/3</a:t>
             </a:fld>
             <a:endParaRPr lang="zh-CN" altLang="en-US"/>
           </a:p>
@@ -1243,7 +1245,7 @@
           <a:p>
             <a:fld id="{850289C4-C9C2-47F7-B72C-4F7E3D61DF21}" type="datetimeFigureOut">
               <a:rPr lang="zh-CN" altLang="en-US" smtClean="0"/>
-              <a:t>2019/3/27</a:t>
+              <a:t>2019/4/3</a:t>
             </a:fld>
             <a:endParaRPr lang="zh-CN" altLang="en-US"/>
           </a:p>
@@ -1610,7 +1612,7 @@
           <a:p>
             <a:fld id="{850289C4-C9C2-47F7-B72C-4F7E3D61DF21}" type="datetimeFigureOut">
               <a:rPr lang="zh-CN" altLang="en-US" smtClean="0"/>
-              <a:t>2019/3/27</a:t>
+              <a:t>2019/4/3</a:t>
             </a:fld>
             <a:endParaRPr lang="zh-CN" altLang="en-US"/>
           </a:p>
@@ -1728,7 +1730,7 @@
           <a:p>
             <a:fld id="{850289C4-C9C2-47F7-B72C-4F7E3D61DF21}" type="datetimeFigureOut">
               <a:rPr lang="zh-CN" altLang="en-US" smtClean="0"/>
-              <a:t>2019/3/27</a:t>
+              <a:t>2019/4/3</a:t>
             </a:fld>
             <a:endParaRPr lang="zh-CN" altLang="en-US"/>
           </a:p>
@@ -1823,7 +1825,7 @@
           <a:p>
             <a:fld id="{850289C4-C9C2-47F7-B72C-4F7E3D61DF21}" type="datetimeFigureOut">
               <a:rPr lang="zh-CN" altLang="en-US" smtClean="0"/>
-              <a:t>2019/3/27</a:t>
+              <a:t>2019/4/3</a:t>
             </a:fld>
             <a:endParaRPr lang="zh-CN" altLang="en-US"/>
           </a:p>
@@ -2100,7 +2102,7 @@
           <a:p>
             <a:fld id="{850289C4-C9C2-47F7-B72C-4F7E3D61DF21}" type="datetimeFigureOut">
               <a:rPr lang="zh-CN" altLang="en-US" smtClean="0"/>
-              <a:t>2019/3/27</a:t>
+              <a:t>2019/4/3</a:t>
             </a:fld>
             <a:endParaRPr lang="zh-CN" altLang="en-US"/>
           </a:p>
@@ -2357,7 +2359,7 @@
           <a:p>
             <a:fld id="{850289C4-C9C2-47F7-B72C-4F7E3D61DF21}" type="datetimeFigureOut">
               <a:rPr lang="zh-CN" altLang="en-US" smtClean="0"/>
-              <a:t>2019/3/27</a:t>
+              <a:t>2019/4/3</a:t>
             </a:fld>
             <a:endParaRPr lang="zh-CN" altLang="en-US"/>
           </a:p>
@@ -2570,7 +2572,7 @@
           <a:p>
             <a:fld id="{850289C4-C9C2-47F7-B72C-4F7E3D61DF21}" type="datetimeFigureOut">
               <a:rPr lang="zh-CN" altLang="en-US" smtClean="0"/>
-              <a:t>2019/3/27</a:t>
+              <a:t>2019/4/3</a:t>
             </a:fld>
             <a:endParaRPr lang="zh-CN" altLang="en-US"/>
           </a:p>
@@ -9451,6 +9453,3278 @@
 </p:sld>
 </file>
 
+<file path=ppt/slides/slide6.xml><?xml version="1.0" encoding="utf-8"?>
+<p:sld xmlns:a="http://schemas.openxmlformats.org/drawingml/2006/main" xmlns:r="http://schemas.openxmlformats.org/officeDocument/2006/relationships" xmlns:p="http://schemas.openxmlformats.org/presentationml/2006/main">
+  <p:cSld>
+    <p:spTree>
+      <p:nvGrpSpPr>
+        <p:cNvPr id="1" name=""/>
+        <p:cNvGrpSpPr/>
+        <p:nvPr/>
+      </p:nvGrpSpPr>
+      <p:grpSpPr>
+        <a:xfrm>
+          <a:off x="0" y="0"/>
+          <a:ext cx="0" cy="0"/>
+          <a:chOff x="0" y="0"/>
+          <a:chExt cx="0" cy="0"/>
+        </a:xfrm>
+      </p:grpSpPr>
+      <p:grpSp>
+        <p:nvGrpSpPr>
+          <p:cNvPr id="99" name="组合 98"/>
+          <p:cNvGrpSpPr/>
+          <p:nvPr/>
+        </p:nvGrpSpPr>
+        <p:grpSpPr>
+          <a:xfrm>
+            <a:off x="453722" y="628560"/>
+            <a:ext cx="7572624" cy="4601046"/>
+            <a:chOff x="369501" y="111202"/>
+            <a:chExt cx="7572624" cy="4601046"/>
+          </a:xfrm>
+        </p:grpSpPr>
+        <p:sp>
+          <p:nvSpPr>
+            <p:cNvPr id="2" name="矩形 1"/>
+            <p:cNvSpPr/>
+            <p:nvPr/>
+          </p:nvSpPr>
+          <p:spPr>
+            <a:xfrm>
+              <a:off x="521901" y="425602"/>
+              <a:ext cx="966651" cy="1698171"/>
+            </a:xfrm>
+            <a:prstGeom prst="rect">
+              <a:avLst/>
+            </a:prstGeom>
+            <a:noFill/>
+            <a:ln>
+              <a:solidFill>
+                <a:srgbClr val="FF0000"/>
+              </a:solidFill>
+            </a:ln>
+          </p:spPr>
+          <p:style>
+            <a:lnRef idx="2">
+              <a:schemeClr val="accent1">
+                <a:shade val="50000"/>
+              </a:schemeClr>
+            </a:lnRef>
+            <a:fillRef idx="1">
+              <a:schemeClr val="accent1"/>
+            </a:fillRef>
+            <a:effectRef idx="0">
+              <a:schemeClr val="accent1"/>
+            </a:effectRef>
+            <a:fontRef idx="minor">
+              <a:schemeClr val="lt1"/>
+            </a:fontRef>
+          </p:style>
+          <p:txBody>
+            <a:bodyPr rtlCol="0" anchor="ctr"/>
+            <a:lstStyle/>
+            <a:p>
+              <a:pPr algn="ctr"/>
+              <a:endParaRPr lang="zh-CN" altLang="en-US"/>
+            </a:p>
+          </p:txBody>
+        </p:sp>
+        <p:sp>
+          <p:nvSpPr>
+            <p:cNvPr id="3" name="矩形 2"/>
+            <p:cNvSpPr/>
+            <p:nvPr/>
+          </p:nvSpPr>
+          <p:spPr>
+            <a:xfrm>
+              <a:off x="674301" y="578002"/>
+              <a:ext cx="966651" cy="1698171"/>
+            </a:xfrm>
+            <a:prstGeom prst="rect">
+              <a:avLst/>
+            </a:prstGeom>
+            <a:solidFill>
+              <a:schemeClr val="bg1"/>
+            </a:solidFill>
+            <a:ln>
+              <a:solidFill>
+                <a:schemeClr val="accent1"/>
+              </a:solidFill>
+            </a:ln>
+          </p:spPr>
+          <p:style>
+            <a:lnRef idx="2">
+              <a:schemeClr val="accent1">
+                <a:shade val="50000"/>
+              </a:schemeClr>
+            </a:lnRef>
+            <a:fillRef idx="1">
+              <a:schemeClr val="accent1"/>
+            </a:fillRef>
+            <a:effectRef idx="0">
+              <a:schemeClr val="accent1"/>
+            </a:effectRef>
+            <a:fontRef idx="minor">
+              <a:schemeClr val="lt1"/>
+            </a:fontRef>
+          </p:style>
+          <p:txBody>
+            <a:bodyPr rtlCol="0" anchor="ctr"/>
+            <a:lstStyle/>
+            <a:p>
+              <a:pPr algn="ctr"/>
+              <a:endParaRPr lang="zh-CN" altLang="en-US"/>
+            </a:p>
+          </p:txBody>
+        </p:sp>
+        <p:sp>
+          <p:nvSpPr>
+            <p:cNvPr id="4" name="矩形 3"/>
+            <p:cNvSpPr/>
+            <p:nvPr/>
+          </p:nvSpPr>
+          <p:spPr>
+            <a:xfrm>
+              <a:off x="826701" y="730402"/>
+              <a:ext cx="966651" cy="1698171"/>
+            </a:xfrm>
+            <a:prstGeom prst="rect">
+              <a:avLst/>
+            </a:prstGeom>
+            <a:ln/>
+          </p:spPr>
+          <p:style>
+            <a:lnRef idx="2">
+              <a:schemeClr val="dk1"/>
+            </a:lnRef>
+            <a:fillRef idx="1">
+              <a:schemeClr val="lt1"/>
+            </a:fillRef>
+            <a:effectRef idx="0">
+              <a:schemeClr val="dk1"/>
+            </a:effectRef>
+            <a:fontRef idx="minor">
+              <a:schemeClr val="dk1"/>
+            </a:fontRef>
+          </p:style>
+          <p:txBody>
+            <a:bodyPr rtlCol="0" anchor="ctr"/>
+            <a:lstStyle/>
+            <a:p>
+              <a:pPr algn="ctr"/>
+              <a:endParaRPr lang="zh-CN" altLang="en-US"/>
+            </a:p>
+          </p:txBody>
+        </p:sp>
+        <p:sp>
+          <p:nvSpPr>
+            <p:cNvPr id="14" name="椭圆 13"/>
+            <p:cNvSpPr/>
+            <p:nvPr/>
+          </p:nvSpPr>
+          <p:spPr>
+            <a:xfrm>
+              <a:off x="2820515" y="1011809"/>
+              <a:ext cx="108000" cy="108000"/>
+            </a:xfrm>
+            <a:prstGeom prst="ellipse">
+              <a:avLst/>
+            </a:prstGeom>
+          </p:spPr>
+          <p:style>
+            <a:lnRef idx="2">
+              <a:schemeClr val="dk1"/>
+            </a:lnRef>
+            <a:fillRef idx="1">
+              <a:schemeClr val="lt1"/>
+            </a:fillRef>
+            <a:effectRef idx="0">
+              <a:schemeClr val="dk1"/>
+            </a:effectRef>
+            <a:fontRef idx="minor">
+              <a:schemeClr val="dk1"/>
+            </a:fontRef>
+          </p:style>
+          <p:txBody>
+            <a:bodyPr rtlCol="0" anchor="ctr"/>
+            <a:lstStyle/>
+            <a:p>
+              <a:pPr algn="ctr"/>
+              <a:endParaRPr lang="zh-CN" altLang="en-US"/>
+            </a:p>
+          </p:txBody>
+        </p:sp>
+        <p:sp>
+          <p:nvSpPr>
+            <p:cNvPr id="15" name="椭圆 14"/>
+            <p:cNvSpPr/>
+            <p:nvPr/>
+          </p:nvSpPr>
+          <p:spPr>
+            <a:xfrm>
+              <a:off x="2816769" y="1134136"/>
+              <a:ext cx="108000" cy="108000"/>
+            </a:xfrm>
+            <a:prstGeom prst="ellipse">
+              <a:avLst/>
+            </a:prstGeom>
+          </p:spPr>
+          <p:style>
+            <a:lnRef idx="2">
+              <a:schemeClr val="dk1"/>
+            </a:lnRef>
+            <a:fillRef idx="1">
+              <a:schemeClr val="lt1"/>
+            </a:fillRef>
+            <a:effectRef idx="0">
+              <a:schemeClr val="dk1"/>
+            </a:effectRef>
+            <a:fontRef idx="minor">
+              <a:schemeClr val="dk1"/>
+            </a:fontRef>
+          </p:style>
+          <p:txBody>
+            <a:bodyPr rtlCol="0" anchor="ctr"/>
+            <a:lstStyle/>
+            <a:p>
+              <a:pPr algn="ctr"/>
+              <a:endParaRPr lang="zh-CN" altLang="en-US"/>
+            </a:p>
+          </p:txBody>
+        </p:sp>
+        <p:sp>
+          <p:nvSpPr>
+            <p:cNvPr id="16" name="椭圆 15"/>
+            <p:cNvSpPr/>
+            <p:nvPr/>
+          </p:nvSpPr>
+          <p:spPr>
+            <a:xfrm>
+              <a:off x="2815727" y="1279447"/>
+              <a:ext cx="108000" cy="108000"/>
+            </a:xfrm>
+            <a:prstGeom prst="ellipse">
+              <a:avLst/>
+            </a:prstGeom>
+          </p:spPr>
+          <p:style>
+            <a:lnRef idx="2">
+              <a:schemeClr val="dk1"/>
+            </a:lnRef>
+            <a:fillRef idx="1">
+              <a:schemeClr val="lt1"/>
+            </a:fillRef>
+            <a:effectRef idx="0">
+              <a:schemeClr val="dk1"/>
+            </a:effectRef>
+            <a:fontRef idx="minor">
+              <a:schemeClr val="dk1"/>
+            </a:fontRef>
+          </p:style>
+          <p:txBody>
+            <a:bodyPr rtlCol="0" anchor="ctr"/>
+            <a:lstStyle/>
+            <a:p>
+              <a:pPr algn="ctr"/>
+              <a:endParaRPr lang="zh-CN" altLang="en-US"/>
+            </a:p>
+          </p:txBody>
+        </p:sp>
+        <p:sp>
+          <p:nvSpPr>
+            <p:cNvPr id="17" name="椭圆 16"/>
+            <p:cNvSpPr/>
+            <p:nvPr/>
+          </p:nvSpPr>
+          <p:spPr>
+            <a:xfrm>
+              <a:off x="2820886" y="1424758"/>
+              <a:ext cx="108000" cy="108000"/>
+            </a:xfrm>
+            <a:prstGeom prst="ellipse">
+              <a:avLst/>
+            </a:prstGeom>
+          </p:spPr>
+          <p:style>
+            <a:lnRef idx="2">
+              <a:schemeClr val="dk1"/>
+            </a:lnRef>
+            <a:fillRef idx="1">
+              <a:schemeClr val="lt1"/>
+            </a:fillRef>
+            <a:effectRef idx="0">
+              <a:schemeClr val="dk1"/>
+            </a:effectRef>
+            <a:fontRef idx="minor">
+              <a:schemeClr val="dk1"/>
+            </a:fontRef>
+          </p:style>
+          <p:txBody>
+            <a:bodyPr rtlCol="0" anchor="ctr"/>
+            <a:lstStyle/>
+            <a:p>
+              <a:pPr algn="ctr"/>
+              <a:endParaRPr lang="zh-CN" altLang="en-US"/>
+            </a:p>
+          </p:txBody>
+        </p:sp>
+        <p:sp>
+          <p:nvSpPr>
+            <p:cNvPr id="18" name="椭圆 17"/>
+            <p:cNvSpPr/>
+            <p:nvPr/>
+          </p:nvSpPr>
+          <p:spPr>
+            <a:xfrm>
+              <a:off x="2821716" y="1843958"/>
+              <a:ext cx="108000" cy="108000"/>
+            </a:xfrm>
+            <a:prstGeom prst="ellipse">
+              <a:avLst/>
+            </a:prstGeom>
+          </p:spPr>
+          <p:style>
+            <a:lnRef idx="2">
+              <a:schemeClr val="dk1"/>
+            </a:lnRef>
+            <a:fillRef idx="1">
+              <a:schemeClr val="lt1"/>
+            </a:fillRef>
+            <a:effectRef idx="0">
+              <a:schemeClr val="dk1"/>
+            </a:effectRef>
+            <a:fontRef idx="minor">
+              <a:schemeClr val="dk1"/>
+            </a:fontRef>
+          </p:style>
+          <p:txBody>
+            <a:bodyPr rtlCol="0" anchor="ctr"/>
+            <a:lstStyle/>
+            <a:p>
+              <a:pPr algn="ctr"/>
+              <a:endParaRPr lang="zh-CN" altLang="en-US"/>
+            </a:p>
+          </p:txBody>
+        </p:sp>
+        <p:sp>
+          <p:nvSpPr>
+            <p:cNvPr id="19" name="椭圆 18"/>
+            <p:cNvSpPr/>
+            <p:nvPr/>
+          </p:nvSpPr>
+          <p:spPr>
+            <a:xfrm>
+              <a:off x="2823717" y="1999191"/>
+              <a:ext cx="108000" cy="108000"/>
+            </a:xfrm>
+            <a:prstGeom prst="ellipse">
+              <a:avLst/>
+            </a:prstGeom>
+          </p:spPr>
+          <p:style>
+            <a:lnRef idx="2">
+              <a:schemeClr val="dk1"/>
+            </a:lnRef>
+            <a:fillRef idx="1">
+              <a:schemeClr val="lt1"/>
+            </a:fillRef>
+            <a:effectRef idx="0">
+              <a:schemeClr val="dk1"/>
+            </a:effectRef>
+            <a:fontRef idx="minor">
+              <a:schemeClr val="dk1"/>
+            </a:fontRef>
+          </p:style>
+          <p:txBody>
+            <a:bodyPr rtlCol="0" anchor="ctr"/>
+            <a:lstStyle/>
+            <a:p>
+              <a:pPr algn="ctr"/>
+              <a:endParaRPr lang="zh-CN" altLang="en-US"/>
+            </a:p>
+          </p:txBody>
+        </p:sp>
+        <p:sp>
+          <p:nvSpPr>
+            <p:cNvPr id="20" name="椭圆 19"/>
+            <p:cNvSpPr/>
+            <p:nvPr/>
+          </p:nvSpPr>
+          <p:spPr>
+            <a:xfrm>
+              <a:off x="2823717" y="2144701"/>
+              <a:ext cx="108000" cy="108000"/>
+            </a:xfrm>
+            <a:prstGeom prst="ellipse">
+              <a:avLst/>
+            </a:prstGeom>
+          </p:spPr>
+          <p:style>
+            <a:lnRef idx="2">
+              <a:schemeClr val="dk1"/>
+            </a:lnRef>
+            <a:fillRef idx="1">
+              <a:schemeClr val="lt1"/>
+            </a:fillRef>
+            <a:effectRef idx="0">
+              <a:schemeClr val="dk1"/>
+            </a:effectRef>
+            <a:fontRef idx="minor">
+              <a:schemeClr val="dk1"/>
+            </a:fontRef>
+          </p:style>
+          <p:txBody>
+            <a:bodyPr rtlCol="0" anchor="ctr"/>
+            <a:lstStyle/>
+            <a:p>
+              <a:pPr algn="ctr"/>
+              <a:endParaRPr lang="zh-CN" altLang="en-US"/>
+            </a:p>
+          </p:txBody>
+        </p:sp>
+        <p:sp>
+          <p:nvSpPr>
+            <p:cNvPr id="21" name="椭圆 20"/>
+            <p:cNvSpPr/>
+            <p:nvPr/>
+          </p:nvSpPr>
+          <p:spPr>
+            <a:xfrm>
+              <a:off x="2826305" y="2310391"/>
+              <a:ext cx="108000" cy="108000"/>
+            </a:xfrm>
+            <a:prstGeom prst="ellipse">
+              <a:avLst/>
+            </a:prstGeom>
+          </p:spPr>
+          <p:style>
+            <a:lnRef idx="2">
+              <a:schemeClr val="dk1"/>
+            </a:lnRef>
+            <a:fillRef idx="1">
+              <a:schemeClr val="lt1"/>
+            </a:fillRef>
+            <a:effectRef idx="0">
+              <a:schemeClr val="dk1"/>
+            </a:effectRef>
+            <a:fontRef idx="minor">
+              <a:schemeClr val="dk1"/>
+            </a:fontRef>
+          </p:style>
+          <p:txBody>
+            <a:bodyPr rtlCol="0" anchor="ctr"/>
+            <a:lstStyle/>
+            <a:p>
+              <a:pPr algn="ctr"/>
+              <a:endParaRPr lang="zh-CN" altLang="en-US"/>
+            </a:p>
+          </p:txBody>
+        </p:sp>
+        <p:sp>
+          <p:nvSpPr>
+            <p:cNvPr id="22" name="矩形 21"/>
+            <p:cNvSpPr/>
+            <p:nvPr/>
+          </p:nvSpPr>
+          <p:spPr>
+            <a:xfrm>
+              <a:off x="2772434" y="966574"/>
+              <a:ext cx="216410" cy="1477701"/>
+            </a:xfrm>
+            <a:prstGeom prst="rect">
+              <a:avLst/>
+            </a:prstGeom>
+            <a:noFill/>
+          </p:spPr>
+          <p:style>
+            <a:lnRef idx="2">
+              <a:schemeClr val="dk1"/>
+            </a:lnRef>
+            <a:fillRef idx="1">
+              <a:schemeClr val="lt1"/>
+            </a:fillRef>
+            <a:effectRef idx="0">
+              <a:schemeClr val="dk1"/>
+            </a:effectRef>
+            <a:fontRef idx="minor">
+              <a:schemeClr val="dk1"/>
+            </a:fontRef>
+          </p:style>
+          <p:txBody>
+            <a:bodyPr rtlCol="0" anchor="ctr"/>
+            <a:lstStyle/>
+            <a:p>
+              <a:pPr algn="ctr"/>
+              <a:endParaRPr lang="zh-CN" altLang="en-US"/>
+            </a:p>
+          </p:txBody>
+        </p:sp>
+        <p:sp>
+          <p:nvSpPr>
+            <p:cNvPr id="23" name="文本框 22"/>
+            <p:cNvSpPr txBox="1"/>
+            <p:nvPr/>
+          </p:nvSpPr>
+          <p:spPr>
+            <a:xfrm>
+              <a:off x="2734869" y="1578871"/>
+              <a:ext cx="369332" cy="1463040"/>
+            </a:xfrm>
+            <a:prstGeom prst="rect">
+              <a:avLst/>
+            </a:prstGeom>
+            <a:noFill/>
+          </p:spPr>
+          <p:txBody>
+            <a:bodyPr vert="eaVert" wrap="square" rtlCol="0">
+              <a:spAutoFit/>
+            </a:bodyPr>
+            <a:lstStyle/>
+            <a:p>
+              <a:r>
+                <a:rPr lang="en-US" altLang="zh-CN" sz="1200" b="1" dirty="0" smtClean="0">
+                  <a:latin typeface="Times New Roman" panose="02020603050405020304" pitchFamily="18" charset="0"/>
+                  <a:cs typeface="Times New Roman" panose="02020603050405020304" pitchFamily="18" charset="0"/>
+                </a:rPr>
+                <a:t>…</a:t>
+              </a:r>
+              <a:endParaRPr lang="zh-CN" altLang="en-US" sz="1200" b="1" dirty="0">
+                <a:latin typeface="Times New Roman" panose="02020603050405020304" pitchFamily="18" charset="0"/>
+                <a:cs typeface="Times New Roman" panose="02020603050405020304" pitchFamily="18" charset="0"/>
+              </a:endParaRPr>
+            </a:p>
+          </p:txBody>
+        </p:sp>
+        <p:sp>
+          <p:nvSpPr>
+            <p:cNvPr id="24" name="矩形 23"/>
+            <p:cNvSpPr/>
+            <p:nvPr/>
+          </p:nvSpPr>
+          <p:spPr>
+            <a:xfrm>
+              <a:off x="915963" y="814360"/>
+              <a:ext cx="483325" cy="502897"/>
+            </a:xfrm>
+            <a:prstGeom prst="rect">
+              <a:avLst/>
+            </a:prstGeom>
+            <a:noFill/>
+            <a:ln w="19050">
+              <a:prstDash val="dash"/>
+            </a:ln>
+          </p:spPr>
+          <p:style>
+            <a:lnRef idx="2">
+              <a:schemeClr val="accent6"/>
+            </a:lnRef>
+            <a:fillRef idx="1">
+              <a:schemeClr val="lt1"/>
+            </a:fillRef>
+            <a:effectRef idx="0">
+              <a:schemeClr val="accent6"/>
+            </a:effectRef>
+            <a:fontRef idx="minor">
+              <a:schemeClr val="dk1"/>
+            </a:fontRef>
+          </p:style>
+          <p:txBody>
+            <a:bodyPr rtlCol="0" anchor="ctr"/>
+            <a:lstStyle/>
+            <a:p>
+              <a:pPr algn="ctr"/>
+              <a:endParaRPr lang="zh-CN" altLang="en-US"/>
+            </a:p>
+          </p:txBody>
+        </p:sp>
+        <p:cxnSp>
+          <p:nvCxnSpPr>
+            <p:cNvPr id="26" name="直接连接符 25"/>
+            <p:cNvCxnSpPr>
+              <a:stCxn id="24" idx="0"/>
+              <a:endCxn id="14" idx="0"/>
+            </p:cNvCxnSpPr>
+            <p:nvPr/>
+          </p:nvCxnSpPr>
+          <p:spPr>
+            <a:xfrm>
+              <a:off x="1157626" y="814360"/>
+              <a:ext cx="1716889" cy="197449"/>
+            </a:xfrm>
+            <a:prstGeom prst="line">
+              <a:avLst/>
+            </a:prstGeom>
+          </p:spPr>
+          <p:style>
+            <a:lnRef idx="1">
+              <a:schemeClr val="accent1"/>
+            </a:lnRef>
+            <a:fillRef idx="0">
+              <a:schemeClr val="accent1"/>
+            </a:fillRef>
+            <a:effectRef idx="0">
+              <a:schemeClr val="accent1"/>
+            </a:effectRef>
+            <a:fontRef idx="minor">
+              <a:schemeClr val="tx1"/>
+            </a:fontRef>
+          </p:style>
+        </p:cxnSp>
+        <p:cxnSp>
+          <p:nvCxnSpPr>
+            <p:cNvPr id="29" name="直接连接符 28"/>
+            <p:cNvCxnSpPr>
+              <a:stCxn id="24" idx="2"/>
+              <a:endCxn id="14" idx="5"/>
+            </p:cNvCxnSpPr>
+            <p:nvPr/>
+          </p:nvCxnSpPr>
+          <p:spPr>
+            <a:xfrm flipV="1">
+              <a:off x="1157626" y="1103993"/>
+              <a:ext cx="1755073" cy="213264"/>
+            </a:xfrm>
+            <a:prstGeom prst="line">
+              <a:avLst/>
+            </a:prstGeom>
+          </p:spPr>
+          <p:style>
+            <a:lnRef idx="1">
+              <a:schemeClr val="accent1"/>
+            </a:lnRef>
+            <a:fillRef idx="0">
+              <a:schemeClr val="accent1"/>
+            </a:fillRef>
+            <a:effectRef idx="0">
+              <a:schemeClr val="accent1"/>
+            </a:effectRef>
+            <a:fontRef idx="minor">
+              <a:schemeClr val="tx1"/>
+            </a:fontRef>
+          </p:style>
+        </p:cxnSp>
+        <p:sp>
+          <p:nvSpPr>
+            <p:cNvPr id="30" name="文本框 29"/>
+            <p:cNvSpPr txBox="1"/>
+            <p:nvPr/>
+          </p:nvSpPr>
+          <p:spPr>
+            <a:xfrm>
+              <a:off x="1845948" y="618579"/>
+              <a:ext cx="1147084" cy="276999"/>
+            </a:xfrm>
+            <a:prstGeom prst="rect">
+              <a:avLst/>
+            </a:prstGeom>
+            <a:noFill/>
+          </p:spPr>
+          <p:txBody>
+            <a:bodyPr wrap="square" rtlCol="0">
+              <a:spAutoFit/>
+            </a:bodyPr>
+            <a:lstStyle/>
+            <a:p>
+              <a:r>
+                <a:rPr lang="en-US" altLang="zh-CN" sz="1200" dirty="0" smtClean="0">
+                  <a:latin typeface="Times New Roman" panose="02020603050405020304" pitchFamily="18" charset="0"/>
+                  <a:ea typeface="宋体" panose="02010600030101010101" pitchFamily="2" charset="-122"/>
+                </a:rPr>
+                <a:t>3</a:t>
+              </a:r>
+              <a:r>
+                <a:rPr lang="zh-CN" altLang="en-US" sz="1200" dirty="0" smtClean="0">
+                  <a:latin typeface="微软雅黑" panose="020B0503020204020204" pitchFamily="34" charset="-122"/>
+                  <a:ea typeface="微软雅黑" panose="020B0503020204020204" pitchFamily="34" charset="-122"/>
+                </a:rPr>
+                <a:t>层卷积</a:t>
+              </a:r>
+              <a:endParaRPr lang="zh-CN" altLang="en-US" sz="1200" dirty="0">
+                <a:latin typeface="微软雅黑" panose="020B0503020204020204" pitchFamily="34" charset="-122"/>
+                <a:ea typeface="微软雅黑" panose="020B0503020204020204" pitchFamily="34" charset="-122"/>
+              </a:endParaRPr>
+            </a:p>
+          </p:txBody>
+        </p:sp>
+        <p:pic>
+          <p:nvPicPr>
+            <p:cNvPr id="35" name="图片 34"/>
+            <p:cNvPicPr>
+              <a:picLocks noChangeAspect="1"/>
+            </p:cNvPicPr>
+            <p:nvPr/>
+          </p:nvPicPr>
+          <p:blipFill>
+            <a:blip r:embed="rId3"/>
+            <a:stretch>
+              <a:fillRect/>
+            </a:stretch>
+          </p:blipFill>
+          <p:spPr>
+            <a:xfrm>
+              <a:off x="3147494" y="2070699"/>
+              <a:ext cx="159283" cy="1290859"/>
+            </a:xfrm>
+            <a:prstGeom prst="rect">
+              <a:avLst/>
+            </a:prstGeom>
+            <a:ln>
+              <a:solidFill>
+                <a:schemeClr val="bg1"/>
+              </a:solidFill>
+            </a:ln>
+          </p:spPr>
+        </p:pic>
+        <p:sp>
+          <p:nvSpPr>
+            <p:cNvPr id="36" name="文本框 35"/>
+            <p:cNvSpPr txBox="1"/>
+            <p:nvPr/>
+          </p:nvSpPr>
+          <p:spPr>
+            <a:xfrm>
+              <a:off x="3053218" y="2829087"/>
+              <a:ext cx="400110" cy="297711"/>
+            </a:xfrm>
+            <a:prstGeom prst="rect">
+              <a:avLst/>
+            </a:prstGeom>
+            <a:noFill/>
+          </p:spPr>
+          <p:txBody>
+            <a:bodyPr vert="eaVert" wrap="square" rtlCol="0">
+              <a:spAutoFit/>
+            </a:bodyPr>
+            <a:lstStyle/>
+            <a:p>
+              <a:r>
+                <a:rPr lang="en-US" altLang="zh-CN" sz="1400" b="1" dirty="0" smtClean="0">
+                  <a:latin typeface="Times New Roman" panose="02020603050405020304" pitchFamily="18" charset="0"/>
+                  <a:cs typeface="Times New Roman" panose="02020603050405020304" pitchFamily="18" charset="0"/>
+                </a:rPr>
+                <a:t>…</a:t>
+              </a:r>
+              <a:endParaRPr lang="zh-CN" altLang="en-US" sz="1400" b="1" dirty="0">
+                <a:latin typeface="Times New Roman" panose="02020603050405020304" pitchFamily="18" charset="0"/>
+                <a:cs typeface="Times New Roman" panose="02020603050405020304" pitchFamily="18" charset="0"/>
+              </a:endParaRPr>
+            </a:p>
+          </p:txBody>
+        </p:sp>
+        <p:sp>
+          <p:nvSpPr>
+            <p:cNvPr id="37" name="矩形 36"/>
+            <p:cNvSpPr/>
+            <p:nvPr/>
+          </p:nvSpPr>
+          <p:spPr>
+            <a:xfrm>
+              <a:off x="3104201" y="2066858"/>
+              <a:ext cx="216410" cy="1260000"/>
+            </a:xfrm>
+            <a:prstGeom prst="rect">
+              <a:avLst/>
+            </a:prstGeom>
+            <a:noFill/>
+          </p:spPr>
+          <p:style>
+            <a:lnRef idx="2">
+              <a:schemeClr val="dk1"/>
+            </a:lnRef>
+            <a:fillRef idx="1">
+              <a:schemeClr val="lt1"/>
+            </a:fillRef>
+            <a:effectRef idx="0">
+              <a:schemeClr val="dk1"/>
+            </a:effectRef>
+            <a:fontRef idx="minor">
+              <a:schemeClr val="dk1"/>
+            </a:fontRef>
+          </p:style>
+          <p:txBody>
+            <a:bodyPr rtlCol="0" anchor="ctr"/>
+            <a:lstStyle/>
+            <a:p>
+              <a:pPr algn="ctr"/>
+              <a:endParaRPr lang="zh-CN" altLang="en-US"/>
+            </a:p>
+          </p:txBody>
+        </p:sp>
+        <p:pic>
+          <p:nvPicPr>
+            <p:cNvPr id="39" name="图片 38"/>
+            <p:cNvPicPr>
+              <a:picLocks noChangeAspect="1"/>
+            </p:cNvPicPr>
+            <p:nvPr/>
+          </p:nvPicPr>
+          <p:blipFill>
+            <a:blip r:embed="rId4"/>
+            <a:stretch>
+              <a:fillRect/>
+            </a:stretch>
+          </p:blipFill>
+          <p:spPr>
+            <a:xfrm>
+              <a:off x="3484523" y="2988922"/>
+              <a:ext cx="159474" cy="1292400"/>
+            </a:xfrm>
+            <a:prstGeom prst="rect">
+              <a:avLst/>
+            </a:prstGeom>
+          </p:spPr>
+        </p:pic>
+        <p:sp>
+          <p:nvSpPr>
+            <p:cNvPr id="43" name="文本框 42"/>
+            <p:cNvSpPr txBox="1"/>
+            <p:nvPr/>
+          </p:nvSpPr>
+          <p:spPr>
+            <a:xfrm>
+              <a:off x="3376553" y="3741020"/>
+              <a:ext cx="400110" cy="297711"/>
+            </a:xfrm>
+            <a:prstGeom prst="rect">
+              <a:avLst/>
+            </a:prstGeom>
+            <a:noFill/>
+          </p:spPr>
+          <p:txBody>
+            <a:bodyPr vert="eaVert" wrap="square" rtlCol="0">
+              <a:spAutoFit/>
+            </a:bodyPr>
+            <a:lstStyle/>
+            <a:p>
+              <a:r>
+                <a:rPr lang="en-US" altLang="zh-CN" sz="1400" b="1" dirty="0" smtClean="0">
+                  <a:latin typeface="Times New Roman" panose="02020603050405020304" pitchFamily="18" charset="0"/>
+                  <a:cs typeface="Times New Roman" panose="02020603050405020304" pitchFamily="18" charset="0"/>
+                </a:rPr>
+                <a:t>…</a:t>
+              </a:r>
+              <a:endParaRPr lang="zh-CN" altLang="en-US" sz="1400" b="1" dirty="0">
+                <a:latin typeface="Times New Roman" panose="02020603050405020304" pitchFamily="18" charset="0"/>
+                <a:cs typeface="Times New Roman" panose="02020603050405020304" pitchFamily="18" charset="0"/>
+              </a:endParaRPr>
+            </a:p>
+          </p:txBody>
+        </p:sp>
+        <p:sp>
+          <p:nvSpPr>
+            <p:cNvPr id="44" name="矩形 43"/>
+            <p:cNvSpPr/>
+            <p:nvPr/>
+          </p:nvSpPr>
+          <p:spPr>
+            <a:xfrm>
+              <a:off x="3427536" y="2978791"/>
+              <a:ext cx="216410" cy="1260000"/>
+            </a:xfrm>
+            <a:prstGeom prst="rect">
+              <a:avLst/>
+            </a:prstGeom>
+            <a:noFill/>
+          </p:spPr>
+          <p:style>
+            <a:lnRef idx="2">
+              <a:schemeClr val="dk1"/>
+            </a:lnRef>
+            <a:fillRef idx="1">
+              <a:schemeClr val="lt1"/>
+            </a:fillRef>
+            <a:effectRef idx="0">
+              <a:schemeClr val="dk1"/>
+            </a:effectRef>
+            <a:fontRef idx="minor">
+              <a:schemeClr val="dk1"/>
+            </a:fontRef>
+          </p:style>
+          <p:txBody>
+            <a:bodyPr rtlCol="0" anchor="ctr"/>
+            <a:lstStyle/>
+            <a:p>
+              <a:pPr algn="ctr"/>
+              <a:endParaRPr lang="zh-CN" altLang="en-US"/>
+            </a:p>
+          </p:txBody>
+        </p:sp>
+        <p:sp>
+          <p:nvSpPr>
+            <p:cNvPr id="45" name="圆角矩形 44"/>
+            <p:cNvSpPr/>
+            <p:nvPr/>
+          </p:nvSpPr>
+          <p:spPr>
+            <a:xfrm>
+              <a:off x="4412503" y="1188136"/>
+              <a:ext cx="627321" cy="1030944"/>
+            </a:xfrm>
+            <a:prstGeom prst="roundRect">
+              <a:avLst/>
+            </a:prstGeom>
+          </p:spPr>
+          <p:style>
+            <a:lnRef idx="2">
+              <a:schemeClr val="dk1"/>
+            </a:lnRef>
+            <a:fillRef idx="1">
+              <a:schemeClr val="lt1"/>
+            </a:fillRef>
+            <a:effectRef idx="0">
+              <a:schemeClr val="dk1"/>
+            </a:effectRef>
+            <a:fontRef idx="minor">
+              <a:schemeClr val="dk1"/>
+            </a:fontRef>
+          </p:style>
+          <p:txBody>
+            <a:bodyPr rtlCol="0" anchor="ctr"/>
+            <a:lstStyle/>
+            <a:p>
+              <a:pPr algn="ctr"/>
+              <a:r>
+                <a:rPr lang="en-US" altLang="zh-CN" sz="1200" dirty="0" smtClean="0"/>
+                <a:t>Actor</a:t>
+              </a:r>
+            </a:p>
+            <a:p>
+              <a:pPr algn="ctr"/>
+              <a:r>
+                <a:rPr lang="en-US" altLang="zh-CN" sz="1200" dirty="0" smtClean="0"/>
+                <a:t>Net</a:t>
+              </a:r>
+              <a:endParaRPr lang="zh-CN" altLang="en-US" sz="1200" dirty="0"/>
+            </a:p>
+          </p:txBody>
+        </p:sp>
+        <p:sp>
+          <p:nvSpPr>
+            <p:cNvPr id="46" name="圆角矩形 45"/>
+            <p:cNvSpPr/>
+            <p:nvPr/>
+          </p:nvSpPr>
+          <p:spPr>
+            <a:xfrm>
+              <a:off x="4444394" y="2858083"/>
+              <a:ext cx="627321" cy="1030944"/>
+            </a:xfrm>
+            <a:prstGeom prst="roundRect">
+              <a:avLst/>
+            </a:prstGeom>
+          </p:spPr>
+          <p:style>
+            <a:lnRef idx="2">
+              <a:schemeClr val="dk1"/>
+            </a:lnRef>
+            <a:fillRef idx="1">
+              <a:schemeClr val="lt1"/>
+            </a:fillRef>
+            <a:effectRef idx="0">
+              <a:schemeClr val="dk1"/>
+            </a:effectRef>
+            <a:fontRef idx="minor">
+              <a:schemeClr val="dk1"/>
+            </a:fontRef>
+          </p:style>
+          <p:txBody>
+            <a:bodyPr rtlCol="0" anchor="ctr"/>
+            <a:lstStyle/>
+            <a:p>
+              <a:pPr algn="ctr"/>
+              <a:r>
+                <a:rPr lang="en-US" altLang="zh-CN" sz="1200" dirty="0" smtClean="0"/>
+                <a:t>Critic</a:t>
+              </a:r>
+            </a:p>
+            <a:p>
+              <a:pPr algn="ctr"/>
+              <a:r>
+                <a:rPr lang="en-US" altLang="zh-CN" sz="1200" dirty="0" smtClean="0"/>
+                <a:t>Net</a:t>
+              </a:r>
+              <a:endParaRPr lang="zh-CN" altLang="en-US" sz="1200" dirty="0"/>
+            </a:p>
+          </p:txBody>
+        </p:sp>
+        <p:pic>
+          <p:nvPicPr>
+            <p:cNvPr id="48" name="图片 47"/>
+            <p:cNvPicPr>
+              <a:picLocks noChangeAspect="1"/>
+            </p:cNvPicPr>
+            <p:nvPr/>
+          </p:nvPicPr>
+          <p:blipFill>
+            <a:blip r:embed="rId5"/>
+            <a:stretch>
+              <a:fillRect/>
+            </a:stretch>
+          </p:blipFill>
+          <p:spPr>
+            <a:xfrm>
+              <a:off x="2856157" y="2667087"/>
+              <a:ext cx="201438" cy="324000"/>
+            </a:xfrm>
+            <a:prstGeom prst="rect">
+              <a:avLst/>
+            </a:prstGeom>
+          </p:spPr>
+        </p:pic>
+        <p:pic>
+          <p:nvPicPr>
+            <p:cNvPr id="50" name="图片 49"/>
+            <p:cNvPicPr>
+              <a:picLocks noChangeAspect="1"/>
+            </p:cNvPicPr>
+            <p:nvPr/>
+          </p:nvPicPr>
+          <p:blipFill>
+            <a:blip r:embed="rId6"/>
+            <a:stretch>
+              <a:fillRect/>
+            </a:stretch>
+          </p:blipFill>
+          <p:spPr>
+            <a:xfrm>
+              <a:off x="3074216" y="3565027"/>
+              <a:ext cx="358113" cy="324000"/>
+            </a:xfrm>
+            <a:prstGeom prst="rect">
+              <a:avLst/>
+            </a:prstGeom>
+          </p:spPr>
+        </p:pic>
+        <p:pic>
+          <p:nvPicPr>
+            <p:cNvPr id="54" name="图片 53"/>
+            <p:cNvPicPr>
+              <a:picLocks noChangeAspect="1"/>
+            </p:cNvPicPr>
+            <p:nvPr/>
+          </p:nvPicPr>
+          <p:blipFill>
+            <a:blip r:embed="rId7"/>
+            <a:stretch>
+              <a:fillRect/>
+            </a:stretch>
+          </p:blipFill>
+          <p:spPr>
+            <a:xfrm>
+              <a:off x="369501" y="111202"/>
+              <a:ext cx="223821" cy="324000"/>
+            </a:xfrm>
+            <a:prstGeom prst="rect">
+              <a:avLst/>
+            </a:prstGeom>
+          </p:spPr>
+        </p:pic>
+        <p:pic>
+          <p:nvPicPr>
+            <p:cNvPr id="58" name="图片 57"/>
+            <p:cNvPicPr>
+              <a:picLocks noChangeAspect="1"/>
+            </p:cNvPicPr>
+            <p:nvPr/>
+          </p:nvPicPr>
+          <p:blipFill>
+            <a:blip r:embed="rId3"/>
+            <a:stretch>
+              <a:fillRect/>
+            </a:stretch>
+          </p:blipFill>
+          <p:spPr>
+            <a:xfrm>
+              <a:off x="5719089" y="1170469"/>
+              <a:ext cx="159283" cy="1290859"/>
+            </a:xfrm>
+            <a:prstGeom prst="rect">
+              <a:avLst/>
+            </a:prstGeom>
+            <a:ln>
+              <a:solidFill>
+                <a:schemeClr val="bg1"/>
+              </a:solidFill>
+            </a:ln>
+          </p:spPr>
+        </p:pic>
+        <p:sp>
+          <p:nvSpPr>
+            <p:cNvPr id="59" name="文本框 58"/>
+            <p:cNvSpPr txBox="1"/>
+            <p:nvPr/>
+          </p:nvSpPr>
+          <p:spPr>
+            <a:xfrm>
+              <a:off x="5624813" y="1928857"/>
+              <a:ext cx="400110" cy="297711"/>
+            </a:xfrm>
+            <a:prstGeom prst="rect">
+              <a:avLst/>
+            </a:prstGeom>
+            <a:noFill/>
+          </p:spPr>
+          <p:txBody>
+            <a:bodyPr vert="eaVert" wrap="square" rtlCol="0">
+              <a:spAutoFit/>
+            </a:bodyPr>
+            <a:lstStyle/>
+            <a:p>
+              <a:r>
+                <a:rPr lang="en-US" altLang="zh-CN" sz="1400" b="1" dirty="0" smtClean="0">
+                  <a:latin typeface="Times New Roman" panose="02020603050405020304" pitchFamily="18" charset="0"/>
+                  <a:cs typeface="Times New Roman" panose="02020603050405020304" pitchFamily="18" charset="0"/>
+                </a:rPr>
+                <a:t>…</a:t>
+              </a:r>
+              <a:endParaRPr lang="zh-CN" altLang="en-US" sz="1400" b="1" dirty="0">
+                <a:latin typeface="Times New Roman" panose="02020603050405020304" pitchFamily="18" charset="0"/>
+                <a:cs typeface="Times New Roman" panose="02020603050405020304" pitchFamily="18" charset="0"/>
+              </a:endParaRPr>
+            </a:p>
+          </p:txBody>
+        </p:sp>
+        <p:sp>
+          <p:nvSpPr>
+            <p:cNvPr id="60" name="矩形 59"/>
+            <p:cNvSpPr/>
+            <p:nvPr/>
+          </p:nvSpPr>
+          <p:spPr>
+            <a:xfrm>
+              <a:off x="5675796" y="1166628"/>
+              <a:ext cx="216410" cy="1260000"/>
+            </a:xfrm>
+            <a:prstGeom prst="rect">
+              <a:avLst/>
+            </a:prstGeom>
+            <a:noFill/>
+          </p:spPr>
+          <p:style>
+            <a:lnRef idx="2">
+              <a:schemeClr val="dk1"/>
+            </a:lnRef>
+            <a:fillRef idx="1">
+              <a:schemeClr val="lt1"/>
+            </a:fillRef>
+            <a:effectRef idx="0">
+              <a:schemeClr val="dk1"/>
+            </a:effectRef>
+            <a:fontRef idx="minor">
+              <a:schemeClr val="dk1"/>
+            </a:fontRef>
+          </p:style>
+          <p:txBody>
+            <a:bodyPr rtlCol="0" anchor="ctr"/>
+            <a:lstStyle/>
+            <a:p>
+              <a:pPr algn="ctr"/>
+              <a:endParaRPr lang="zh-CN" altLang="en-US"/>
+            </a:p>
+          </p:txBody>
+        </p:sp>
+        <p:pic>
+          <p:nvPicPr>
+            <p:cNvPr id="63" name="图片 62"/>
+            <p:cNvPicPr>
+              <a:picLocks noChangeAspect="1"/>
+            </p:cNvPicPr>
+            <p:nvPr/>
+          </p:nvPicPr>
+          <p:blipFill>
+            <a:blip r:embed="rId8"/>
+            <a:stretch>
+              <a:fillRect/>
+            </a:stretch>
+          </p:blipFill>
+          <p:spPr>
+            <a:xfrm>
+              <a:off x="654846" y="256907"/>
+              <a:ext cx="257394" cy="324000"/>
+            </a:xfrm>
+            <a:prstGeom prst="rect">
+              <a:avLst/>
+            </a:prstGeom>
+          </p:spPr>
+        </p:pic>
+        <p:pic>
+          <p:nvPicPr>
+            <p:cNvPr id="65" name="图片 64"/>
+            <p:cNvPicPr>
+              <a:picLocks noChangeAspect="1"/>
+            </p:cNvPicPr>
+            <p:nvPr/>
+          </p:nvPicPr>
+          <p:blipFill>
+            <a:blip r:embed="rId9"/>
+            <a:stretch>
+              <a:fillRect/>
+            </a:stretch>
+          </p:blipFill>
+          <p:spPr>
+            <a:xfrm>
+              <a:off x="931695" y="470862"/>
+              <a:ext cx="257394" cy="324000"/>
+            </a:xfrm>
+            <a:prstGeom prst="rect">
+              <a:avLst/>
+            </a:prstGeom>
+          </p:spPr>
+        </p:pic>
+        <p:cxnSp>
+          <p:nvCxnSpPr>
+            <p:cNvPr id="67" name="直接连接符 66"/>
+            <p:cNvCxnSpPr>
+              <a:stCxn id="22" idx="0"/>
+            </p:cNvCxnSpPr>
+            <p:nvPr/>
+          </p:nvCxnSpPr>
+          <p:spPr>
+            <a:xfrm>
+              <a:off x="2880639" y="966574"/>
+              <a:ext cx="1531864" cy="275562"/>
+            </a:xfrm>
+            <a:prstGeom prst="line">
+              <a:avLst/>
+            </a:prstGeom>
+          </p:spPr>
+          <p:style>
+            <a:lnRef idx="1">
+              <a:schemeClr val="accent1"/>
+            </a:lnRef>
+            <a:fillRef idx="0">
+              <a:schemeClr val="accent1"/>
+            </a:fillRef>
+            <a:effectRef idx="0">
+              <a:schemeClr val="accent1"/>
+            </a:effectRef>
+            <a:fontRef idx="minor">
+              <a:schemeClr val="tx1"/>
+            </a:fontRef>
+          </p:style>
+        </p:cxnSp>
+        <p:cxnSp>
+          <p:nvCxnSpPr>
+            <p:cNvPr id="69" name="直接连接符 68"/>
+            <p:cNvCxnSpPr>
+              <a:stCxn id="44" idx="2"/>
+            </p:cNvCxnSpPr>
+            <p:nvPr/>
+          </p:nvCxnSpPr>
+          <p:spPr>
+            <a:xfrm flipV="1">
+              <a:off x="3535741" y="2174772"/>
+              <a:ext cx="876762" cy="2064019"/>
+            </a:xfrm>
+            <a:prstGeom prst="line">
+              <a:avLst/>
+            </a:prstGeom>
+          </p:spPr>
+          <p:style>
+            <a:lnRef idx="1">
+              <a:schemeClr val="accent1"/>
+            </a:lnRef>
+            <a:fillRef idx="0">
+              <a:schemeClr val="accent1"/>
+            </a:fillRef>
+            <a:effectRef idx="0">
+              <a:schemeClr val="accent1"/>
+            </a:effectRef>
+            <a:fontRef idx="minor">
+              <a:schemeClr val="tx1"/>
+            </a:fontRef>
+          </p:style>
+        </p:cxnSp>
+        <p:cxnSp>
+          <p:nvCxnSpPr>
+            <p:cNvPr id="72" name="直接连接符 71"/>
+            <p:cNvCxnSpPr/>
+            <p:nvPr/>
+          </p:nvCxnSpPr>
+          <p:spPr>
+            <a:xfrm>
+              <a:off x="2912211" y="946554"/>
+              <a:ext cx="1532183" cy="1911529"/>
+            </a:xfrm>
+            <a:prstGeom prst="line">
+              <a:avLst/>
+            </a:prstGeom>
+          </p:spPr>
+          <p:style>
+            <a:lnRef idx="1">
+              <a:schemeClr val="accent1"/>
+            </a:lnRef>
+            <a:fillRef idx="0">
+              <a:schemeClr val="accent1"/>
+            </a:fillRef>
+            <a:effectRef idx="0">
+              <a:schemeClr val="accent1"/>
+            </a:effectRef>
+            <a:fontRef idx="minor">
+              <a:schemeClr val="tx1"/>
+            </a:fontRef>
+          </p:style>
+        </p:cxnSp>
+        <p:cxnSp>
+          <p:nvCxnSpPr>
+            <p:cNvPr id="74" name="直接连接符 73"/>
+            <p:cNvCxnSpPr>
+              <a:stCxn id="44" idx="2"/>
+            </p:cNvCxnSpPr>
+            <p:nvPr/>
+          </p:nvCxnSpPr>
+          <p:spPr>
+            <a:xfrm flipV="1">
+              <a:off x="3535741" y="3814847"/>
+              <a:ext cx="908653" cy="423944"/>
+            </a:xfrm>
+            <a:prstGeom prst="line">
+              <a:avLst/>
+            </a:prstGeom>
+          </p:spPr>
+          <p:style>
+            <a:lnRef idx="1">
+              <a:schemeClr val="accent1"/>
+            </a:lnRef>
+            <a:fillRef idx="0">
+              <a:schemeClr val="accent1"/>
+            </a:fillRef>
+            <a:effectRef idx="0">
+              <a:schemeClr val="accent1"/>
+            </a:effectRef>
+            <a:fontRef idx="minor">
+              <a:schemeClr val="tx1"/>
+            </a:fontRef>
+          </p:style>
+        </p:cxnSp>
+        <p:sp>
+          <p:nvSpPr>
+            <p:cNvPr id="79" name="右箭头 78"/>
+            <p:cNvSpPr/>
+            <p:nvPr/>
+          </p:nvSpPr>
+          <p:spPr>
+            <a:xfrm>
+              <a:off x="5221705" y="1532758"/>
+              <a:ext cx="216569" cy="263870"/>
+            </a:xfrm>
+            <a:prstGeom prst="rightArrow">
+              <a:avLst/>
+            </a:prstGeom>
+          </p:spPr>
+          <p:style>
+            <a:lnRef idx="2">
+              <a:schemeClr val="dk1"/>
+            </a:lnRef>
+            <a:fillRef idx="1">
+              <a:schemeClr val="lt1"/>
+            </a:fillRef>
+            <a:effectRef idx="0">
+              <a:schemeClr val="dk1"/>
+            </a:effectRef>
+            <a:fontRef idx="minor">
+              <a:schemeClr val="dk1"/>
+            </a:fontRef>
+          </p:style>
+          <p:txBody>
+            <a:bodyPr rtlCol="0" anchor="ctr"/>
+            <a:lstStyle/>
+            <a:p>
+              <a:pPr algn="ctr"/>
+              <a:endParaRPr lang="zh-CN" altLang="en-US"/>
+            </a:p>
+          </p:txBody>
+        </p:sp>
+        <p:pic>
+          <p:nvPicPr>
+            <p:cNvPr id="81" name="图片 80"/>
+            <p:cNvPicPr>
+              <a:picLocks noChangeAspect="1"/>
+            </p:cNvPicPr>
+            <p:nvPr/>
+          </p:nvPicPr>
+          <p:blipFill>
+            <a:blip r:embed="rId10"/>
+            <a:stretch>
+              <a:fillRect/>
+            </a:stretch>
+          </p:blipFill>
+          <p:spPr>
+            <a:xfrm>
+              <a:off x="5329989" y="1928701"/>
+              <a:ext cx="324540" cy="324000"/>
+            </a:xfrm>
+            <a:prstGeom prst="rect">
+              <a:avLst/>
+            </a:prstGeom>
+          </p:spPr>
+        </p:pic>
+        <p:sp>
+          <p:nvSpPr>
+            <p:cNvPr id="82" name="右箭头 81"/>
+            <p:cNvSpPr/>
+            <p:nvPr/>
+          </p:nvSpPr>
+          <p:spPr>
+            <a:xfrm>
+              <a:off x="5224562" y="3194923"/>
+              <a:ext cx="216569" cy="263870"/>
+            </a:xfrm>
+            <a:prstGeom prst="rightArrow">
+              <a:avLst/>
+            </a:prstGeom>
+          </p:spPr>
+          <p:style>
+            <a:lnRef idx="2">
+              <a:schemeClr val="dk1"/>
+            </a:lnRef>
+            <a:fillRef idx="1">
+              <a:schemeClr val="lt1"/>
+            </a:fillRef>
+            <a:effectRef idx="0">
+              <a:schemeClr val="dk1"/>
+            </a:effectRef>
+            <a:fontRef idx="minor">
+              <a:schemeClr val="dk1"/>
+            </a:fontRef>
+          </p:style>
+          <p:txBody>
+            <a:bodyPr rtlCol="0" anchor="ctr"/>
+            <a:lstStyle/>
+            <a:p>
+              <a:pPr algn="ctr"/>
+              <a:endParaRPr lang="zh-CN" altLang="en-US"/>
+            </a:p>
+          </p:txBody>
+        </p:sp>
+        <p:sp>
+          <p:nvSpPr>
+            <p:cNvPr id="85" name="椭圆 84"/>
+            <p:cNvSpPr/>
+            <p:nvPr/>
+          </p:nvSpPr>
+          <p:spPr>
+            <a:xfrm>
+              <a:off x="7256325" y="1223174"/>
+              <a:ext cx="685800" cy="2006787"/>
+            </a:xfrm>
+            <a:prstGeom prst="ellipse">
+              <a:avLst/>
+            </a:prstGeom>
+          </p:spPr>
+          <p:style>
+            <a:lnRef idx="2">
+              <a:schemeClr val="accent2"/>
+            </a:lnRef>
+            <a:fillRef idx="1">
+              <a:schemeClr val="lt1"/>
+            </a:fillRef>
+            <a:effectRef idx="0">
+              <a:schemeClr val="accent2"/>
+            </a:effectRef>
+            <a:fontRef idx="minor">
+              <a:schemeClr val="dk1"/>
+            </a:fontRef>
+          </p:style>
+          <p:txBody>
+            <a:bodyPr rtlCol="0" anchor="ctr"/>
+            <a:lstStyle/>
+            <a:p>
+              <a:pPr algn="ctr"/>
+              <a:r>
+                <a:rPr lang="zh-CN" altLang="en-US" dirty="0" smtClean="0"/>
+                <a:t>实际电网</a:t>
+              </a:r>
+              <a:endParaRPr lang="zh-CN" altLang="en-US" dirty="0"/>
+            </a:p>
+          </p:txBody>
+        </p:sp>
+        <p:sp>
+          <p:nvSpPr>
+            <p:cNvPr id="86" name="任意多边形 85"/>
+            <p:cNvSpPr/>
+            <p:nvPr/>
+          </p:nvSpPr>
+          <p:spPr>
+            <a:xfrm>
+              <a:off x="5943189" y="1134136"/>
+              <a:ext cx="1420137" cy="290622"/>
+            </a:xfrm>
+            <a:custGeom>
+              <a:avLst/>
+              <a:gdLst>
+                <a:gd name="connsiteX0" fmla="*/ 0 w 1275347"/>
+                <a:gd name="connsiteY0" fmla="*/ 168471 h 168471"/>
+                <a:gd name="connsiteX1" fmla="*/ 553453 w 1275347"/>
+                <a:gd name="connsiteY1" fmla="*/ 29 h 168471"/>
+                <a:gd name="connsiteX2" fmla="*/ 1275347 w 1275347"/>
+                <a:gd name="connsiteY2" fmla="*/ 156439 h 168471"/>
+              </a:gdLst>
+              <a:ahLst/>
+              <a:cxnLst>
+                <a:cxn ang="0">
+                  <a:pos x="connsiteX0" y="connsiteY0"/>
+                </a:cxn>
+                <a:cxn ang="0">
+                  <a:pos x="connsiteX1" y="connsiteY1"/>
+                </a:cxn>
+                <a:cxn ang="0">
+                  <a:pos x="connsiteX2" y="connsiteY2"/>
+                </a:cxn>
+              </a:cxnLst>
+              <a:rect l="l" t="t" r="r" b="b"/>
+              <a:pathLst>
+                <a:path w="1275347" h="168471">
+                  <a:moveTo>
+                    <a:pt x="0" y="168471"/>
+                  </a:moveTo>
+                  <a:cubicBezTo>
+                    <a:pt x="170447" y="85252"/>
+                    <a:pt x="340895" y="2034"/>
+                    <a:pt x="553453" y="29"/>
+                  </a:cubicBezTo>
+                  <a:cubicBezTo>
+                    <a:pt x="766011" y="-1976"/>
+                    <a:pt x="1110916" y="100292"/>
+                    <a:pt x="1275347" y="156439"/>
+                  </a:cubicBezTo>
+                </a:path>
+              </a:pathLst>
+            </a:custGeom>
+            <a:ln>
+              <a:tailEnd type="stealth"/>
+            </a:ln>
+          </p:spPr>
+          <p:style>
+            <a:lnRef idx="1">
+              <a:schemeClr val="dk1"/>
+            </a:lnRef>
+            <a:fillRef idx="0">
+              <a:schemeClr val="dk1"/>
+            </a:fillRef>
+            <a:effectRef idx="0">
+              <a:schemeClr val="dk1"/>
+            </a:effectRef>
+            <a:fontRef idx="minor">
+              <a:schemeClr val="tx1"/>
+            </a:fontRef>
+          </p:style>
+          <p:txBody>
+            <a:bodyPr rtlCol="0" anchor="ctr"/>
+            <a:lstStyle/>
+            <a:p>
+              <a:pPr algn="ctr"/>
+              <a:endParaRPr lang="zh-CN" altLang="en-US"/>
+            </a:p>
+          </p:txBody>
+        </p:sp>
+        <p:pic>
+          <p:nvPicPr>
+            <p:cNvPr id="88" name="图片 87"/>
+            <p:cNvPicPr>
+              <a:picLocks noChangeAspect="1"/>
+            </p:cNvPicPr>
+            <p:nvPr/>
+          </p:nvPicPr>
+          <p:blipFill>
+            <a:blip r:embed="rId11"/>
+            <a:stretch>
+              <a:fillRect/>
+            </a:stretch>
+          </p:blipFill>
+          <p:spPr>
+            <a:xfrm>
+              <a:off x="6487544" y="832222"/>
+              <a:ext cx="223821" cy="324000"/>
+            </a:xfrm>
+            <a:prstGeom prst="rect">
+              <a:avLst/>
+            </a:prstGeom>
+          </p:spPr>
+        </p:pic>
+        <p:sp>
+          <p:nvSpPr>
+            <p:cNvPr id="89" name="矩形 88"/>
+            <p:cNvSpPr/>
+            <p:nvPr/>
+          </p:nvSpPr>
+          <p:spPr>
+            <a:xfrm>
+              <a:off x="369501" y="111202"/>
+              <a:ext cx="3528731" cy="4496893"/>
+            </a:xfrm>
+            <a:prstGeom prst="rect">
+              <a:avLst/>
+            </a:prstGeom>
+            <a:noFill/>
+            <a:ln>
+              <a:solidFill>
+                <a:srgbClr val="7030A0"/>
+              </a:solidFill>
+              <a:prstDash val="lgDashDot"/>
+            </a:ln>
+          </p:spPr>
+          <p:style>
+            <a:lnRef idx="2">
+              <a:schemeClr val="accent1">
+                <a:shade val="50000"/>
+              </a:schemeClr>
+            </a:lnRef>
+            <a:fillRef idx="1">
+              <a:schemeClr val="accent1"/>
+            </a:fillRef>
+            <a:effectRef idx="0">
+              <a:schemeClr val="accent1"/>
+            </a:effectRef>
+            <a:fontRef idx="minor">
+              <a:schemeClr val="lt1"/>
+            </a:fontRef>
+          </p:style>
+          <p:txBody>
+            <a:bodyPr rtlCol="0" anchor="ctr"/>
+            <a:lstStyle/>
+            <a:p>
+              <a:pPr algn="ctr"/>
+              <a:endParaRPr lang="zh-CN" altLang="en-US"/>
+            </a:p>
+          </p:txBody>
+        </p:sp>
+        <p:graphicFrame>
+          <p:nvGraphicFramePr>
+            <p:cNvPr id="91" name="对象 90"/>
+            <p:cNvGraphicFramePr>
+              <a:graphicFrameLocks noChangeAspect="1"/>
+            </p:cNvGraphicFramePr>
+            <p:nvPr>
+              <p:extLst>
+                <p:ext uri="{D42A27DB-BD31-4B8C-83A1-F6EECF244321}">
+                  <p14:modId xmlns:p14="http://schemas.microsoft.com/office/powerpoint/2010/main" val="2884099419"/>
+                </p:ext>
+              </p:extLst>
+            </p:nvPr>
+          </p:nvGraphicFramePr>
+          <p:xfrm>
+            <a:off x="5564730" y="3201873"/>
+            <a:ext cx="468000" cy="324000"/>
+          </p:xfrm>
+          <a:graphic>
+            <a:graphicData uri="http://schemas.openxmlformats.org/presentationml/2006/ole">
+              <mc:AlternateContent xmlns:mc="http://schemas.openxmlformats.org/markup-compatibility/2006">
+                <mc:Choice xmlns:v="urn:schemas-microsoft-com:vml" Requires="v">
+                  <p:oleObj spid="_x0000_s1047" name="Equation" r:id="rId12" imgW="330120" imgH="228600" progId="Equation.DSMT4">
+                    <p:embed/>
+                  </p:oleObj>
+                </mc:Choice>
+                <mc:Fallback>
+                  <p:oleObj name="Equation" r:id="rId12" imgW="330120" imgH="228600" progId="Equation.DSMT4">
+                    <p:embed/>
+                    <p:pic>
+                      <p:nvPicPr>
+                        <p:cNvPr id="0" name=""/>
+                        <p:cNvPicPr/>
+                        <p:nvPr/>
+                      </p:nvPicPr>
+                      <p:blipFill>
+                        <a:blip r:embed="rId13"/>
+                        <a:stretch>
+                          <a:fillRect/>
+                        </a:stretch>
+                      </p:blipFill>
+                      <p:spPr>
+                        <a:xfrm>
+                          <a:off x="5564730" y="3201873"/>
+                          <a:ext cx="468000" cy="324000"/>
+                        </a:xfrm>
+                        <a:prstGeom prst="rect">
+                          <a:avLst/>
+                        </a:prstGeom>
+                      </p:spPr>
+                    </p:pic>
+                  </p:oleObj>
+                </mc:Fallback>
+              </mc:AlternateContent>
+            </a:graphicData>
+          </a:graphic>
+        </p:graphicFrame>
+        <p:graphicFrame>
+          <p:nvGraphicFramePr>
+            <p:cNvPr id="92" name="对象 91"/>
+            <p:cNvGraphicFramePr>
+              <a:graphicFrameLocks noChangeAspect="1"/>
+            </p:cNvGraphicFramePr>
+            <p:nvPr>
+              <p:extLst>
+                <p:ext uri="{D42A27DB-BD31-4B8C-83A1-F6EECF244321}">
+                  <p14:modId xmlns:p14="http://schemas.microsoft.com/office/powerpoint/2010/main" val="2503578021"/>
+                </p:ext>
+              </p:extLst>
+            </p:nvPr>
+          </p:nvGraphicFramePr>
+          <p:xfrm>
+            <a:off x="1090089" y="4076791"/>
+            <a:ext cx="264000" cy="432000"/>
+          </p:xfrm>
+          <a:graphic>
+            <a:graphicData uri="http://schemas.openxmlformats.org/presentationml/2006/ole">
+              <mc:AlternateContent xmlns:mc="http://schemas.openxmlformats.org/markup-compatibility/2006">
+                <mc:Choice xmlns:v="urn:schemas-microsoft-com:vml" Requires="v">
+                  <p:oleObj spid="_x0000_s1048" name="Equation" r:id="rId14" imgW="139680" imgH="228600" progId="Equation.DSMT4">
+                    <p:embed/>
+                  </p:oleObj>
+                </mc:Choice>
+                <mc:Fallback>
+                  <p:oleObj name="Equation" r:id="rId14" imgW="139680" imgH="228600" progId="Equation.DSMT4">
+                    <p:embed/>
+                    <p:pic>
+                      <p:nvPicPr>
+                        <p:cNvPr id="0" name=""/>
+                        <p:cNvPicPr/>
+                        <p:nvPr/>
+                      </p:nvPicPr>
+                      <p:blipFill>
+                        <a:blip r:embed="rId15"/>
+                        <a:stretch>
+                          <a:fillRect/>
+                        </a:stretch>
+                      </p:blipFill>
+                      <p:spPr>
+                        <a:xfrm>
+                          <a:off x="1090089" y="4076791"/>
+                          <a:ext cx="264000" cy="432000"/>
+                        </a:xfrm>
+                        <a:prstGeom prst="rect">
+                          <a:avLst/>
+                        </a:prstGeom>
+                        <a:ln>
+                          <a:solidFill>
+                            <a:schemeClr val="tx1"/>
+                          </a:solidFill>
+                        </a:ln>
+                      </p:spPr>
+                    </p:pic>
+                  </p:oleObj>
+                </mc:Fallback>
+              </mc:AlternateContent>
+            </a:graphicData>
+          </a:graphic>
+        </p:graphicFrame>
+        <p:sp>
+          <p:nvSpPr>
+            <p:cNvPr id="95" name="任意多边形 94"/>
+            <p:cNvSpPr/>
+            <p:nvPr/>
+          </p:nvSpPr>
+          <p:spPr>
+            <a:xfrm>
+              <a:off x="3934326" y="3380874"/>
+              <a:ext cx="3693695" cy="1331374"/>
+            </a:xfrm>
+            <a:custGeom>
+              <a:avLst/>
+              <a:gdLst>
+                <a:gd name="connsiteX0" fmla="*/ 3693695 w 3693695"/>
+                <a:gd name="connsiteY0" fmla="*/ 0 h 1331374"/>
+                <a:gd name="connsiteX1" fmla="*/ 2719137 w 3693695"/>
+                <a:gd name="connsiteY1" fmla="*/ 1263315 h 1331374"/>
+                <a:gd name="connsiteX2" fmla="*/ 0 w 3693695"/>
+                <a:gd name="connsiteY2" fmla="*/ 1179094 h 1331374"/>
+              </a:gdLst>
+              <a:ahLst/>
+              <a:cxnLst>
+                <a:cxn ang="0">
+                  <a:pos x="connsiteX0" y="connsiteY0"/>
+                </a:cxn>
+                <a:cxn ang="0">
+                  <a:pos x="connsiteX1" y="connsiteY1"/>
+                </a:cxn>
+                <a:cxn ang="0">
+                  <a:pos x="connsiteX2" y="connsiteY2"/>
+                </a:cxn>
+              </a:cxnLst>
+              <a:rect l="l" t="t" r="r" b="b"/>
+              <a:pathLst>
+                <a:path w="3693695" h="1331374">
+                  <a:moveTo>
+                    <a:pt x="3693695" y="0"/>
+                  </a:moveTo>
+                  <a:cubicBezTo>
+                    <a:pt x="3514224" y="533399"/>
+                    <a:pt x="3334753" y="1066799"/>
+                    <a:pt x="2719137" y="1263315"/>
+                  </a:cubicBezTo>
+                  <a:cubicBezTo>
+                    <a:pt x="2103521" y="1459831"/>
+                    <a:pt x="401053" y="1167062"/>
+                    <a:pt x="0" y="1179094"/>
+                  </a:cubicBezTo>
+                </a:path>
+              </a:pathLst>
+            </a:custGeom>
+            <a:ln>
+              <a:tailEnd type="stealth"/>
+            </a:ln>
+          </p:spPr>
+          <p:style>
+            <a:lnRef idx="1">
+              <a:schemeClr val="dk1"/>
+            </a:lnRef>
+            <a:fillRef idx="0">
+              <a:schemeClr val="dk1"/>
+            </a:fillRef>
+            <a:effectRef idx="0">
+              <a:schemeClr val="dk1"/>
+            </a:effectRef>
+            <a:fontRef idx="minor">
+              <a:schemeClr val="tx1"/>
+            </a:fontRef>
+          </p:style>
+          <p:txBody>
+            <a:bodyPr rtlCol="0" anchor="ctr"/>
+            <a:lstStyle/>
+            <a:p>
+              <a:pPr algn="ctr"/>
+              <a:endParaRPr lang="zh-CN" altLang="en-US"/>
+            </a:p>
+          </p:txBody>
+        </p:sp>
+        <p:sp>
+          <p:nvSpPr>
+            <p:cNvPr id="96" name="任意多边形 95"/>
+            <p:cNvSpPr/>
+            <p:nvPr/>
+          </p:nvSpPr>
+          <p:spPr>
+            <a:xfrm>
+              <a:off x="5859379" y="3717758"/>
+              <a:ext cx="1515979" cy="681936"/>
+            </a:xfrm>
+            <a:custGeom>
+              <a:avLst/>
+              <a:gdLst>
+                <a:gd name="connsiteX0" fmla="*/ 1515979 w 1515979"/>
+                <a:gd name="connsiteY0" fmla="*/ 312821 h 681936"/>
+                <a:gd name="connsiteX1" fmla="*/ 878305 w 1515979"/>
+                <a:gd name="connsiteY1" fmla="*/ 673768 h 681936"/>
+                <a:gd name="connsiteX2" fmla="*/ 0 w 1515979"/>
+                <a:gd name="connsiteY2" fmla="*/ 0 h 681936"/>
+              </a:gdLst>
+              <a:ahLst/>
+              <a:cxnLst>
+                <a:cxn ang="0">
+                  <a:pos x="connsiteX0" y="connsiteY0"/>
+                </a:cxn>
+                <a:cxn ang="0">
+                  <a:pos x="connsiteX1" y="connsiteY1"/>
+                </a:cxn>
+                <a:cxn ang="0">
+                  <a:pos x="connsiteX2" y="connsiteY2"/>
+                </a:cxn>
+              </a:cxnLst>
+              <a:rect l="l" t="t" r="r" b="b"/>
+              <a:pathLst>
+                <a:path w="1515979" h="681936">
+                  <a:moveTo>
+                    <a:pt x="1515979" y="312821"/>
+                  </a:moveTo>
+                  <a:cubicBezTo>
+                    <a:pt x="1323473" y="519363"/>
+                    <a:pt x="1130968" y="725905"/>
+                    <a:pt x="878305" y="673768"/>
+                  </a:cubicBezTo>
+                  <a:cubicBezTo>
+                    <a:pt x="625642" y="621631"/>
+                    <a:pt x="170447" y="70184"/>
+                    <a:pt x="0" y="0"/>
+                  </a:cubicBezTo>
+                </a:path>
+              </a:pathLst>
+            </a:custGeom>
+            <a:ln>
+              <a:tailEnd type="stealth"/>
+            </a:ln>
+          </p:spPr>
+          <p:style>
+            <a:lnRef idx="1">
+              <a:schemeClr val="dk1"/>
+            </a:lnRef>
+            <a:fillRef idx="0">
+              <a:schemeClr val="dk1"/>
+            </a:fillRef>
+            <a:effectRef idx="0">
+              <a:schemeClr val="dk1"/>
+            </a:effectRef>
+            <a:fontRef idx="minor">
+              <a:schemeClr val="tx1"/>
+            </a:fontRef>
+          </p:style>
+          <p:txBody>
+            <a:bodyPr rtlCol="0" anchor="ctr"/>
+            <a:lstStyle/>
+            <a:p>
+              <a:pPr algn="ctr"/>
+              <a:endParaRPr lang="zh-CN" altLang="en-US"/>
+            </a:p>
+          </p:txBody>
+        </p:sp>
+        <p:graphicFrame>
+          <p:nvGraphicFramePr>
+            <p:cNvPr id="97" name="对象 96"/>
+            <p:cNvGraphicFramePr>
+              <a:graphicFrameLocks noChangeAspect="1"/>
+            </p:cNvGraphicFramePr>
+            <p:nvPr>
+              <p:extLst>
+                <p:ext uri="{D42A27DB-BD31-4B8C-83A1-F6EECF244321}">
+                  <p14:modId xmlns:p14="http://schemas.microsoft.com/office/powerpoint/2010/main" val="3594902655"/>
+                </p:ext>
+              </p:extLst>
+            </p:nvPr>
+          </p:nvGraphicFramePr>
+          <p:xfrm>
+            <a:off x="4621417" y="4127686"/>
+            <a:ext cx="433387" cy="433388"/>
+          </p:xfrm>
+          <a:graphic>
+            <a:graphicData uri="http://schemas.openxmlformats.org/presentationml/2006/ole">
+              <mc:AlternateContent xmlns:mc="http://schemas.openxmlformats.org/markup-compatibility/2006">
+                <mc:Choice xmlns:v="urn:schemas-microsoft-com:vml" Requires="v">
+                  <p:oleObj spid="_x0000_s1049" name="Equation" r:id="rId16" imgW="228600" imgH="228600" progId="Equation.DSMT4">
+                    <p:embed/>
+                  </p:oleObj>
+                </mc:Choice>
+                <mc:Fallback>
+                  <p:oleObj name="Equation" r:id="rId16" imgW="228600" imgH="228600" progId="Equation.DSMT4">
+                    <p:embed/>
+                    <p:pic>
+                      <p:nvPicPr>
+                        <p:cNvPr id="92" name="对象 91"/>
+                        <p:cNvPicPr/>
+                        <p:nvPr/>
+                      </p:nvPicPr>
+                      <p:blipFill>
+                        <a:blip r:embed="rId17"/>
+                        <a:stretch>
+                          <a:fillRect/>
+                        </a:stretch>
+                      </p:blipFill>
+                      <p:spPr>
+                        <a:xfrm>
+                          <a:off x="4621417" y="4127686"/>
+                          <a:ext cx="433387" cy="433388"/>
+                        </a:xfrm>
+                        <a:prstGeom prst="rect">
+                          <a:avLst/>
+                        </a:prstGeom>
+                        <a:ln>
+                          <a:solidFill>
+                            <a:schemeClr val="tx1"/>
+                          </a:solidFill>
+                        </a:ln>
+                      </p:spPr>
+                    </p:pic>
+                  </p:oleObj>
+                </mc:Fallback>
+              </mc:AlternateContent>
+            </a:graphicData>
+          </a:graphic>
+        </p:graphicFrame>
+        <p:graphicFrame>
+          <p:nvGraphicFramePr>
+            <p:cNvPr id="98" name="对象 97"/>
+            <p:cNvGraphicFramePr>
+              <a:graphicFrameLocks noChangeAspect="1"/>
+            </p:cNvGraphicFramePr>
+            <p:nvPr>
+              <p:extLst>
+                <p:ext uri="{D42A27DB-BD31-4B8C-83A1-F6EECF244321}">
+                  <p14:modId xmlns:p14="http://schemas.microsoft.com/office/powerpoint/2010/main" val="713438309"/>
+                </p:ext>
+              </p:extLst>
+            </p:nvPr>
+          </p:nvGraphicFramePr>
+          <p:xfrm>
+            <a:off x="6266196" y="3537870"/>
+            <a:ext cx="179341" cy="360000"/>
+          </p:xfrm>
+          <a:graphic>
+            <a:graphicData uri="http://schemas.openxmlformats.org/presentationml/2006/ole">
+              <mc:AlternateContent xmlns:mc="http://schemas.openxmlformats.org/markup-compatibility/2006">
+                <mc:Choice xmlns:v="urn:schemas-microsoft-com:vml" Requires="v">
+                  <p:oleObj spid="_x0000_s1050" name="Equation" r:id="rId18" imgW="114120" imgH="228600" progId="Equation.DSMT4">
+                    <p:embed/>
+                  </p:oleObj>
+                </mc:Choice>
+                <mc:Fallback>
+                  <p:oleObj name="Equation" r:id="rId18" imgW="114120" imgH="228600" progId="Equation.DSMT4">
+                    <p:embed/>
+                    <p:pic>
+                      <p:nvPicPr>
+                        <p:cNvPr id="97" name="对象 96"/>
+                        <p:cNvPicPr/>
+                        <p:nvPr/>
+                      </p:nvPicPr>
+                      <p:blipFill>
+                        <a:blip r:embed="rId19"/>
+                        <a:stretch>
+                          <a:fillRect/>
+                        </a:stretch>
+                      </p:blipFill>
+                      <p:spPr>
+                        <a:xfrm>
+                          <a:off x="6266196" y="3537870"/>
+                          <a:ext cx="179341" cy="360000"/>
+                        </a:xfrm>
+                        <a:prstGeom prst="rect">
+                          <a:avLst/>
+                        </a:prstGeom>
+                        <a:ln>
+                          <a:noFill/>
+                        </a:ln>
+                      </p:spPr>
+                    </p:pic>
+                  </p:oleObj>
+                </mc:Fallback>
+              </mc:AlternateContent>
+            </a:graphicData>
+          </a:graphic>
+        </p:graphicFrame>
+      </p:grpSp>
+    </p:spTree>
+    <p:extLst>
+      <p:ext uri="{BB962C8B-B14F-4D97-AF65-F5344CB8AC3E}">
+        <p14:creationId xmlns:p14="http://schemas.microsoft.com/office/powerpoint/2010/main" val="2967408869"/>
+      </p:ext>
+    </p:extLst>
+  </p:cSld>
+  <p:clrMapOvr>
+    <a:masterClrMapping/>
+  </p:clrMapOvr>
+</p:sld>
+</file>
+
+<file path=ppt/slides/slide7.xml><?xml version="1.0" encoding="utf-8"?>
+<p:sld xmlns:a="http://schemas.openxmlformats.org/drawingml/2006/main" xmlns:r="http://schemas.openxmlformats.org/officeDocument/2006/relationships" xmlns:p="http://schemas.openxmlformats.org/presentationml/2006/main">
+  <p:cSld>
+    <p:spTree>
+      <p:nvGrpSpPr>
+        <p:cNvPr id="1" name=""/>
+        <p:cNvGrpSpPr/>
+        <p:nvPr/>
+      </p:nvGrpSpPr>
+      <p:grpSpPr>
+        <a:xfrm>
+          <a:off x="0" y="0"/>
+          <a:ext cx="0" cy="0"/>
+          <a:chOff x="0" y="0"/>
+          <a:chExt cx="0" cy="0"/>
+        </a:xfrm>
+      </p:grpSpPr>
+      <p:grpSp>
+        <p:nvGrpSpPr>
+          <p:cNvPr id="3" name="组合 2"/>
+          <p:cNvGrpSpPr/>
+          <p:nvPr/>
+        </p:nvGrpSpPr>
+        <p:grpSpPr>
+          <a:xfrm>
+            <a:off x="1335882" y="803526"/>
+            <a:ext cx="4225131" cy="4226407"/>
+            <a:chOff x="1335882" y="803526"/>
+            <a:chExt cx="4225131" cy="4226407"/>
+          </a:xfrm>
+        </p:grpSpPr>
+        <p:sp>
+          <p:nvSpPr>
+            <p:cNvPr id="5" name="椭圆 4"/>
+            <p:cNvSpPr/>
+            <p:nvPr/>
+          </p:nvSpPr>
+          <p:spPr>
+            <a:xfrm>
+              <a:off x="1643172" y="1299411"/>
+              <a:ext cx="974558" cy="1888957"/>
+            </a:xfrm>
+            <a:prstGeom prst="ellipse">
+              <a:avLst/>
+            </a:prstGeom>
+            <a:solidFill>
+              <a:schemeClr val="bg1"/>
+            </a:solidFill>
+          </p:spPr>
+          <p:style>
+            <a:lnRef idx="2">
+              <a:schemeClr val="accent1">
+                <a:shade val="50000"/>
+              </a:schemeClr>
+            </a:lnRef>
+            <a:fillRef idx="1">
+              <a:schemeClr val="accent1"/>
+            </a:fillRef>
+            <a:effectRef idx="0">
+              <a:schemeClr val="accent1"/>
+            </a:effectRef>
+            <a:fontRef idx="minor">
+              <a:schemeClr val="lt1"/>
+            </a:fontRef>
+          </p:style>
+          <p:txBody>
+            <a:bodyPr rtlCol="0" anchor="ctr"/>
+            <a:lstStyle/>
+            <a:p>
+              <a:pPr algn="ctr"/>
+              <a:r>
+                <a:rPr lang="zh-CN" altLang="en-US" dirty="0" smtClean="0">
+                  <a:solidFill>
+                    <a:schemeClr val="tx1"/>
+                  </a:solidFill>
+                </a:rPr>
+                <a:t>调度系统</a:t>
+              </a:r>
+              <a:endParaRPr lang="zh-CN" altLang="en-US" dirty="0">
+                <a:solidFill>
+                  <a:schemeClr val="tx1"/>
+                </a:solidFill>
+              </a:endParaRPr>
+            </a:p>
+          </p:txBody>
+        </p:sp>
+        <p:sp>
+          <p:nvSpPr>
+            <p:cNvPr id="55" name="椭圆 54"/>
+            <p:cNvSpPr/>
+            <p:nvPr/>
+          </p:nvSpPr>
+          <p:spPr>
+            <a:xfrm>
+              <a:off x="4213920" y="1299411"/>
+              <a:ext cx="974558" cy="1888957"/>
+            </a:xfrm>
+            <a:prstGeom prst="ellipse">
+              <a:avLst/>
+            </a:prstGeom>
+            <a:solidFill>
+              <a:schemeClr val="bg1"/>
+            </a:solidFill>
+            <a:ln>
+              <a:solidFill>
+                <a:srgbClr val="FF0000"/>
+              </a:solidFill>
+            </a:ln>
+          </p:spPr>
+          <p:style>
+            <a:lnRef idx="2">
+              <a:schemeClr val="accent1">
+                <a:shade val="50000"/>
+              </a:schemeClr>
+            </a:lnRef>
+            <a:fillRef idx="1">
+              <a:schemeClr val="accent1"/>
+            </a:fillRef>
+            <a:effectRef idx="0">
+              <a:schemeClr val="accent1"/>
+            </a:effectRef>
+            <a:fontRef idx="minor">
+              <a:schemeClr val="lt1"/>
+            </a:fontRef>
+          </p:style>
+          <p:txBody>
+            <a:bodyPr rtlCol="0" anchor="ctr"/>
+            <a:lstStyle/>
+            <a:p>
+              <a:pPr algn="ctr"/>
+              <a:r>
+                <a:rPr lang="zh-CN" altLang="en-US" dirty="0" smtClean="0">
+                  <a:solidFill>
+                    <a:schemeClr val="tx1"/>
+                  </a:solidFill>
+                </a:rPr>
+                <a:t>配</a:t>
+              </a:r>
+              <a:endParaRPr lang="en-US" altLang="zh-CN" dirty="0" smtClean="0">
+                <a:solidFill>
+                  <a:schemeClr val="tx1"/>
+                </a:solidFill>
+              </a:endParaRPr>
+            </a:p>
+            <a:p>
+              <a:pPr algn="ctr"/>
+              <a:r>
+                <a:rPr lang="zh-CN" altLang="en-US" dirty="0" smtClean="0">
+                  <a:solidFill>
+                    <a:schemeClr val="tx1"/>
+                  </a:solidFill>
+                </a:rPr>
+                <a:t>电</a:t>
+              </a:r>
+              <a:endParaRPr lang="en-US" altLang="zh-CN" dirty="0" smtClean="0">
+                <a:solidFill>
+                  <a:schemeClr val="tx1"/>
+                </a:solidFill>
+              </a:endParaRPr>
+            </a:p>
+            <a:p>
+              <a:pPr algn="ctr"/>
+              <a:r>
+                <a:rPr lang="zh-CN" altLang="en-US" dirty="0" smtClean="0">
+                  <a:solidFill>
+                    <a:schemeClr val="tx1"/>
+                  </a:solidFill>
+                </a:rPr>
+                <a:t>网</a:t>
+              </a:r>
+              <a:endParaRPr lang="zh-CN" altLang="en-US" dirty="0">
+                <a:solidFill>
+                  <a:schemeClr val="tx1"/>
+                </a:solidFill>
+              </a:endParaRPr>
+            </a:p>
+          </p:txBody>
+        </p:sp>
+        <p:sp>
+          <p:nvSpPr>
+            <p:cNvPr id="6" name="任意多边形 5"/>
+            <p:cNvSpPr/>
+            <p:nvPr/>
+          </p:nvSpPr>
+          <p:spPr>
+            <a:xfrm>
+              <a:off x="2557572" y="1287358"/>
+              <a:ext cx="1744579" cy="204558"/>
+            </a:xfrm>
+            <a:custGeom>
+              <a:avLst/>
+              <a:gdLst>
+                <a:gd name="connsiteX0" fmla="*/ 0 w 1744579"/>
+                <a:gd name="connsiteY0" fmla="*/ 204558 h 204558"/>
+                <a:gd name="connsiteX1" fmla="*/ 745958 w 1744579"/>
+                <a:gd name="connsiteY1" fmla="*/ 21 h 204558"/>
+                <a:gd name="connsiteX2" fmla="*/ 1744579 w 1744579"/>
+                <a:gd name="connsiteY2" fmla="*/ 192526 h 204558"/>
+              </a:gdLst>
+              <a:ahLst/>
+              <a:cxnLst>
+                <a:cxn ang="0">
+                  <a:pos x="connsiteX0" y="connsiteY0"/>
+                </a:cxn>
+                <a:cxn ang="0">
+                  <a:pos x="connsiteX1" y="connsiteY1"/>
+                </a:cxn>
+                <a:cxn ang="0">
+                  <a:pos x="connsiteX2" y="connsiteY2"/>
+                </a:cxn>
+              </a:cxnLst>
+              <a:rect l="l" t="t" r="r" b="b"/>
+              <a:pathLst>
+                <a:path w="1744579" h="204558">
+                  <a:moveTo>
+                    <a:pt x="0" y="204558"/>
+                  </a:moveTo>
+                  <a:cubicBezTo>
+                    <a:pt x="227597" y="103292"/>
+                    <a:pt x="455195" y="2026"/>
+                    <a:pt x="745958" y="21"/>
+                  </a:cubicBezTo>
+                  <a:cubicBezTo>
+                    <a:pt x="1036721" y="-1984"/>
+                    <a:pt x="1570121" y="136379"/>
+                    <a:pt x="1744579" y="192526"/>
+                  </a:cubicBezTo>
+                </a:path>
+              </a:pathLst>
+            </a:custGeom>
+            <a:ln>
+              <a:headEnd type="none" w="med" len="med"/>
+              <a:tailEnd type="arrow" w="med" len="med"/>
+            </a:ln>
+          </p:spPr>
+          <p:style>
+            <a:lnRef idx="1">
+              <a:schemeClr val="dk1"/>
+            </a:lnRef>
+            <a:fillRef idx="0">
+              <a:schemeClr val="dk1"/>
+            </a:fillRef>
+            <a:effectRef idx="0">
+              <a:schemeClr val="dk1"/>
+            </a:effectRef>
+            <a:fontRef idx="minor">
+              <a:schemeClr val="tx1"/>
+            </a:fontRef>
+          </p:style>
+          <p:txBody>
+            <a:bodyPr rtlCol="0" anchor="ctr"/>
+            <a:lstStyle/>
+            <a:p>
+              <a:pPr algn="ctr"/>
+              <a:endParaRPr lang="zh-CN" altLang="en-US"/>
+            </a:p>
+          </p:txBody>
+        </p:sp>
+        <p:sp>
+          <p:nvSpPr>
+            <p:cNvPr id="7" name="任意多边形 6"/>
+            <p:cNvSpPr/>
+            <p:nvPr/>
+          </p:nvSpPr>
+          <p:spPr>
+            <a:xfrm>
+              <a:off x="2557572" y="3019926"/>
+              <a:ext cx="1792705" cy="288960"/>
+            </a:xfrm>
+            <a:custGeom>
+              <a:avLst/>
+              <a:gdLst>
+                <a:gd name="connsiteX0" fmla="*/ 1792705 w 1792705"/>
+                <a:gd name="connsiteY0" fmla="*/ 36095 h 288960"/>
+                <a:gd name="connsiteX1" fmla="*/ 974558 w 1792705"/>
+                <a:gd name="connsiteY1" fmla="*/ 288758 h 288960"/>
+                <a:gd name="connsiteX2" fmla="*/ 0 w 1792705"/>
+                <a:gd name="connsiteY2" fmla="*/ 0 h 288960"/>
+              </a:gdLst>
+              <a:ahLst/>
+              <a:cxnLst>
+                <a:cxn ang="0">
+                  <a:pos x="connsiteX0" y="connsiteY0"/>
+                </a:cxn>
+                <a:cxn ang="0">
+                  <a:pos x="connsiteX1" y="connsiteY1"/>
+                </a:cxn>
+                <a:cxn ang="0">
+                  <a:pos x="connsiteX2" y="connsiteY2"/>
+                </a:cxn>
+              </a:cxnLst>
+              <a:rect l="l" t="t" r="r" b="b"/>
+              <a:pathLst>
+                <a:path w="1792705" h="288960">
+                  <a:moveTo>
+                    <a:pt x="1792705" y="36095"/>
+                  </a:moveTo>
+                  <a:cubicBezTo>
+                    <a:pt x="1533023" y="165434"/>
+                    <a:pt x="1273342" y="294774"/>
+                    <a:pt x="974558" y="288758"/>
+                  </a:cubicBezTo>
+                  <a:cubicBezTo>
+                    <a:pt x="675774" y="282742"/>
+                    <a:pt x="120316" y="78205"/>
+                    <a:pt x="0" y="0"/>
+                  </a:cubicBezTo>
+                </a:path>
+              </a:pathLst>
+            </a:custGeom>
+            <a:ln>
+              <a:headEnd type="none" w="med" len="med"/>
+              <a:tailEnd type="arrow" w="med" len="med"/>
+            </a:ln>
+          </p:spPr>
+          <p:style>
+            <a:lnRef idx="1">
+              <a:schemeClr val="dk1"/>
+            </a:lnRef>
+            <a:fillRef idx="0">
+              <a:schemeClr val="dk1"/>
+            </a:fillRef>
+            <a:effectRef idx="0">
+              <a:schemeClr val="dk1"/>
+            </a:effectRef>
+            <a:fontRef idx="minor">
+              <a:schemeClr val="tx1"/>
+            </a:fontRef>
+          </p:style>
+          <p:txBody>
+            <a:bodyPr rtlCol="0" anchor="ctr"/>
+            <a:lstStyle/>
+            <a:p>
+              <a:pPr algn="ctr"/>
+              <a:endParaRPr lang="zh-CN" altLang="en-US"/>
+            </a:p>
+          </p:txBody>
+        </p:sp>
+        <p:graphicFrame>
+          <p:nvGraphicFramePr>
+            <p:cNvPr id="8" name="对象 7"/>
+            <p:cNvGraphicFramePr>
+              <a:graphicFrameLocks noChangeAspect="1"/>
+            </p:cNvGraphicFramePr>
+            <p:nvPr>
+              <p:extLst>
+                <p:ext uri="{D42A27DB-BD31-4B8C-83A1-F6EECF244321}">
+                  <p14:modId xmlns:p14="http://schemas.microsoft.com/office/powerpoint/2010/main" val="3416199126"/>
+                </p:ext>
+              </p:extLst>
+            </p:nvPr>
+          </p:nvGraphicFramePr>
+          <p:xfrm>
+            <a:off x="2031451" y="2540418"/>
+            <a:ext cx="242000" cy="396000"/>
+          </p:xfrm>
+          <a:graphic>
+            <a:graphicData uri="http://schemas.openxmlformats.org/presentationml/2006/ole">
+              <mc:AlternateContent xmlns:mc="http://schemas.openxmlformats.org/markup-compatibility/2006">
+                <mc:Choice xmlns:v="urn:schemas-microsoft-com:vml" Requires="v">
+                  <p:oleObj spid="_x0000_s2089" name="Equation" r:id="rId3" imgW="139680" imgH="228600" progId="Equation.DSMT4">
+                    <p:embed/>
+                  </p:oleObj>
+                </mc:Choice>
+                <mc:Fallback>
+                  <p:oleObj name="Equation" r:id="rId3" imgW="139680" imgH="228600" progId="Equation.DSMT4">
+                    <p:embed/>
+                    <p:pic>
+                      <p:nvPicPr>
+                        <p:cNvPr id="0" name=""/>
+                        <p:cNvPicPr/>
+                        <p:nvPr/>
+                      </p:nvPicPr>
+                      <p:blipFill>
+                        <a:blip r:embed="rId4"/>
+                        <a:stretch>
+                          <a:fillRect/>
+                        </a:stretch>
+                      </p:blipFill>
+                      <p:spPr>
+                        <a:xfrm>
+                          <a:off x="2031451" y="2540418"/>
+                          <a:ext cx="242000" cy="396000"/>
+                        </a:xfrm>
+                        <a:prstGeom prst="rect">
+                          <a:avLst/>
+                        </a:prstGeom>
+                      </p:spPr>
+                    </p:pic>
+                  </p:oleObj>
+                </mc:Fallback>
+              </mc:AlternateContent>
+            </a:graphicData>
+          </a:graphic>
+        </p:graphicFrame>
+        <p:graphicFrame>
+          <p:nvGraphicFramePr>
+            <p:cNvPr id="61" name="对象 60"/>
+            <p:cNvGraphicFramePr>
+              <a:graphicFrameLocks noChangeAspect="1"/>
+            </p:cNvGraphicFramePr>
+            <p:nvPr>
+              <p:extLst>
+                <p:ext uri="{D42A27DB-BD31-4B8C-83A1-F6EECF244321}">
+                  <p14:modId xmlns:p14="http://schemas.microsoft.com/office/powerpoint/2010/main" val="1704886745"/>
+                </p:ext>
+              </p:extLst>
+            </p:nvPr>
+          </p:nvGraphicFramePr>
+          <p:xfrm>
+            <a:off x="3188811" y="803526"/>
+            <a:ext cx="265113" cy="396875"/>
+          </p:xfrm>
+          <a:graphic>
+            <a:graphicData uri="http://schemas.openxmlformats.org/presentationml/2006/ole">
+              <mc:AlternateContent xmlns:mc="http://schemas.openxmlformats.org/markup-compatibility/2006">
+                <mc:Choice xmlns:v="urn:schemas-microsoft-com:vml" Requires="v">
+                  <p:oleObj spid="_x0000_s2090" name="Equation" r:id="rId5" imgW="152280" imgH="228600" progId="Equation.DSMT4">
+                    <p:embed/>
+                  </p:oleObj>
+                </mc:Choice>
+                <mc:Fallback>
+                  <p:oleObj name="Equation" r:id="rId5" imgW="152280" imgH="228600" progId="Equation.DSMT4">
+                    <p:embed/>
+                    <p:pic>
+                      <p:nvPicPr>
+                        <p:cNvPr id="8" name="对象 7"/>
+                        <p:cNvPicPr/>
+                        <p:nvPr/>
+                      </p:nvPicPr>
+                      <p:blipFill>
+                        <a:blip r:embed="rId6"/>
+                        <a:stretch>
+                          <a:fillRect/>
+                        </a:stretch>
+                      </p:blipFill>
+                      <p:spPr>
+                        <a:xfrm>
+                          <a:off x="3188811" y="803526"/>
+                          <a:ext cx="265113" cy="396875"/>
+                        </a:xfrm>
+                        <a:prstGeom prst="rect">
+                          <a:avLst/>
+                        </a:prstGeom>
+                      </p:spPr>
+                    </p:pic>
+                  </p:oleObj>
+                </mc:Fallback>
+              </mc:AlternateContent>
+            </a:graphicData>
+          </a:graphic>
+        </p:graphicFrame>
+        <p:graphicFrame>
+          <p:nvGraphicFramePr>
+            <p:cNvPr id="62" name="对象 61"/>
+            <p:cNvGraphicFramePr>
+              <a:graphicFrameLocks noChangeAspect="1"/>
+            </p:cNvGraphicFramePr>
+            <p:nvPr>
+              <p:extLst>
+                <p:ext uri="{D42A27DB-BD31-4B8C-83A1-F6EECF244321}">
+                  <p14:modId xmlns:p14="http://schemas.microsoft.com/office/powerpoint/2010/main" val="4069155308"/>
+                </p:ext>
+              </p:extLst>
+            </p:nvPr>
+          </p:nvGraphicFramePr>
+          <p:xfrm>
+            <a:off x="3109980" y="2848994"/>
+            <a:ext cx="639762" cy="396875"/>
+          </p:xfrm>
+          <a:graphic>
+            <a:graphicData uri="http://schemas.openxmlformats.org/presentationml/2006/ole">
+              <mc:AlternateContent xmlns:mc="http://schemas.openxmlformats.org/markup-compatibility/2006">
+                <mc:Choice xmlns:v="urn:schemas-microsoft-com:vml" Requires="v">
+                  <p:oleObj spid="_x0000_s2091" name="Equation" r:id="rId7" imgW="368280" imgH="228600" progId="Equation.DSMT4">
+                    <p:embed/>
+                  </p:oleObj>
+                </mc:Choice>
+                <mc:Fallback>
+                  <p:oleObj name="Equation" r:id="rId7" imgW="368280" imgH="228600" progId="Equation.DSMT4">
+                    <p:embed/>
+                    <p:pic>
+                      <p:nvPicPr>
+                        <p:cNvPr id="61" name="对象 60"/>
+                        <p:cNvPicPr/>
+                        <p:nvPr/>
+                      </p:nvPicPr>
+                      <p:blipFill>
+                        <a:blip r:embed="rId8"/>
+                        <a:stretch>
+                          <a:fillRect/>
+                        </a:stretch>
+                      </p:blipFill>
+                      <p:spPr>
+                        <a:xfrm>
+                          <a:off x="3109980" y="2848994"/>
+                          <a:ext cx="639762" cy="396875"/>
+                        </a:xfrm>
+                        <a:prstGeom prst="rect">
+                          <a:avLst/>
+                        </a:prstGeom>
+                      </p:spPr>
+                    </p:pic>
+                  </p:oleObj>
+                </mc:Fallback>
+              </mc:AlternateContent>
+            </a:graphicData>
+          </a:graphic>
+        </p:graphicFrame>
+        <p:graphicFrame>
+          <p:nvGraphicFramePr>
+            <p:cNvPr id="64" name="对象 63"/>
+            <p:cNvGraphicFramePr>
+              <a:graphicFrameLocks noChangeAspect="1"/>
+            </p:cNvGraphicFramePr>
+            <p:nvPr>
+              <p:extLst>
+                <p:ext uri="{D42A27DB-BD31-4B8C-83A1-F6EECF244321}">
+                  <p14:modId xmlns:p14="http://schemas.microsoft.com/office/powerpoint/2010/main" val="2008279698"/>
+                </p:ext>
+              </p:extLst>
+            </p:nvPr>
+          </p:nvGraphicFramePr>
+          <p:xfrm>
+            <a:off x="1335882" y="3410683"/>
+            <a:ext cx="357187" cy="1619250"/>
+          </p:xfrm>
+          <a:graphic>
+            <a:graphicData uri="http://schemas.openxmlformats.org/presentationml/2006/ole">
+              <mc:AlternateContent xmlns:mc="http://schemas.openxmlformats.org/markup-compatibility/2006">
+                <mc:Choice xmlns:v="urn:schemas-microsoft-com:vml" Requires="v">
+                  <p:oleObj spid="_x0000_s2092" name="Equation" r:id="rId9" imgW="266400" imgH="1206360" progId="Equation.DSMT4">
+                    <p:embed/>
+                  </p:oleObj>
+                </mc:Choice>
+                <mc:Fallback>
+                  <p:oleObj name="Equation" r:id="rId9" imgW="266400" imgH="1206360" progId="Equation.DSMT4">
+                    <p:embed/>
+                    <p:pic>
+                      <p:nvPicPr>
+                        <p:cNvPr id="61" name="对象 60"/>
+                        <p:cNvPicPr/>
+                        <p:nvPr/>
+                      </p:nvPicPr>
+                      <p:blipFill>
+                        <a:blip r:embed="rId10"/>
+                        <a:stretch>
+                          <a:fillRect/>
+                        </a:stretch>
+                      </p:blipFill>
+                      <p:spPr>
+                        <a:xfrm>
+                          <a:off x="1335882" y="3410683"/>
+                          <a:ext cx="357187" cy="1619250"/>
+                        </a:xfrm>
+                        <a:prstGeom prst="rect">
+                          <a:avLst/>
+                        </a:prstGeom>
+                      </p:spPr>
+                    </p:pic>
+                  </p:oleObj>
+                </mc:Fallback>
+              </mc:AlternateContent>
+            </a:graphicData>
+          </a:graphic>
+        </p:graphicFrame>
+        <p:cxnSp>
+          <p:nvCxnSpPr>
+            <p:cNvPr id="10" name="直接箭头连接符 9"/>
+            <p:cNvCxnSpPr/>
+            <p:nvPr/>
+          </p:nvCxnSpPr>
+          <p:spPr>
+            <a:xfrm>
+              <a:off x="1814831" y="4212620"/>
+              <a:ext cx="572879" cy="0"/>
+            </a:xfrm>
+            <a:prstGeom prst="straightConnector1">
+              <a:avLst/>
+            </a:prstGeom>
+            <a:ln>
+              <a:tailEnd type="triangle"/>
+            </a:ln>
+          </p:spPr>
+          <p:style>
+            <a:lnRef idx="1">
+              <a:schemeClr val="dk1"/>
+            </a:lnRef>
+            <a:fillRef idx="0">
+              <a:schemeClr val="dk1"/>
+            </a:fillRef>
+            <a:effectRef idx="0">
+              <a:schemeClr val="dk1"/>
+            </a:effectRef>
+            <a:fontRef idx="minor">
+              <a:schemeClr val="tx1"/>
+            </a:fontRef>
+          </p:style>
+        </p:cxnSp>
+        <p:graphicFrame>
+          <p:nvGraphicFramePr>
+            <p:cNvPr id="66" name="对象 65"/>
+            <p:cNvGraphicFramePr>
+              <a:graphicFrameLocks noChangeAspect="1"/>
+            </p:cNvGraphicFramePr>
+            <p:nvPr>
+              <p:extLst>
+                <p:ext uri="{D42A27DB-BD31-4B8C-83A1-F6EECF244321}">
+                  <p14:modId xmlns:p14="http://schemas.microsoft.com/office/powerpoint/2010/main" val="2191090012"/>
+                </p:ext>
+              </p:extLst>
+            </p:nvPr>
+          </p:nvGraphicFramePr>
+          <p:xfrm>
+            <a:off x="1831975" y="3757613"/>
+            <a:ext cx="244475" cy="396875"/>
+          </p:xfrm>
+          <a:graphic>
+            <a:graphicData uri="http://schemas.openxmlformats.org/presentationml/2006/ole">
+              <mc:AlternateContent xmlns:mc="http://schemas.openxmlformats.org/markup-compatibility/2006">
+                <mc:Choice xmlns:v="urn:schemas-microsoft-com:vml" Requires="v">
+                  <p:oleObj spid="_x0000_s2093" name="Equation" r:id="rId11" imgW="139680" imgH="228600" progId="Equation.DSMT4">
+                    <p:embed/>
+                  </p:oleObj>
+                </mc:Choice>
+                <mc:Fallback>
+                  <p:oleObj name="Equation" r:id="rId11" imgW="139680" imgH="228600" progId="Equation.DSMT4">
+                    <p:embed/>
+                    <p:pic>
+                      <p:nvPicPr>
+                        <p:cNvPr id="61" name="对象 60"/>
+                        <p:cNvPicPr/>
+                        <p:nvPr/>
+                      </p:nvPicPr>
+                      <p:blipFill>
+                        <a:blip r:embed="rId12"/>
+                        <a:stretch>
+                          <a:fillRect/>
+                        </a:stretch>
+                      </p:blipFill>
+                      <p:spPr>
+                        <a:xfrm>
+                          <a:off x="1831975" y="3757613"/>
+                          <a:ext cx="244475" cy="396875"/>
+                        </a:xfrm>
+                        <a:prstGeom prst="rect">
+                          <a:avLst/>
+                        </a:prstGeom>
+                      </p:spPr>
+                    </p:pic>
+                  </p:oleObj>
+                </mc:Fallback>
+              </mc:AlternateContent>
+            </a:graphicData>
+          </a:graphic>
+        </p:graphicFrame>
+        <p:graphicFrame>
+          <p:nvGraphicFramePr>
+            <p:cNvPr id="68" name="对象 67"/>
+            <p:cNvGraphicFramePr>
+              <a:graphicFrameLocks noChangeAspect="1"/>
+            </p:cNvGraphicFramePr>
+            <p:nvPr>
+              <p:extLst>
+                <p:ext uri="{D42A27DB-BD31-4B8C-83A1-F6EECF244321}">
+                  <p14:modId xmlns:p14="http://schemas.microsoft.com/office/powerpoint/2010/main" val="1689589657"/>
+                </p:ext>
+              </p:extLst>
+            </p:nvPr>
+          </p:nvGraphicFramePr>
+          <p:xfrm>
+            <a:off x="2120843" y="4188558"/>
+            <a:ext cx="242888" cy="396875"/>
+          </p:xfrm>
+          <a:graphic>
+            <a:graphicData uri="http://schemas.openxmlformats.org/presentationml/2006/ole">
+              <mc:AlternateContent xmlns:mc="http://schemas.openxmlformats.org/markup-compatibility/2006">
+                <mc:Choice xmlns:v="urn:schemas-microsoft-com:vml" Requires="v">
+                  <p:oleObj spid="_x0000_s2094" name="Equation" r:id="rId13" imgW="139680" imgH="228600" progId="Equation.DSMT4">
+                    <p:embed/>
+                  </p:oleObj>
+                </mc:Choice>
+                <mc:Fallback>
+                  <p:oleObj name="Equation" r:id="rId13" imgW="139680" imgH="228600" progId="Equation.DSMT4">
+                    <p:embed/>
+                    <p:pic>
+                      <p:nvPicPr>
+                        <p:cNvPr id="66" name="对象 65"/>
+                        <p:cNvPicPr/>
+                        <p:nvPr/>
+                      </p:nvPicPr>
+                      <p:blipFill>
+                        <a:blip r:embed="rId14"/>
+                        <a:stretch>
+                          <a:fillRect/>
+                        </a:stretch>
+                      </p:blipFill>
+                      <p:spPr>
+                        <a:xfrm>
+                          <a:off x="2120843" y="4188558"/>
+                          <a:ext cx="242888" cy="396875"/>
+                        </a:xfrm>
+                        <a:prstGeom prst="rect">
+                          <a:avLst/>
+                        </a:prstGeom>
+                      </p:spPr>
+                    </p:pic>
+                  </p:oleObj>
+                </mc:Fallback>
+              </mc:AlternateContent>
+            </a:graphicData>
+          </a:graphic>
+        </p:graphicFrame>
+        <p:cxnSp>
+          <p:nvCxnSpPr>
+            <p:cNvPr id="71" name="直接箭头连接符 70"/>
+            <p:cNvCxnSpPr/>
+            <p:nvPr/>
+          </p:nvCxnSpPr>
+          <p:spPr>
+            <a:xfrm>
+              <a:off x="2809447" y="4220639"/>
+              <a:ext cx="572879" cy="0"/>
+            </a:xfrm>
+            <a:prstGeom prst="straightConnector1">
+              <a:avLst/>
+            </a:prstGeom>
+            <a:ln>
+              <a:tailEnd type="triangle"/>
+            </a:ln>
+          </p:spPr>
+          <p:style>
+            <a:lnRef idx="1">
+              <a:schemeClr val="dk1"/>
+            </a:lnRef>
+            <a:fillRef idx="0">
+              <a:schemeClr val="dk1"/>
+            </a:fillRef>
+            <a:effectRef idx="0">
+              <a:schemeClr val="dk1"/>
+            </a:effectRef>
+            <a:fontRef idx="minor">
+              <a:schemeClr val="tx1"/>
+            </a:fontRef>
+          </p:style>
+        </p:cxnSp>
+        <p:graphicFrame>
+          <p:nvGraphicFramePr>
+            <p:cNvPr id="73" name="对象 72"/>
+            <p:cNvGraphicFramePr>
+              <a:graphicFrameLocks noChangeAspect="1"/>
+            </p:cNvGraphicFramePr>
+            <p:nvPr>
+              <p:extLst>
+                <p:ext uri="{D42A27DB-BD31-4B8C-83A1-F6EECF244321}">
+                  <p14:modId xmlns:p14="http://schemas.microsoft.com/office/powerpoint/2010/main" val="695249104"/>
+                </p:ext>
+              </p:extLst>
+            </p:nvPr>
+          </p:nvGraphicFramePr>
+          <p:xfrm>
+            <a:off x="2806700" y="3765550"/>
+            <a:ext cx="287338" cy="396875"/>
+          </p:xfrm>
+          <a:graphic>
+            <a:graphicData uri="http://schemas.openxmlformats.org/presentationml/2006/ole">
+              <mc:AlternateContent xmlns:mc="http://schemas.openxmlformats.org/markup-compatibility/2006">
+                <mc:Choice xmlns:v="urn:schemas-microsoft-com:vml" Requires="v">
+                  <p:oleObj spid="_x0000_s2095" name="Equation" r:id="rId15" imgW="164880" imgH="228600" progId="Equation.DSMT4">
+                    <p:embed/>
+                  </p:oleObj>
+                </mc:Choice>
+                <mc:Fallback>
+                  <p:oleObj name="Equation" r:id="rId15" imgW="164880" imgH="228600" progId="Equation.DSMT4">
+                    <p:embed/>
+                    <p:pic>
+                      <p:nvPicPr>
+                        <p:cNvPr id="66" name="对象 65"/>
+                        <p:cNvPicPr/>
+                        <p:nvPr/>
+                      </p:nvPicPr>
+                      <p:blipFill>
+                        <a:blip r:embed="rId16"/>
+                        <a:stretch>
+                          <a:fillRect/>
+                        </a:stretch>
+                      </p:blipFill>
+                      <p:spPr>
+                        <a:xfrm>
+                          <a:off x="2806700" y="3765550"/>
+                          <a:ext cx="287338" cy="396875"/>
+                        </a:xfrm>
+                        <a:prstGeom prst="rect">
+                          <a:avLst/>
+                        </a:prstGeom>
+                      </p:spPr>
+                    </p:pic>
+                  </p:oleObj>
+                </mc:Fallback>
+              </mc:AlternateContent>
+            </a:graphicData>
+          </a:graphic>
+        </p:graphicFrame>
+        <p:graphicFrame>
+          <p:nvGraphicFramePr>
+            <p:cNvPr id="75" name="对象 74"/>
+            <p:cNvGraphicFramePr>
+              <a:graphicFrameLocks noChangeAspect="1"/>
+            </p:cNvGraphicFramePr>
+            <p:nvPr>
+              <p:extLst>
+                <p:ext uri="{D42A27DB-BD31-4B8C-83A1-F6EECF244321}">
+                  <p14:modId xmlns:p14="http://schemas.microsoft.com/office/powerpoint/2010/main" val="1284346440"/>
+                </p:ext>
+              </p:extLst>
+            </p:nvPr>
+          </p:nvGraphicFramePr>
+          <p:xfrm>
+            <a:off x="3127318" y="4197164"/>
+            <a:ext cx="220663" cy="396875"/>
+          </p:xfrm>
+          <a:graphic>
+            <a:graphicData uri="http://schemas.openxmlformats.org/presentationml/2006/ole">
+              <mc:AlternateContent xmlns:mc="http://schemas.openxmlformats.org/markup-compatibility/2006">
+                <mc:Choice xmlns:v="urn:schemas-microsoft-com:vml" Requires="v">
+                  <p:oleObj spid="_x0000_s2096" name="Equation" r:id="rId17" imgW="126720" imgH="228600" progId="Equation.DSMT4">
+                    <p:embed/>
+                  </p:oleObj>
+                </mc:Choice>
+                <mc:Fallback>
+                  <p:oleObj name="Equation" r:id="rId17" imgW="126720" imgH="228600" progId="Equation.DSMT4">
+                    <p:embed/>
+                    <p:pic>
+                      <p:nvPicPr>
+                        <p:cNvPr id="68" name="对象 67"/>
+                        <p:cNvPicPr/>
+                        <p:nvPr/>
+                      </p:nvPicPr>
+                      <p:blipFill>
+                        <a:blip r:embed="rId18"/>
+                        <a:stretch>
+                          <a:fillRect/>
+                        </a:stretch>
+                      </p:blipFill>
+                      <p:spPr>
+                        <a:xfrm>
+                          <a:off x="3127318" y="4197164"/>
+                          <a:ext cx="220663" cy="396875"/>
+                        </a:xfrm>
+                        <a:prstGeom prst="rect">
+                          <a:avLst/>
+                        </a:prstGeom>
+                      </p:spPr>
+                    </p:pic>
+                  </p:oleObj>
+                </mc:Fallback>
+              </mc:AlternateContent>
+            </a:graphicData>
+          </a:graphic>
+        </p:graphicFrame>
+        <p:cxnSp>
+          <p:nvCxnSpPr>
+            <p:cNvPr id="77" name="直接箭头连接符 76"/>
+            <p:cNvCxnSpPr/>
+            <p:nvPr/>
+          </p:nvCxnSpPr>
+          <p:spPr>
+            <a:xfrm>
+              <a:off x="4405637" y="4220639"/>
+              <a:ext cx="572879" cy="0"/>
+            </a:xfrm>
+            <a:prstGeom prst="straightConnector1">
+              <a:avLst/>
+            </a:prstGeom>
+            <a:ln>
+              <a:tailEnd type="triangle"/>
+            </a:ln>
+          </p:spPr>
+          <p:style>
+            <a:lnRef idx="1">
+              <a:schemeClr val="dk1"/>
+            </a:lnRef>
+            <a:fillRef idx="0">
+              <a:schemeClr val="dk1"/>
+            </a:fillRef>
+            <a:effectRef idx="0">
+              <a:schemeClr val="dk1"/>
+            </a:effectRef>
+            <a:fontRef idx="minor">
+              <a:schemeClr val="tx1"/>
+            </a:fontRef>
+          </p:style>
+        </p:cxnSp>
+        <p:graphicFrame>
+          <p:nvGraphicFramePr>
+            <p:cNvPr id="78" name="对象 77"/>
+            <p:cNvGraphicFramePr>
+              <a:graphicFrameLocks noChangeAspect="1"/>
+            </p:cNvGraphicFramePr>
+            <p:nvPr>
+              <p:extLst>
+                <p:ext uri="{D42A27DB-BD31-4B8C-83A1-F6EECF244321}">
+                  <p14:modId xmlns:p14="http://schemas.microsoft.com/office/powerpoint/2010/main" val="4107036765"/>
+                </p:ext>
+              </p:extLst>
+            </p:nvPr>
+          </p:nvGraphicFramePr>
+          <p:xfrm>
+            <a:off x="4303656" y="3764696"/>
+            <a:ext cx="485775" cy="396875"/>
+          </p:xfrm>
+          <a:graphic>
+            <a:graphicData uri="http://schemas.openxmlformats.org/presentationml/2006/ole">
+              <mc:AlternateContent xmlns:mc="http://schemas.openxmlformats.org/markup-compatibility/2006">
+                <mc:Choice xmlns:v="urn:schemas-microsoft-com:vml" Requires="v">
+                  <p:oleObj spid="_x0000_s2097" name="Equation" r:id="rId19" imgW="279360" imgH="228600" progId="Equation.DSMT4">
+                    <p:embed/>
+                  </p:oleObj>
+                </mc:Choice>
+                <mc:Fallback>
+                  <p:oleObj name="Equation" r:id="rId19" imgW="279360" imgH="228600" progId="Equation.DSMT4">
+                    <p:embed/>
+                    <p:pic>
+                      <p:nvPicPr>
+                        <p:cNvPr id="73" name="对象 72"/>
+                        <p:cNvPicPr/>
+                        <p:nvPr/>
+                      </p:nvPicPr>
+                      <p:blipFill>
+                        <a:blip r:embed="rId20"/>
+                        <a:stretch>
+                          <a:fillRect/>
+                        </a:stretch>
+                      </p:blipFill>
+                      <p:spPr>
+                        <a:xfrm>
+                          <a:off x="4303656" y="3764696"/>
+                          <a:ext cx="485775" cy="396875"/>
+                        </a:xfrm>
+                        <a:prstGeom prst="rect">
+                          <a:avLst/>
+                        </a:prstGeom>
+                      </p:spPr>
+                    </p:pic>
+                  </p:oleObj>
+                </mc:Fallback>
+              </mc:AlternateContent>
+            </a:graphicData>
+          </a:graphic>
+        </p:graphicFrame>
+        <p:graphicFrame>
+          <p:nvGraphicFramePr>
+            <p:cNvPr id="80" name="对象 79"/>
+            <p:cNvGraphicFramePr>
+              <a:graphicFrameLocks noChangeAspect="1"/>
+            </p:cNvGraphicFramePr>
+            <p:nvPr>
+              <p:extLst>
+                <p:ext uri="{D42A27DB-BD31-4B8C-83A1-F6EECF244321}">
+                  <p14:modId xmlns:p14="http://schemas.microsoft.com/office/powerpoint/2010/main" val="1532506369"/>
+                </p:ext>
+              </p:extLst>
+            </p:nvPr>
+          </p:nvGraphicFramePr>
+          <p:xfrm>
+            <a:off x="4613218" y="4196496"/>
+            <a:ext cx="441325" cy="396875"/>
+          </p:xfrm>
+          <a:graphic>
+            <a:graphicData uri="http://schemas.openxmlformats.org/presentationml/2006/ole">
+              <mc:AlternateContent xmlns:mc="http://schemas.openxmlformats.org/markup-compatibility/2006">
+                <mc:Choice xmlns:v="urn:schemas-microsoft-com:vml" Requires="v">
+                  <p:oleObj spid="_x0000_s2098" name="Equation" r:id="rId21" imgW="253800" imgH="228600" progId="Equation.DSMT4">
+                    <p:embed/>
+                  </p:oleObj>
+                </mc:Choice>
+                <mc:Fallback>
+                  <p:oleObj name="Equation" r:id="rId21" imgW="253800" imgH="228600" progId="Equation.DSMT4">
+                    <p:embed/>
+                    <p:pic>
+                      <p:nvPicPr>
+                        <p:cNvPr id="75" name="对象 74"/>
+                        <p:cNvPicPr/>
+                        <p:nvPr/>
+                      </p:nvPicPr>
+                      <p:blipFill>
+                        <a:blip r:embed="rId22"/>
+                        <a:stretch>
+                          <a:fillRect/>
+                        </a:stretch>
+                      </p:blipFill>
+                      <p:spPr>
+                        <a:xfrm>
+                          <a:off x="4613218" y="4196496"/>
+                          <a:ext cx="441325" cy="396875"/>
+                        </a:xfrm>
+                        <a:prstGeom prst="rect">
+                          <a:avLst/>
+                        </a:prstGeom>
+                      </p:spPr>
+                    </p:pic>
+                  </p:oleObj>
+                </mc:Fallback>
+              </mc:AlternateContent>
+            </a:graphicData>
+          </a:graphic>
+        </p:graphicFrame>
+        <p:sp>
+          <p:nvSpPr>
+            <p:cNvPr id="12" name="文本框 11"/>
+            <p:cNvSpPr txBox="1"/>
+            <p:nvPr/>
+          </p:nvSpPr>
+          <p:spPr>
+            <a:xfrm>
+              <a:off x="3891657" y="4021871"/>
+              <a:ext cx="411999" cy="369332"/>
+            </a:xfrm>
+            <a:prstGeom prst="rect">
+              <a:avLst/>
+            </a:prstGeom>
+            <a:noFill/>
+          </p:spPr>
+          <p:txBody>
+            <a:bodyPr wrap="square" rtlCol="0">
+              <a:spAutoFit/>
+            </a:bodyPr>
+            <a:lstStyle/>
+            <a:p>
+              <a:r>
+                <a:rPr lang="en-US" altLang="zh-CN" dirty="0" smtClean="0"/>
+                <a:t>…</a:t>
+              </a:r>
+              <a:endParaRPr lang="zh-CN" altLang="en-US" dirty="0"/>
+            </a:p>
+          </p:txBody>
+        </p:sp>
+        <p:graphicFrame>
+          <p:nvGraphicFramePr>
+            <p:cNvPr id="26" name="对象 25"/>
+            <p:cNvGraphicFramePr>
+              <a:graphicFrameLocks noChangeAspect="1"/>
+            </p:cNvGraphicFramePr>
+            <p:nvPr>
+              <p:extLst>
+                <p:ext uri="{D42A27DB-BD31-4B8C-83A1-F6EECF244321}">
+                  <p14:modId xmlns:p14="http://schemas.microsoft.com/office/powerpoint/2010/main" val="2891134609"/>
+                </p:ext>
+              </p:extLst>
+            </p:nvPr>
+          </p:nvGraphicFramePr>
+          <p:xfrm>
+            <a:off x="2463800" y="3409950"/>
+            <a:ext cx="341313" cy="1619250"/>
+          </p:xfrm>
+          <a:graphic>
+            <a:graphicData uri="http://schemas.openxmlformats.org/presentationml/2006/ole">
+              <mc:AlternateContent xmlns:mc="http://schemas.openxmlformats.org/markup-compatibility/2006">
+                <mc:Choice xmlns:v="urn:schemas-microsoft-com:vml" Requires="v">
+                  <p:oleObj spid="_x0000_s2099" name="Equation" r:id="rId23" imgW="253800" imgH="1206360" progId="Equation.DSMT4">
+                    <p:embed/>
+                  </p:oleObj>
+                </mc:Choice>
+                <mc:Fallback>
+                  <p:oleObj name="Equation" r:id="rId23" imgW="253800" imgH="1206360" progId="Equation.DSMT4">
+                    <p:embed/>
+                    <p:pic>
+                      <p:nvPicPr>
+                        <p:cNvPr id="64" name="对象 63"/>
+                        <p:cNvPicPr/>
+                        <p:nvPr/>
+                      </p:nvPicPr>
+                      <p:blipFill>
+                        <a:blip r:embed="rId24"/>
+                        <a:stretch>
+                          <a:fillRect/>
+                        </a:stretch>
+                      </p:blipFill>
+                      <p:spPr>
+                        <a:xfrm>
+                          <a:off x="2463800" y="3409950"/>
+                          <a:ext cx="341313" cy="1619250"/>
+                        </a:xfrm>
+                        <a:prstGeom prst="rect">
+                          <a:avLst/>
+                        </a:prstGeom>
+                      </p:spPr>
+                    </p:pic>
+                  </p:oleObj>
+                </mc:Fallback>
+              </mc:AlternateContent>
+            </a:graphicData>
+          </a:graphic>
+        </p:graphicFrame>
+        <p:graphicFrame>
+          <p:nvGraphicFramePr>
+            <p:cNvPr id="28" name="对象 27"/>
+            <p:cNvGraphicFramePr>
+              <a:graphicFrameLocks noChangeAspect="1"/>
+            </p:cNvGraphicFramePr>
+            <p:nvPr>
+              <p:extLst>
+                <p:ext uri="{D42A27DB-BD31-4B8C-83A1-F6EECF244321}">
+                  <p14:modId xmlns:p14="http://schemas.microsoft.com/office/powerpoint/2010/main" val="3004764582"/>
+                </p:ext>
+              </p:extLst>
+            </p:nvPr>
+          </p:nvGraphicFramePr>
+          <p:xfrm>
+            <a:off x="3471863" y="3409950"/>
+            <a:ext cx="357187" cy="1619250"/>
+          </p:xfrm>
+          <a:graphic>
+            <a:graphicData uri="http://schemas.openxmlformats.org/presentationml/2006/ole">
+              <mc:AlternateContent xmlns:mc="http://schemas.openxmlformats.org/markup-compatibility/2006">
+                <mc:Choice xmlns:v="urn:schemas-microsoft-com:vml" Requires="v">
+                  <p:oleObj spid="_x0000_s2100" name="Equation" r:id="rId25" imgW="266400" imgH="1206360" progId="Equation.DSMT4">
+                    <p:embed/>
+                  </p:oleObj>
+                </mc:Choice>
+                <mc:Fallback>
+                  <p:oleObj name="Equation" r:id="rId25" imgW="266400" imgH="1206360" progId="Equation.DSMT4">
+                    <p:embed/>
+                    <p:pic>
+                      <p:nvPicPr>
+                        <p:cNvPr id="26" name="对象 25"/>
+                        <p:cNvPicPr/>
+                        <p:nvPr/>
+                      </p:nvPicPr>
+                      <p:blipFill>
+                        <a:blip r:embed="rId26"/>
+                        <a:stretch>
+                          <a:fillRect/>
+                        </a:stretch>
+                      </p:blipFill>
+                      <p:spPr>
+                        <a:xfrm>
+                          <a:off x="3471863" y="3409950"/>
+                          <a:ext cx="357187" cy="1619250"/>
+                        </a:xfrm>
+                        <a:prstGeom prst="rect">
+                          <a:avLst/>
+                        </a:prstGeom>
+                      </p:spPr>
+                    </p:pic>
+                  </p:oleObj>
+                </mc:Fallback>
+              </mc:AlternateContent>
+            </a:graphicData>
+          </a:graphic>
+        </p:graphicFrame>
+        <p:graphicFrame>
+          <p:nvGraphicFramePr>
+            <p:cNvPr id="29" name="对象 28"/>
+            <p:cNvGraphicFramePr>
+              <a:graphicFrameLocks noChangeAspect="1"/>
+            </p:cNvGraphicFramePr>
+            <p:nvPr>
+              <p:extLst>
+                <p:ext uri="{D42A27DB-BD31-4B8C-83A1-F6EECF244321}">
+                  <p14:modId xmlns:p14="http://schemas.microsoft.com/office/powerpoint/2010/main" val="1944325627"/>
+                </p:ext>
+              </p:extLst>
+            </p:nvPr>
+          </p:nvGraphicFramePr>
+          <p:xfrm>
+            <a:off x="5168900" y="3409950"/>
+            <a:ext cx="392113" cy="1619250"/>
+          </p:xfrm>
+          <a:graphic>
+            <a:graphicData uri="http://schemas.openxmlformats.org/presentationml/2006/ole">
+              <mc:AlternateContent xmlns:mc="http://schemas.openxmlformats.org/markup-compatibility/2006">
+                <mc:Choice xmlns:v="urn:schemas-microsoft-com:vml" Requires="v">
+                  <p:oleObj spid="_x0000_s2101" name="Equation" r:id="rId27" imgW="291960" imgH="1206360" progId="Equation.DSMT4">
+                    <p:embed/>
+                  </p:oleObj>
+                </mc:Choice>
+                <mc:Fallback>
+                  <p:oleObj name="Equation" r:id="rId27" imgW="291960" imgH="1206360" progId="Equation.DSMT4">
+                    <p:embed/>
+                    <p:pic>
+                      <p:nvPicPr>
+                        <p:cNvPr id="28" name="对象 27"/>
+                        <p:cNvPicPr/>
+                        <p:nvPr/>
+                      </p:nvPicPr>
+                      <p:blipFill>
+                        <a:blip r:embed="rId28"/>
+                        <a:stretch>
+                          <a:fillRect/>
+                        </a:stretch>
+                      </p:blipFill>
+                      <p:spPr>
+                        <a:xfrm>
+                          <a:off x="5168900" y="3409950"/>
+                          <a:ext cx="392113" cy="1619250"/>
+                        </a:xfrm>
+                        <a:prstGeom prst="rect">
+                          <a:avLst/>
+                        </a:prstGeom>
+                      </p:spPr>
+                    </p:pic>
+                  </p:oleObj>
+                </mc:Fallback>
+              </mc:AlternateContent>
+            </a:graphicData>
+          </a:graphic>
+        </p:graphicFrame>
+      </p:grpSp>
+    </p:spTree>
+    <p:extLst>
+      <p:ext uri="{BB962C8B-B14F-4D97-AF65-F5344CB8AC3E}">
+        <p14:creationId xmlns:p14="http://schemas.microsoft.com/office/powerpoint/2010/main" val="1436335887"/>
+      </p:ext>
+    </p:extLst>
+  </p:cSld>
+  <p:clrMapOvr>
+    <a:masterClrMapping/>
+  </p:clrMapOvr>
+</p:sld>
+</file>
+
 <file path=ppt/theme/theme1.xml><?xml version="1.0" encoding="utf-8"?>
 <a:theme xmlns:a="http://schemas.openxmlformats.org/drawingml/2006/main" name="Office 主题​​">
   <a:themeElements>

</xml_diff>

<commit_message>
daily commit 0404, finish c4.3, change paper structure
</commit_message>
<xml_diff>
--- a/figures/演示文稿1.pptx
+++ b/figures/演示文稿1.pptx
@@ -12,6 +12,8 @@
     <p:sldId id="259" r:id="rId6"/>
     <p:sldId id="261" r:id="rId7"/>
     <p:sldId id="262" r:id="rId8"/>
+    <p:sldId id="263" r:id="rId9"/>
+    <p:sldId id="264" r:id="rId10"/>
   </p:sldIdLst>
   <p:sldSz cx="9144000" cy="6858000" type="screen4x3"/>
   <p:notesSz cx="6858000" cy="9144000"/>
@@ -249,7 +251,7 @@
           <a:p>
             <a:fld id="{850289C4-C9C2-47F7-B72C-4F7E3D61DF21}" type="datetimeFigureOut">
               <a:rPr lang="zh-CN" altLang="en-US" smtClean="0"/>
-              <a:t>2019/4/3</a:t>
+              <a:t>2019/4/4</a:t>
             </a:fld>
             <a:endParaRPr lang="zh-CN" altLang="en-US"/>
           </a:p>
@@ -419,7 +421,7 @@
           <a:p>
             <a:fld id="{850289C4-C9C2-47F7-B72C-4F7E3D61DF21}" type="datetimeFigureOut">
               <a:rPr lang="zh-CN" altLang="en-US" smtClean="0"/>
-              <a:t>2019/4/3</a:t>
+              <a:t>2019/4/4</a:t>
             </a:fld>
             <a:endParaRPr lang="zh-CN" altLang="en-US"/>
           </a:p>
@@ -599,7 +601,7 @@
           <a:p>
             <a:fld id="{850289C4-C9C2-47F7-B72C-4F7E3D61DF21}" type="datetimeFigureOut">
               <a:rPr lang="zh-CN" altLang="en-US" smtClean="0"/>
-              <a:t>2019/4/3</a:t>
+              <a:t>2019/4/4</a:t>
             </a:fld>
             <a:endParaRPr lang="zh-CN" altLang="en-US"/>
           </a:p>
@@ -769,7 +771,7 @@
           <a:p>
             <a:fld id="{850289C4-C9C2-47F7-B72C-4F7E3D61DF21}" type="datetimeFigureOut">
               <a:rPr lang="zh-CN" altLang="en-US" smtClean="0"/>
-              <a:t>2019/4/3</a:t>
+              <a:t>2019/4/4</a:t>
             </a:fld>
             <a:endParaRPr lang="zh-CN" altLang="en-US"/>
           </a:p>
@@ -1013,7 +1015,7 @@
           <a:p>
             <a:fld id="{850289C4-C9C2-47F7-B72C-4F7E3D61DF21}" type="datetimeFigureOut">
               <a:rPr lang="zh-CN" altLang="en-US" smtClean="0"/>
-              <a:t>2019/4/3</a:t>
+              <a:t>2019/4/4</a:t>
             </a:fld>
             <a:endParaRPr lang="zh-CN" altLang="en-US"/>
           </a:p>
@@ -1245,7 +1247,7 @@
           <a:p>
             <a:fld id="{850289C4-C9C2-47F7-B72C-4F7E3D61DF21}" type="datetimeFigureOut">
               <a:rPr lang="zh-CN" altLang="en-US" smtClean="0"/>
-              <a:t>2019/4/3</a:t>
+              <a:t>2019/4/4</a:t>
             </a:fld>
             <a:endParaRPr lang="zh-CN" altLang="en-US"/>
           </a:p>
@@ -1612,7 +1614,7 @@
           <a:p>
             <a:fld id="{850289C4-C9C2-47F7-B72C-4F7E3D61DF21}" type="datetimeFigureOut">
               <a:rPr lang="zh-CN" altLang="en-US" smtClean="0"/>
-              <a:t>2019/4/3</a:t>
+              <a:t>2019/4/4</a:t>
             </a:fld>
             <a:endParaRPr lang="zh-CN" altLang="en-US"/>
           </a:p>
@@ -1730,7 +1732,7 @@
           <a:p>
             <a:fld id="{850289C4-C9C2-47F7-B72C-4F7E3D61DF21}" type="datetimeFigureOut">
               <a:rPr lang="zh-CN" altLang="en-US" smtClean="0"/>
-              <a:t>2019/4/3</a:t>
+              <a:t>2019/4/4</a:t>
             </a:fld>
             <a:endParaRPr lang="zh-CN" altLang="en-US"/>
           </a:p>
@@ -1825,7 +1827,7 @@
           <a:p>
             <a:fld id="{850289C4-C9C2-47F7-B72C-4F7E3D61DF21}" type="datetimeFigureOut">
               <a:rPr lang="zh-CN" altLang="en-US" smtClean="0"/>
-              <a:t>2019/4/3</a:t>
+              <a:t>2019/4/4</a:t>
             </a:fld>
             <a:endParaRPr lang="zh-CN" altLang="en-US"/>
           </a:p>
@@ -2102,7 +2104,7 @@
           <a:p>
             <a:fld id="{850289C4-C9C2-47F7-B72C-4F7E3D61DF21}" type="datetimeFigureOut">
               <a:rPr lang="zh-CN" altLang="en-US" smtClean="0"/>
-              <a:t>2019/4/3</a:t>
+              <a:t>2019/4/4</a:t>
             </a:fld>
             <a:endParaRPr lang="zh-CN" altLang="en-US"/>
           </a:p>
@@ -2359,7 +2361,7 @@
           <a:p>
             <a:fld id="{850289C4-C9C2-47F7-B72C-4F7E3D61DF21}" type="datetimeFigureOut">
               <a:rPr lang="zh-CN" altLang="en-US" smtClean="0"/>
-              <a:t>2019/4/3</a:t>
+              <a:t>2019/4/4</a:t>
             </a:fld>
             <a:endParaRPr lang="zh-CN" altLang="en-US"/>
           </a:p>
@@ -2572,7 +2574,7 @@
           <a:p>
             <a:fld id="{850289C4-C9C2-47F7-B72C-4F7E3D61DF21}" type="datetimeFigureOut">
               <a:rPr lang="zh-CN" altLang="en-US" smtClean="0"/>
-              <a:t>2019/4/3</a:t>
+              <a:t>2019/4/4</a:t>
             </a:fld>
             <a:endParaRPr lang="zh-CN" altLang="en-US"/>
           </a:p>
@@ -11112,7 +11114,7 @@
             <a:graphicData uri="http://schemas.openxmlformats.org/presentationml/2006/ole">
               <mc:AlternateContent xmlns:mc="http://schemas.openxmlformats.org/markup-compatibility/2006">
                 <mc:Choice xmlns:v="urn:schemas-microsoft-com:vml" Requires="v">
-                  <p:oleObj spid="_x0000_s1047" name="Equation" r:id="rId12" imgW="330120" imgH="228600" progId="Equation.DSMT4">
+                  <p:oleObj spid="_x0000_s1063" name="Equation" r:id="rId12" imgW="330120" imgH="228600" progId="Equation.DSMT4">
                     <p:embed/>
                   </p:oleObj>
                 </mc:Choice>
@@ -11169,7 +11171,7 @@
             <a:graphicData uri="http://schemas.openxmlformats.org/presentationml/2006/ole">
               <mc:AlternateContent xmlns:mc="http://schemas.openxmlformats.org/markup-compatibility/2006">
                 <mc:Choice xmlns:v="urn:schemas-microsoft-com:vml" Requires="v">
-                  <p:oleObj spid="_x0000_s1048" name="Equation" r:id="rId14" imgW="139680" imgH="228600" progId="Equation.DSMT4">
+                  <p:oleObj spid="_x0000_s1064" name="Equation" r:id="rId14" imgW="139680" imgH="228600" progId="Equation.DSMT4">
                     <p:embed/>
                   </p:oleObj>
                 </mc:Choice>
@@ -11389,7 +11391,7 @@
             <a:graphicData uri="http://schemas.openxmlformats.org/presentationml/2006/ole">
               <mc:AlternateContent xmlns:mc="http://schemas.openxmlformats.org/markup-compatibility/2006">
                 <mc:Choice xmlns:v="urn:schemas-microsoft-com:vml" Requires="v">
-                  <p:oleObj spid="_x0000_s1049" name="Equation" r:id="rId16" imgW="228600" imgH="228600" progId="Equation.DSMT4">
+                  <p:oleObj spid="_x0000_s1065" name="Equation" r:id="rId16" imgW="228600" imgH="228600" progId="Equation.DSMT4">
                     <p:embed/>
                   </p:oleObj>
                 </mc:Choice>
@@ -11451,7 +11453,7 @@
             <a:graphicData uri="http://schemas.openxmlformats.org/presentationml/2006/ole">
               <mc:AlternateContent xmlns:mc="http://schemas.openxmlformats.org/markup-compatibility/2006">
                 <mc:Choice xmlns:v="urn:schemas-microsoft-com:vml" Requires="v">
-                  <p:oleObj spid="_x0000_s1050" name="Equation" r:id="rId18" imgW="114120" imgH="228600" progId="Equation.DSMT4">
+                  <p:oleObj spid="_x0000_s1066" name="Equation" r:id="rId18" imgW="114120" imgH="228600" progId="Equation.DSMT4">
                     <p:embed/>
                   </p:oleObj>
                 </mc:Choice>
@@ -11863,7 +11865,7 @@
             <a:graphicData uri="http://schemas.openxmlformats.org/presentationml/2006/ole">
               <mc:AlternateContent xmlns:mc="http://schemas.openxmlformats.org/markup-compatibility/2006">
                 <mc:Choice xmlns:v="urn:schemas-microsoft-com:vml" Requires="v">
-                  <p:oleObj spid="_x0000_s2089" name="Equation" r:id="rId3" imgW="139680" imgH="228600" progId="Equation.DSMT4">
+                  <p:oleObj spid="_x0000_s2141" name="Equation" r:id="rId3" imgW="139680" imgH="228600" progId="Equation.DSMT4">
                     <p:embed/>
                   </p:oleObj>
                 </mc:Choice>
@@ -11920,7 +11922,7 @@
             <a:graphicData uri="http://schemas.openxmlformats.org/presentationml/2006/ole">
               <mc:AlternateContent xmlns:mc="http://schemas.openxmlformats.org/markup-compatibility/2006">
                 <mc:Choice xmlns:v="urn:schemas-microsoft-com:vml" Requires="v">
-                  <p:oleObj spid="_x0000_s2090" name="Equation" r:id="rId5" imgW="152280" imgH="228600" progId="Equation.DSMT4">
+                  <p:oleObj spid="_x0000_s2142" name="Equation" r:id="rId5" imgW="152280" imgH="228600" progId="Equation.DSMT4">
                     <p:embed/>
                   </p:oleObj>
                 </mc:Choice>
@@ -11977,7 +11979,7 @@
             <a:graphicData uri="http://schemas.openxmlformats.org/presentationml/2006/ole">
               <mc:AlternateContent xmlns:mc="http://schemas.openxmlformats.org/markup-compatibility/2006">
                 <mc:Choice xmlns:v="urn:schemas-microsoft-com:vml" Requires="v">
-                  <p:oleObj spid="_x0000_s2091" name="Equation" r:id="rId7" imgW="368280" imgH="228600" progId="Equation.DSMT4">
+                  <p:oleObj spid="_x0000_s2143" name="Equation" r:id="rId7" imgW="368280" imgH="228600" progId="Equation.DSMT4">
                     <p:embed/>
                   </p:oleObj>
                 </mc:Choice>
@@ -12034,7 +12036,7 @@
             <a:graphicData uri="http://schemas.openxmlformats.org/presentationml/2006/ole">
               <mc:AlternateContent xmlns:mc="http://schemas.openxmlformats.org/markup-compatibility/2006">
                 <mc:Choice xmlns:v="urn:schemas-microsoft-com:vml" Requires="v">
-                  <p:oleObj spid="_x0000_s2092" name="Equation" r:id="rId9" imgW="266400" imgH="1206360" progId="Equation.DSMT4">
+                  <p:oleObj spid="_x0000_s2144" name="Equation" r:id="rId9" imgW="266400" imgH="1206360" progId="Equation.DSMT4">
                     <p:embed/>
                   </p:oleObj>
                 </mc:Choice>
@@ -12124,7 +12126,7 @@
             <a:graphicData uri="http://schemas.openxmlformats.org/presentationml/2006/ole">
               <mc:AlternateContent xmlns:mc="http://schemas.openxmlformats.org/markup-compatibility/2006">
                 <mc:Choice xmlns:v="urn:schemas-microsoft-com:vml" Requires="v">
-                  <p:oleObj spid="_x0000_s2093" name="Equation" r:id="rId11" imgW="139680" imgH="228600" progId="Equation.DSMT4">
+                  <p:oleObj spid="_x0000_s2145" name="Equation" r:id="rId11" imgW="139680" imgH="228600" progId="Equation.DSMT4">
                     <p:embed/>
                   </p:oleObj>
                 </mc:Choice>
@@ -12181,7 +12183,7 @@
             <a:graphicData uri="http://schemas.openxmlformats.org/presentationml/2006/ole">
               <mc:AlternateContent xmlns:mc="http://schemas.openxmlformats.org/markup-compatibility/2006">
                 <mc:Choice xmlns:v="urn:schemas-microsoft-com:vml" Requires="v">
-                  <p:oleObj spid="_x0000_s2094" name="Equation" r:id="rId13" imgW="139680" imgH="228600" progId="Equation.DSMT4">
+                  <p:oleObj spid="_x0000_s2146" name="Equation" r:id="rId13" imgW="139680" imgH="228600" progId="Equation.DSMT4">
                     <p:embed/>
                   </p:oleObj>
                 </mc:Choice>
@@ -12271,7 +12273,7 @@
             <a:graphicData uri="http://schemas.openxmlformats.org/presentationml/2006/ole">
               <mc:AlternateContent xmlns:mc="http://schemas.openxmlformats.org/markup-compatibility/2006">
                 <mc:Choice xmlns:v="urn:schemas-microsoft-com:vml" Requires="v">
-                  <p:oleObj spid="_x0000_s2095" name="Equation" r:id="rId15" imgW="164880" imgH="228600" progId="Equation.DSMT4">
+                  <p:oleObj spid="_x0000_s2147" name="Equation" r:id="rId15" imgW="164880" imgH="228600" progId="Equation.DSMT4">
                     <p:embed/>
                   </p:oleObj>
                 </mc:Choice>
@@ -12328,7 +12330,7 @@
             <a:graphicData uri="http://schemas.openxmlformats.org/presentationml/2006/ole">
               <mc:AlternateContent xmlns:mc="http://schemas.openxmlformats.org/markup-compatibility/2006">
                 <mc:Choice xmlns:v="urn:schemas-microsoft-com:vml" Requires="v">
-                  <p:oleObj spid="_x0000_s2096" name="Equation" r:id="rId17" imgW="126720" imgH="228600" progId="Equation.DSMT4">
+                  <p:oleObj spid="_x0000_s2148" name="Equation" r:id="rId17" imgW="126720" imgH="228600" progId="Equation.DSMT4">
                     <p:embed/>
                   </p:oleObj>
                 </mc:Choice>
@@ -12418,7 +12420,7 @@
             <a:graphicData uri="http://schemas.openxmlformats.org/presentationml/2006/ole">
               <mc:AlternateContent xmlns:mc="http://schemas.openxmlformats.org/markup-compatibility/2006">
                 <mc:Choice xmlns:v="urn:schemas-microsoft-com:vml" Requires="v">
-                  <p:oleObj spid="_x0000_s2097" name="Equation" r:id="rId19" imgW="279360" imgH="228600" progId="Equation.DSMT4">
+                  <p:oleObj spid="_x0000_s2149" name="Equation" r:id="rId19" imgW="279360" imgH="228600" progId="Equation.DSMT4">
                     <p:embed/>
                   </p:oleObj>
                 </mc:Choice>
@@ -12475,7 +12477,7 @@
             <a:graphicData uri="http://schemas.openxmlformats.org/presentationml/2006/ole">
               <mc:AlternateContent xmlns:mc="http://schemas.openxmlformats.org/markup-compatibility/2006">
                 <mc:Choice xmlns:v="urn:schemas-microsoft-com:vml" Requires="v">
-                  <p:oleObj spid="_x0000_s2098" name="Equation" r:id="rId21" imgW="253800" imgH="228600" progId="Equation.DSMT4">
+                  <p:oleObj spid="_x0000_s2150" name="Equation" r:id="rId21" imgW="253800" imgH="228600" progId="Equation.DSMT4">
                     <p:embed/>
                   </p:oleObj>
                 </mc:Choice>
@@ -12562,7 +12564,7 @@
             <a:graphicData uri="http://schemas.openxmlformats.org/presentationml/2006/ole">
               <mc:AlternateContent xmlns:mc="http://schemas.openxmlformats.org/markup-compatibility/2006">
                 <mc:Choice xmlns:v="urn:schemas-microsoft-com:vml" Requires="v">
-                  <p:oleObj spid="_x0000_s2099" name="Equation" r:id="rId23" imgW="253800" imgH="1206360" progId="Equation.DSMT4">
+                  <p:oleObj spid="_x0000_s2151" name="Equation" r:id="rId23" imgW="253800" imgH="1206360" progId="Equation.DSMT4">
                     <p:embed/>
                   </p:oleObj>
                 </mc:Choice>
@@ -12619,7 +12621,7 @@
             <a:graphicData uri="http://schemas.openxmlformats.org/presentationml/2006/ole">
               <mc:AlternateContent xmlns:mc="http://schemas.openxmlformats.org/markup-compatibility/2006">
                 <mc:Choice xmlns:v="urn:schemas-microsoft-com:vml" Requires="v">
-                  <p:oleObj spid="_x0000_s2100" name="Equation" r:id="rId25" imgW="266400" imgH="1206360" progId="Equation.DSMT4">
+                  <p:oleObj spid="_x0000_s2152" name="Equation" r:id="rId25" imgW="266400" imgH="1206360" progId="Equation.DSMT4">
                     <p:embed/>
                   </p:oleObj>
                 </mc:Choice>
@@ -12676,7 +12678,7 @@
             <a:graphicData uri="http://schemas.openxmlformats.org/presentationml/2006/ole">
               <mc:AlternateContent xmlns:mc="http://schemas.openxmlformats.org/markup-compatibility/2006">
                 <mc:Choice xmlns:v="urn:schemas-microsoft-com:vml" Requires="v">
-                  <p:oleObj spid="_x0000_s2101" name="Equation" r:id="rId27" imgW="291960" imgH="1206360" progId="Equation.DSMT4">
+                  <p:oleObj spid="_x0000_s2153" name="Equation" r:id="rId27" imgW="291960" imgH="1206360" progId="Equation.DSMT4">
                     <p:embed/>
                   </p:oleObj>
                 </mc:Choice>
@@ -12716,6 +12718,1516 @@
     <p:extLst>
       <p:ext uri="{BB962C8B-B14F-4D97-AF65-F5344CB8AC3E}">
         <p14:creationId xmlns:p14="http://schemas.microsoft.com/office/powerpoint/2010/main" val="1436335887"/>
+      </p:ext>
+    </p:extLst>
+  </p:cSld>
+  <p:clrMapOvr>
+    <a:masterClrMapping/>
+  </p:clrMapOvr>
+</p:sld>
+</file>
+
+<file path=ppt/slides/slide8.xml><?xml version="1.0" encoding="utf-8"?>
+<p:sld xmlns:a="http://schemas.openxmlformats.org/drawingml/2006/main" xmlns:r="http://schemas.openxmlformats.org/officeDocument/2006/relationships" xmlns:p="http://schemas.openxmlformats.org/presentationml/2006/main">
+  <p:cSld>
+    <p:spTree>
+      <p:nvGrpSpPr>
+        <p:cNvPr id="1" name=""/>
+        <p:cNvGrpSpPr/>
+        <p:nvPr/>
+      </p:nvGrpSpPr>
+      <p:grpSpPr>
+        <a:xfrm>
+          <a:off x="0" y="0"/>
+          <a:ext cx="0" cy="0"/>
+          <a:chOff x="0" y="0"/>
+          <a:chExt cx="0" cy="0"/>
+        </a:xfrm>
+      </p:grpSpPr>
+      <p:grpSp>
+        <p:nvGrpSpPr>
+          <p:cNvPr id="40" name="组合 39"/>
+          <p:cNvGrpSpPr/>
+          <p:nvPr/>
+        </p:nvGrpSpPr>
+        <p:grpSpPr>
+          <a:xfrm>
+            <a:off x="822960" y="78373"/>
+            <a:ext cx="7723112" cy="6603963"/>
+            <a:chOff x="822960" y="78373"/>
+            <a:chExt cx="7723112" cy="6603963"/>
+          </a:xfrm>
+        </p:grpSpPr>
+        <p:sp>
+          <p:nvSpPr>
+            <p:cNvPr id="2" name="文本框 1"/>
+            <p:cNvSpPr txBox="1"/>
+            <p:nvPr/>
+          </p:nvSpPr>
+          <p:spPr>
+            <a:xfrm>
+              <a:off x="3398520" y="78373"/>
+              <a:ext cx="2886891" cy="369332"/>
+            </a:xfrm>
+            <a:prstGeom prst="rect">
+              <a:avLst/>
+            </a:prstGeom>
+            <a:noFill/>
+            <a:ln>
+              <a:solidFill>
+                <a:schemeClr val="tx1"/>
+              </a:solidFill>
+            </a:ln>
+          </p:spPr>
+          <p:txBody>
+            <a:bodyPr wrap="square" rtlCol="0">
+              <a:spAutoFit/>
+            </a:bodyPr>
+            <a:lstStyle/>
+            <a:p>
+              <a:pPr algn="ctr"/>
+              <a:r>
+                <a:rPr lang="en-US" altLang="zh-CN" dirty="0" smtClean="0">
+                  <a:latin typeface="宋体" panose="02010600030101010101" pitchFamily="2" charset="-122"/>
+                  <a:ea typeface="宋体" panose="02010600030101010101" pitchFamily="2" charset="-122"/>
+                </a:rPr>
+                <a:t>DG</a:t>
+              </a:r>
+              <a:r>
+                <a:rPr lang="zh-CN" altLang="en-US" dirty="0" smtClean="0">
+                  <a:latin typeface="宋体" panose="02010600030101010101" pitchFamily="2" charset="-122"/>
+                  <a:ea typeface="宋体" panose="02010600030101010101" pitchFamily="2" charset="-122"/>
+                </a:rPr>
+                <a:t>接入的低感知配电网</a:t>
+              </a:r>
+              <a:endParaRPr lang="zh-CN" altLang="en-US" dirty="0">
+                <a:latin typeface="宋体" panose="02010600030101010101" pitchFamily="2" charset="-122"/>
+                <a:ea typeface="宋体" panose="02010600030101010101" pitchFamily="2" charset="-122"/>
+              </a:endParaRPr>
+            </a:p>
+          </p:txBody>
+        </p:sp>
+        <p:sp>
+          <p:nvSpPr>
+            <p:cNvPr id="3" name="矩形 2"/>
+            <p:cNvSpPr/>
+            <p:nvPr/>
+          </p:nvSpPr>
+          <p:spPr>
+            <a:xfrm>
+              <a:off x="822960" y="522510"/>
+              <a:ext cx="1214846" cy="369332"/>
+            </a:xfrm>
+            <a:prstGeom prst="rect">
+              <a:avLst/>
+            </a:prstGeom>
+          </p:spPr>
+          <p:style>
+            <a:lnRef idx="2">
+              <a:schemeClr val="accent1">
+                <a:shade val="50000"/>
+              </a:schemeClr>
+            </a:lnRef>
+            <a:fillRef idx="1">
+              <a:schemeClr val="accent1"/>
+            </a:fillRef>
+            <a:effectRef idx="0">
+              <a:schemeClr val="accent1"/>
+            </a:effectRef>
+            <a:fontRef idx="minor">
+              <a:schemeClr val="lt1"/>
+            </a:fontRef>
+          </p:style>
+          <p:txBody>
+            <a:bodyPr rtlCol="0" anchor="ctr"/>
+            <a:lstStyle/>
+            <a:p>
+              <a:pPr algn="ctr"/>
+              <a:r>
+                <a:rPr lang="zh-CN" altLang="en-US" dirty="0" smtClean="0"/>
+                <a:t>特点</a:t>
+              </a:r>
+              <a:endParaRPr lang="zh-CN" altLang="en-US" dirty="0"/>
+            </a:p>
+          </p:txBody>
+        </p:sp>
+        <p:sp>
+          <p:nvSpPr>
+            <p:cNvPr id="4" name="文本框 3"/>
+            <p:cNvSpPr txBox="1"/>
+            <p:nvPr/>
+          </p:nvSpPr>
+          <p:spPr>
+            <a:xfrm>
+              <a:off x="2190205" y="522510"/>
+              <a:ext cx="1767841" cy="369332"/>
+            </a:xfrm>
+            <a:prstGeom prst="rect">
+              <a:avLst/>
+            </a:prstGeom>
+            <a:noFill/>
+          </p:spPr>
+          <p:txBody>
+            <a:bodyPr wrap="square" rtlCol="0">
+              <a:spAutoFit/>
+            </a:bodyPr>
+            <a:lstStyle/>
+            <a:p>
+              <a:pPr algn="ctr"/>
+              <a:r>
+                <a:rPr lang="zh-CN" altLang="en-US" smtClean="0">
+                  <a:latin typeface="宋体" panose="02010600030101010101" pitchFamily="2" charset="-122"/>
+                  <a:ea typeface="宋体" panose="02010600030101010101" pitchFamily="2" charset="-122"/>
+                </a:rPr>
+                <a:t>低四遥覆盖率</a:t>
+              </a:r>
+              <a:endParaRPr lang="zh-CN" altLang="en-US" dirty="0">
+                <a:latin typeface="宋体" panose="02010600030101010101" pitchFamily="2" charset="-122"/>
+                <a:ea typeface="宋体" panose="02010600030101010101" pitchFamily="2" charset="-122"/>
+              </a:endParaRPr>
+            </a:p>
+          </p:txBody>
+        </p:sp>
+        <p:sp>
+          <p:nvSpPr>
+            <p:cNvPr id="5" name="文本框 4"/>
+            <p:cNvSpPr txBox="1"/>
+            <p:nvPr/>
+          </p:nvSpPr>
+          <p:spPr>
+            <a:xfrm>
+              <a:off x="3958046" y="522510"/>
+              <a:ext cx="1767841" cy="369332"/>
+            </a:xfrm>
+            <a:prstGeom prst="rect">
+              <a:avLst/>
+            </a:prstGeom>
+            <a:noFill/>
+          </p:spPr>
+          <p:txBody>
+            <a:bodyPr wrap="square" rtlCol="0">
+              <a:spAutoFit/>
+            </a:bodyPr>
+            <a:lstStyle/>
+            <a:p>
+              <a:pPr algn="ctr"/>
+              <a:r>
+                <a:rPr lang="zh-CN" altLang="en-US" dirty="0" smtClean="0">
+                  <a:latin typeface="宋体" panose="02010600030101010101" pitchFamily="2" charset="-122"/>
+                  <a:ea typeface="宋体" panose="02010600030101010101" pitchFamily="2" charset="-122"/>
+                </a:rPr>
+                <a:t>低建模精度</a:t>
+              </a:r>
+              <a:endParaRPr lang="zh-CN" altLang="en-US" dirty="0">
+                <a:latin typeface="宋体" panose="02010600030101010101" pitchFamily="2" charset="-122"/>
+                <a:ea typeface="宋体" panose="02010600030101010101" pitchFamily="2" charset="-122"/>
+              </a:endParaRPr>
+            </a:p>
+          </p:txBody>
+        </p:sp>
+        <p:sp>
+          <p:nvSpPr>
+            <p:cNvPr id="6" name="文本框 5"/>
+            <p:cNvSpPr txBox="1"/>
+            <p:nvPr/>
+          </p:nvSpPr>
+          <p:spPr>
+            <a:xfrm>
+              <a:off x="5725887" y="522510"/>
+              <a:ext cx="2085702" cy="369332"/>
+            </a:xfrm>
+            <a:prstGeom prst="rect">
+              <a:avLst/>
+            </a:prstGeom>
+            <a:noFill/>
+          </p:spPr>
+          <p:txBody>
+            <a:bodyPr wrap="square" rtlCol="0">
+              <a:spAutoFit/>
+            </a:bodyPr>
+            <a:lstStyle/>
+            <a:p>
+              <a:pPr algn="ctr"/>
+              <a:r>
+                <a:rPr lang="zh-CN" altLang="en-US" dirty="0" smtClean="0">
+                  <a:latin typeface="宋体" panose="02010600030101010101" pitchFamily="2" charset="-122"/>
+                  <a:ea typeface="宋体" panose="02010600030101010101" pitchFamily="2" charset="-122"/>
+                </a:rPr>
+                <a:t>无功调节手段丰富</a:t>
+              </a:r>
+              <a:endParaRPr lang="zh-CN" altLang="en-US" dirty="0">
+                <a:latin typeface="宋体" panose="02010600030101010101" pitchFamily="2" charset="-122"/>
+                <a:ea typeface="宋体" panose="02010600030101010101" pitchFamily="2" charset="-122"/>
+              </a:endParaRPr>
+            </a:p>
+          </p:txBody>
+        </p:sp>
+        <p:sp>
+          <p:nvSpPr>
+            <p:cNvPr id="7" name="矩形 6"/>
+            <p:cNvSpPr/>
+            <p:nvPr/>
+          </p:nvSpPr>
+          <p:spPr>
+            <a:xfrm>
+              <a:off x="822960" y="1158235"/>
+              <a:ext cx="1214846" cy="369332"/>
+            </a:xfrm>
+            <a:prstGeom prst="rect">
+              <a:avLst/>
+            </a:prstGeom>
+          </p:spPr>
+          <p:style>
+            <a:lnRef idx="2">
+              <a:schemeClr val="accent1">
+                <a:shade val="50000"/>
+              </a:schemeClr>
+            </a:lnRef>
+            <a:fillRef idx="1">
+              <a:schemeClr val="accent1"/>
+            </a:fillRef>
+            <a:effectRef idx="0">
+              <a:schemeClr val="accent1"/>
+            </a:effectRef>
+            <a:fontRef idx="minor">
+              <a:schemeClr val="lt1"/>
+            </a:fontRef>
+          </p:style>
+          <p:txBody>
+            <a:bodyPr rtlCol="0" anchor="ctr"/>
+            <a:lstStyle/>
+            <a:p>
+              <a:pPr algn="ctr"/>
+              <a:r>
+                <a:rPr lang="zh-CN" altLang="en-US" dirty="0" smtClean="0"/>
+                <a:t>调节设备</a:t>
+              </a:r>
+              <a:endParaRPr lang="zh-CN" altLang="en-US" dirty="0"/>
+            </a:p>
+          </p:txBody>
+        </p:sp>
+        <p:sp>
+          <p:nvSpPr>
+            <p:cNvPr id="8" name="文本框 7"/>
+            <p:cNvSpPr txBox="1"/>
+            <p:nvPr/>
+          </p:nvSpPr>
+          <p:spPr>
+            <a:xfrm>
+              <a:off x="2734491" y="1158235"/>
+              <a:ext cx="1767841" cy="646331"/>
+            </a:xfrm>
+            <a:prstGeom prst="rect">
+              <a:avLst/>
+            </a:prstGeom>
+            <a:noFill/>
+          </p:spPr>
+          <p:txBody>
+            <a:bodyPr wrap="square" rtlCol="0">
+              <a:spAutoFit/>
+            </a:bodyPr>
+            <a:lstStyle/>
+            <a:p>
+              <a:pPr algn="ctr"/>
+              <a:r>
+                <a:rPr lang="zh-CN" altLang="en-US" dirty="0" smtClean="0">
+                  <a:latin typeface="宋体" panose="02010600030101010101" pitchFamily="2" charset="-122"/>
+                  <a:ea typeface="宋体" panose="02010600030101010101" pitchFamily="2" charset="-122"/>
+                </a:rPr>
+                <a:t>连续动作设备</a:t>
+              </a:r>
+              <a:endParaRPr lang="en-US" altLang="zh-CN" dirty="0" smtClean="0">
+                <a:latin typeface="宋体" panose="02010600030101010101" pitchFamily="2" charset="-122"/>
+                <a:ea typeface="宋体" panose="02010600030101010101" pitchFamily="2" charset="-122"/>
+              </a:endParaRPr>
+            </a:p>
+            <a:p>
+              <a:pPr algn="ctr"/>
+              <a:r>
+                <a:rPr lang="en-US" altLang="zh-CN" dirty="0">
+                  <a:latin typeface="Times New Roman" panose="02020603050405020304" pitchFamily="18" charset="0"/>
+                  <a:ea typeface="宋体" panose="02010600030101010101" pitchFamily="2" charset="-122"/>
+                  <a:cs typeface="Times New Roman" panose="02020603050405020304" pitchFamily="18" charset="0"/>
+                </a:rPr>
+                <a:t>DG</a:t>
+              </a:r>
+              <a:endParaRPr lang="zh-CN" altLang="en-US" dirty="0">
+                <a:latin typeface="Times New Roman" panose="02020603050405020304" pitchFamily="18" charset="0"/>
+                <a:ea typeface="宋体" panose="02010600030101010101" pitchFamily="2" charset="-122"/>
+                <a:cs typeface="Times New Roman" panose="02020603050405020304" pitchFamily="18" charset="0"/>
+              </a:endParaRPr>
+            </a:p>
+          </p:txBody>
+        </p:sp>
+        <p:sp>
+          <p:nvSpPr>
+            <p:cNvPr id="9" name="文本框 8"/>
+            <p:cNvSpPr txBox="1"/>
+            <p:nvPr/>
+          </p:nvSpPr>
+          <p:spPr>
+            <a:xfrm>
+              <a:off x="5401490" y="1158235"/>
+              <a:ext cx="1767841" cy="646331"/>
+            </a:xfrm>
+            <a:prstGeom prst="rect">
+              <a:avLst/>
+            </a:prstGeom>
+            <a:noFill/>
+          </p:spPr>
+          <p:txBody>
+            <a:bodyPr wrap="square" rtlCol="0">
+              <a:spAutoFit/>
+            </a:bodyPr>
+            <a:lstStyle/>
+            <a:p>
+              <a:pPr algn="ctr"/>
+              <a:r>
+                <a:rPr lang="zh-CN" altLang="en-US" dirty="0" smtClean="0">
+                  <a:latin typeface="宋体" panose="02010600030101010101" pitchFamily="2" charset="-122"/>
+                  <a:ea typeface="宋体" panose="02010600030101010101" pitchFamily="2" charset="-122"/>
+                </a:rPr>
+                <a:t>离散动作设备</a:t>
+              </a:r>
+              <a:endParaRPr lang="en-US" altLang="zh-CN" dirty="0" smtClean="0">
+                <a:latin typeface="宋体" panose="02010600030101010101" pitchFamily="2" charset="-122"/>
+                <a:ea typeface="宋体" panose="02010600030101010101" pitchFamily="2" charset="-122"/>
+              </a:endParaRPr>
+            </a:p>
+            <a:p>
+              <a:pPr algn="ctr"/>
+              <a:r>
+                <a:rPr lang="en-US" altLang="zh-CN" dirty="0" smtClean="0">
+                  <a:latin typeface="Times New Roman" panose="02020603050405020304" pitchFamily="18" charset="0"/>
+                  <a:ea typeface="宋体" panose="02010600030101010101" pitchFamily="2" charset="-122"/>
+                  <a:cs typeface="Times New Roman" panose="02020603050405020304" pitchFamily="18" charset="0"/>
+                </a:rPr>
+                <a:t>SC</a:t>
+              </a:r>
+              <a:endParaRPr lang="zh-CN" altLang="en-US" dirty="0">
+                <a:latin typeface="Times New Roman" panose="02020603050405020304" pitchFamily="18" charset="0"/>
+                <a:ea typeface="宋体" panose="02010600030101010101" pitchFamily="2" charset="-122"/>
+                <a:cs typeface="Times New Roman" panose="02020603050405020304" pitchFamily="18" charset="0"/>
+              </a:endParaRPr>
+            </a:p>
+          </p:txBody>
+        </p:sp>
+        <p:sp>
+          <p:nvSpPr>
+            <p:cNvPr id="10" name="矩形 9"/>
+            <p:cNvSpPr/>
+            <p:nvPr/>
+          </p:nvSpPr>
+          <p:spPr>
+            <a:xfrm>
+              <a:off x="822960" y="2069174"/>
+              <a:ext cx="1214846" cy="369332"/>
+            </a:xfrm>
+            <a:prstGeom prst="rect">
+              <a:avLst/>
+            </a:prstGeom>
+          </p:spPr>
+          <p:style>
+            <a:lnRef idx="2">
+              <a:schemeClr val="accent1">
+                <a:shade val="50000"/>
+              </a:schemeClr>
+            </a:lnRef>
+            <a:fillRef idx="1">
+              <a:schemeClr val="accent1"/>
+            </a:fillRef>
+            <a:effectRef idx="0">
+              <a:schemeClr val="accent1"/>
+            </a:effectRef>
+            <a:fontRef idx="minor">
+              <a:schemeClr val="lt1"/>
+            </a:fontRef>
+          </p:style>
+          <p:txBody>
+            <a:bodyPr rtlCol="0" anchor="ctr"/>
+            <a:lstStyle/>
+            <a:p>
+              <a:pPr algn="ctr"/>
+              <a:r>
+                <a:rPr lang="zh-CN" altLang="en-US" dirty="0" smtClean="0"/>
+                <a:t>设备特点</a:t>
+              </a:r>
+              <a:endParaRPr lang="zh-CN" altLang="en-US" dirty="0"/>
+            </a:p>
+          </p:txBody>
+        </p:sp>
+        <p:sp>
+          <p:nvSpPr>
+            <p:cNvPr id="11" name="文本框 10"/>
+            <p:cNvSpPr txBox="1"/>
+            <p:nvPr/>
+          </p:nvSpPr>
+          <p:spPr>
+            <a:xfrm>
+              <a:off x="2752997" y="1848168"/>
+              <a:ext cx="1611086" cy="923330"/>
+            </a:xfrm>
+            <a:prstGeom prst="rect">
+              <a:avLst/>
+            </a:prstGeom>
+            <a:noFill/>
+          </p:spPr>
+          <p:txBody>
+            <a:bodyPr wrap="square" rtlCol="0">
+              <a:spAutoFit/>
+            </a:bodyPr>
+            <a:lstStyle/>
+            <a:p>
+              <a:pPr algn="ctr"/>
+              <a:r>
+                <a:rPr lang="zh-CN" altLang="en-US" dirty="0" smtClean="0">
+                  <a:latin typeface="宋体" panose="02010600030101010101" pitchFamily="2" charset="-122"/>
+                  <a:ea typeface="宋体" panose="02010600030101010101" pitchFamily="2" charset="-122"/>
+                </a:rPr>
+                <a:t>连续调节</a:t>
+              </a:r>
+              <a:endParaRPr lang="en-US" altLang="zh-CN" dirty="0" smtClean="0">
+                <a:latin typeface="宋体" panose="02010600030101010101" pitchFamily="2" charset="-122"/>
+                <a:ea typeface="宋体" panose="02010600030101010101" pitchFamily="2" charset="-122"/>
+              </a:endParaRPr>
+            </a:p>
+            <a:p>
+              <a:pPr algn="ctr"/>
+              <a:r>
+                <a:rPr lang="zh-CN" altLang="en-US" dirty="0" smtClean="0">
+                  <a:latin typeface="宋体" panose="02010600030101010101" pitchFamily="2" charset="-122"/>
+                  <a:ea typeface="宋体" panose="02010600030101010101" pitchFamily="2" charset="-122"/>
+                </a:rPr>
+                <a:t>忽略调节成本</a:t>
+              </a:r>
+              <a:endParaRPr lang="en-US" altLang="zh-CN" dirty="0" smtClean="0">
+                <a:latin typeface="宋体" panose="02010600030101010101" pitchFamily="2" charset="-122"/>
+                <a:ea typeface="宋体" panose="02010600030101010101" pitchFamily="2" charset="-122"/>
+              </a:endParaRPr>
+            </a:p>
+            <a:p>
+              <a:pPr algn="ctr"/>
+              <a:r>
+                <a:rPr lang="zh-CN" altLang="en-US" dirty="0" smtClean="0">
+                  <a:latin typeface="宋体" panose="02010600030101010101" pitchFamily="2" charset="-122"/>
+                  <a:ea typeface="宋体" panose="02010600030101010101" pitchFamily="2" charset="-122"/>
+                </a:rPr>
+                <a:t>动作周期短</a:t>
+              </a:r>
+              <a:endParaRPr lang="en-US" altLang="zh-CN" dirty="0" smtClean="0">
+                <a:latin typeface="宋体" panose="02010600030101010101" pitchFamily="2" charset="-122"/>
+                <a:ea typeface="宋体" panose="02010600030101010101" pitchFamily="2" charset="-122"/>
+              </a:endParaRPr>
+            </a:p>
+          </p:txBody>
+        </p:sp>
+        <p:cxnSp>
+          <p:nvCxnSpPr>
+            <p:cNvPr id="13" name="直接连接符 12"/>
+            <p:cNvCxnSpPr/>
+            <p:nvPr/>
+          </p:nvCxnSpPr>
+          <p:spPr>
+            <a:xfrm>
+              <a:off x="4937760" y="1158235"/>
+              <a:ext cx="26126" cy="3706001"/>
+            </a:xfrm>
+            <a:prstGeom prst="line">
+              <a:avLst/>
+            </a:prstGeom>
+          </p:spPr>
+          <p:style>
+            <a:lnRef idx="1">
+              <a:schemeClr val="accent1"/>
+            </a:lnRef>
+            <a:fillRef idx="0">
+              <a:schemeClr val="accent1"/>
+            </a:fillRef>
+            <a:effectRef idx="0">
+              <a:schemeClr val="accent1"/>
+            </a:effectRef>
+            <a:fontRef idx="minor">
+              <a:schemeClr val="tx1"/>
+            </a:fontRef>
+          </p:style>
+        </p:cxnSp>
+        <p:sp>
+          <p:nvSpPr>
+            <p:cNvPr id="14" name="文本框 13"/>
+            <p:cNvSpPr txBox="1"/>
+            <p:nvPr/>
+          </p:nvSpPr>
+          <p:spPr>
+            <a:xfrm>
+              <a:off x="5511438" y="1849061"/>
+              <a:ext cx="1611086" cy="923330"/>
+            </a:xfrm>
+            <a:prstGeom prst="rect">
+              <a:avLst/>
+            </a:prstGeom>
+            <a:noFill/>
+          </p:spPr>
+          <p:txBody>
+            <a:bodyPr wrap="square" rtlCol="0">
+              <a:spAutoFit/>
+            </a:bodyPr>
+            <a:lstStyle/>
+            <a:p>
+              <a:pPr algn="ctr"/>
+              <a:r>
+                <a:rPr lang="zh-CN" altLang="en-US" dirty="0" smtClean="0">
+                  <a:latin typeface="宋体" panose="02010600030101010101" pitchFamily="2" charset="-122"/>
+                  <a:ea typeface="宋体" panose="02010600030101010101" pitchFamily="2" charset="-122"/>
+                </a:rPr>
+                <a:t>调节次数约束</a:t>
+              </a:r>
+              <a:endParaRPr lang="en-US" altLang="zh-CN" dirty="0" smtClean="0">
+                <a:latin typeface="宋体" panose="02010600030101010101" pitchFamily="2" charset="-122"/>
+                <a:ea typeface="宋体" panose="02010600030101010101" pitchFamily="2" charset="-122"/>
+              </a:endParaRPr>
+            </a:p>
+            <a:p>
+              <a:pPr algn="ctr"/>
+              <a:r>
+                <a:rPr lang="zh-CN" altLang="en-US" dirty="0" smtClean="0">
+                  <a:latin typeface="宋体" panose="02010600030101010101" pitchFamily="2" charset="-122"/>
+                  <a:ea typeface="宋体" panose="02010600030101010101" pitchFamily="2" charset="-122"/>
+                </a:rPr>
+                <a:t>调节成本高</a:t>
+              </a:r>
+              <a:endParaRPr lang="en-US" altLang="zh-CN" dirty="0" smtClean="0">
+                <a:latin typeface="宋体" panose="02010600030101010101" pitchFamily="2" charset="-122"/>
+                <a:ea typeface="宋体" panose="02010600030101010101" pitchFamily="2" charset="-122"/>
+              </a:endParaRPr>
+            </a:p>
+            <a:p>
+              <a:pPr algn="ctr"/>
+              <a:r>
+                <a:rPr lang="zh-CN" altLang="en-US" dirty="0">
+                  <a:latin typeface="宋体" panose="02010600030101010101" pitchFamily="2" charset="-122"/>
+                  <a:ea typeface="宋体" panose="02010600030101010101" pitchFamily="2" charset="-122"/>
+                </a:rPr>
+                <a:t>动作</a:t>
+              </a:r>
+              <a:r>
+                <a:rPr lang="zh-CN" altLang="en-US" dirty="0" smtClean="0">
+                  <a:latin typeface="宋体" panose="02010600030101010101" pitchFamily="2" charset="-122"/>
+                  <a:ea typeface="宋体" panose="02010600030101010101" pitchFamily="2" charset="-122"/>
+                </a:rPr>
+                <a:t>周期长</a:t>
+              </a:r>
+              <a:endParaRPr lang="zh-CN" altLang="en-US" dirty="0">
+                <a:latin typeface="宋体" panose="02010600030101010101" pitchFamily="2" charset="-122"/>
+                <a:ea typeface="宋体" panose="02010600030101010101" pitchFamily="2" charset="-122"/>
+              </a:endParaRPr>
+            </a:p>
+          </p:txBody>
+        </p:sp>
+        <p:sp>
+          <p:nvSpPr>
+            <p:cNvPr id="17" name="矩形 16"/>
+            <p:cNvSpPr/>
+            <p:nvPr/>
+          </p:nvSpPr>
+          <p:spPr>
+            <a:xfrm>
+              <a:off x="822960" y="3527527"/>
+              <a:ext cx="1214846" cy="369332"/>
+            </a:xfrm>
+            <a:prstGeom prst="rect">
+              <a:avLst/>
+            </a:prstGeom>
+          </p:spPr>
+          <p:style>
+            <a:lnRef idx="2">
+              <a:schemeClr val="accent1">
+                <a:shade val="50000"/>
+              </a:schemeClr>
+            </a:lnRef>
+            <a:fillRef idx="1">
+              <a:schemeClr val="accent1"/>
+            </a:fillRef>
+            <a:effectRef idx="0">
+              <a:schemeClr val="accent1"/>
+            </a:effectRef>
+            <a:fontRef idx="minor">
+              <a:schemeClr val="lt1"/>
+            </a:fontRef>
+          </p:style>
+          <p:txBody>
+            <a:bodyPr rtlCol="0" anchor="ctr"/>
+            <a:lstStyle/>
+            <a:p>
+              <a:pPr algn="ctr"/>
+              <a:r>
+                <a:rPr lang="zh-CN" altLang="en-US" dirty="0" smtClean="0"/>
+                <a:t>优化目标</a:t>
+              </a:r>
+              <a:endParaRPr lang="zh-CN" altLang="en-US" dirty="0"/>
+            </a:p>
+          </p:txBody>
+        </p:sp>
+        <p:sp>
+          <p:nvSpPr>
+            <p:cNvPr id="18" name="文本框 17"/>
+            <p:cNvSpPr txBox="1"/>
+            <p:nvPr/>
+          </p:nvSpPr>
+          <p:spPr>
+            <a:xfrm>
+              <a:off x="2645771" y="3527527"/>
+              <a:ext cx="1767841" cy="369332"/>
+            </a:xfrm>
+            <a:prstGeom prst="rect">
+              <a:avLst/>
+            </a:prstGeom>
+            <a:noFill/>
+          </p:spPr>
+          <p:txBody>
+            <a:bodyPr wrap="square" rtlCol="0">
+              <a:spAutoFit/>
+            </a:bodyPr>
+            <a:lstStyle/>
+            <a:p>
+              <a:pPr algn="ctr"/>
+              <a:r>
+                <a:rPr lang="zh-CN" altLang="en-US" dirty="0" smtClean="0">
+                  <a:latin typeface="宋体" panose="02010600030101010101" pitchFamily="2" charset="-122"/>
+                  <a:ea typeface="宋体" panose="02010600030101010101" pitchFamily="2" charset="-122"/>
+                </a:rPr>
+                <a:t>节点电压</a:t>
+              </a:r>
+              <a:endParaRPr lang="zh-CN" altLang="en-US" dirty="0">
+                <a:latin typeface="宋体" panose="02010600030101010101" pitchFamily="2" charset="-122"/>
+                <a:ea typeface="宋体" panose="02010600030101010101" pitchFamily="2" charset="-122"/>
+              </a:endParaRPr>
+            </a:p>
+          </p:txBody>
+        </p:sp>
+        <p:sp>
+          <p:nvSpPr>
+            <p:cNvPr id="20" name="文本框 19"/>
+            <p:cNvSpPr txBox="1"/>
+            <p:nvPr/>
+          </p:nvSpPr>
+          <p:spPr>
+            <a:xfrm>
+              <a:off x="5207181" y="3533894"/>
+              <a:ext cx="2161904" cy="369332"/>
+            </a:xfrm>
+            <a:prstGeom prst="rect">
+              <a:avLst/>
+            </a:prstGeom>
+            <a:noFill/>
+          </p:spPr>
+          <p:txBody>
+            <a:bodyPr wrap="square" rtlCol="0">
+              <a:spAutoFit/>
+            </a:bodyPr>
+            <a:lstStyle/>
+            <a:p>
+              <a:pPr algn="ctr"/>
+              <a:r>
+                <a:rPr lang="zh-CN" altLang="en-US" dirty="0" smtClean="0">
+                  <a:latin typeface="宋体" panose="02010600030101010101" pitchFamily="2" charset="-122"/>
+                  <a:ea typeface="宋体" panose="02010600030101010101" pitchFamily="2" charset="-122"/>
+                </a:rPr>
+                <a:t>系统网损</a:t>
+              </a:r>
+              <a:r>
+                <a:rPr lang="en-US" altLang="zh-CN" dirty="0" smtClean="0">
+                  <a:latin typeface="宋体" panose="02010600030101010101" pitchFamily="2" charset="-122"/>
+                  <a:ea typeface="宋体" panose="02010600030101010101" pitchFamily="2" charset="-122"/>
+                </a:rPr>
+                <a:t>+</a:t>
+              </a:r>
+              <a:r>
+                <a:rPr lang="zh-CN" altLang="en-US" dirty="0" smtClean="0">
+                  <a:latin typeface="宋体" panose="02010600030101010101" pitchFamily="2" charset="-122"/>
+                  <a:ea typeface="宋体" panose="02010600030101010101" pitchFamily="2" charset="-122"/>
+                </a:rPr>
+                <a:t>动作成本</a:t>
+              </a:r>
+              <a:endParaRPr lang="en-US" altLang="zh-CN" dirty="0" smtClean="0">
+                <a:latin typeface="宋体" panose="02010600030101010101" pitchFamily="2" charset="-122"/>
+                <a:ea typeface="宋体" panose="02010600030101010101" pitchFamily="2" charset="-122"/>
+              </a:endParaRPr>
+            </a:p>
+          </p:txBody>
+        </p:sp>
+        <p:sp>
+          <p:nvSpPr>
+            <p:cNvPr id="21" name="矩形 20"/>
+            <p:cNvSpPr/>
+            <p:nvPr/>
+          </p:nvSpPr>
+          <p:spPr>
+            <a:xfrm>
+              <a:off x="822960" y="2903107"/>
+              <a:ext cx="1214846" cy="369332"/>
+            </a:xfrm>
+            <a:prstGeom prst="rect">
+              <a:avLst/>
+            </a:prstGeom>
+          </p:spPr>
+          <p:style>
+            <a:lnRef idx="2">
+              <a:schemeClr val="accent1">
+                <a:shade val="50000"/>
+              </a:schemeClr>
+            </a:lnRef>
+            <a:fillRef idx="1">
+              <a:schemeClr val="accent1"/>
+            </a:fillRef>
+            <a:effectRef idx="0">
+              <a:schemeClr val="accent1"/>
+            </a:effectRef>
+            <a:fontRef idx="minor">
+              <a:schemeClr val="lt1"/>
+            </a:fontRef>
+          </p:style>
+          <p:txBody>
+            <a:bodyPr rtlCol="0" anchor="ctr"/>
+            <a:lstStyle/>
+            <a:p>
+              <a:pPr algn="ctr"/>
+              <a:r>
+                <a:rPr lang="zh-CN" altLang="en-US" dirty="0" smtClean="0"/>
+                <a:t>时间维度</a:t>
+              </a:r>
+              <a:endParaRPr lang="zh-CN" altLang="en-US" dirty="0"/>
+            </a:p>
+          </p:txBody>
+        </p:sp>
+        <p:sp>
+          <p:nvSpPr>
+            <p:cNvPr id="22" name="文本框 21"/>
+            <p:cNvSpPr txBox="1"/>
+            <p:nvPr/>
+          </p:nvSpPr>
+          <p:spPr>
+            <a:xfrm>
+              <a:off x="2674619" y="2904677"/>
+              <a:ext cx="1767841" cy="369332"/>
+            </a:xfrm>
+            <a:prstGeom prst="rect">
+              <a:avLst/>
+            </a:prstGeom>
+            <a:noFill/>
+          </p:spPr>
+          <p:txBody>
+            <a:bodyPr wrap="square" rtlCol="0">
+              <a:spAutoFit/>
+            </a:bodyPr>
+            <a:lstStyle/>
+            <a:p>
+              <a:pPr algn="ctr"/>
+              <a:r>
+                <a:rPr lang="zh-CN" altLang="en-US" dirty="0" smtClean="0">
+                  <a:latin typeface="宋体" panose="02010600030101010101" pitchFamily="2" charset="-122"/>
+                  <a:ea typeface="宋体" panose="02010600030101010101" pitchFamily="2" charset="-122"/>
+                </a:rPr>
+                <a:t>单时间断面</a:t>
+              </a:r>
+              <a:endParaRPr lang="en-US" altLang="zh-CN" dirty="0" smtClean="0">
+                <a:latin typeface="宋体" panose="02010600030101010101" pitchFamily="2" charset="-122"/>
+                <a:ea typeface="宋体" panose="02010600030101010101" pitchFamily="2" charset="-122"/>
+              </a:endParaRPr>
+            </a:p>
+          </p:txBody>
+        </p:sp>
+        <p:sp>
+          <p:nvSpPr>
+            <p:cNvPr id="23" name="文本框 22"/>
+            <p:cNvSpPr txBox="1"/>
+            <p:nvPr/>
+          </p:nvSpPr>
+          <p:spPr>
+            <a:xfrm>
+              <a:off x="5264877" y="2900492"/>
+              <a:ext cx="2104208" cy="369332"/>
+            </a:xfrm>
+            <a:prstGeom prst="rect">
+              <a:avLst/>
+            </a:prstGeom>
+            <a:noFill/>
+          </p:spPr>
+          <p:txBody>
+            <a:bodyPr wrap="square" rtlCol="0">
+              <a:spAutoFit/>
+            </a:bodyPr>
+            <a:lstStyle/>
+            <a:p>
+              <a:pPr algn="ctr"/>
+              <a:r>
+                <a:rPr lang="zh-CN" altLang="en-US" dirty="0" smtClean="0">
+                  <a:latin typeface="宋体" panose="02010600030101010101" pitchFamily="2" charset="-122"/>
+                  <a:ea typeface="宋体" panose="02010600030101010101" pitchFamily="2" charset="-122"/>
+                </a:rPr>
+                <a:t>多时间断面</a:t>
+              </a:r>
+              <a:endParaRPr lang="en-US" altLang="zh-CN" dirty="0" smtClean="0">
+                <a:latin typeface="宋体" panose="02010600030101010101" pitchFamily="2" charset="-122"/>
+                <a:ea typeface="宋体" panose="02010600030101010101" pitchFamily="2" charset="-122"/>
+              </a:endParaRPr>
+            </a:p>
+          </p:txBody>
+        </p:sp>
+        <p:sp>
+          <p:nvSpPr>
+            <p:cNvPr id="25" name="矩形 24"/>
+            <p:cNvSpPr/>
+            <p:nvPr/>
+          </p:nvSpPr>
+          <p:spPr>
+            <a:xfrm>
+              <a:off x="822960" y="4263848"/>
+              <a:ext cx="1214846" cy="369332"/>
+            </a:xfrm>
+            <a:prstGeom prst="rect">
+              <a:avLst/>
+            </a:prstGeom>
+          </p:spPr>
+          <p:style>
+            <a:lnRef idx="2">
+              <a:schemeClr val="accent1">
+                <a:shade val="50000"/>
+              </a:schemeClr>
+            </a:lnRef>
+            <a:fillRef idx="1">
+              <a:schemeClr val="accent1"/>
+            </a:fillRef>
+            <a:effectRef idx="0">
+              <a:schemeClr val="accent1"/>
+            </a:effectRef>
+            <a:fontRef idx="minor">
+              <a:schemeClr val="lt1"/>
+            </a:fontRef>
+          </p:style>
+          <p:txBody>
+            <a:bodyPr rtlCol="0" anchor="ctr"/>
+            <a:lstStyle/>
+            <a:p>
+              <a:pPr algn="ctr"/>
+              <a:r>
+                <a:rPr lang="zh-CN" altLang="en-US" dirty="0" smtClean="0"/>
+                <a:t>作用</a:t>
+              </a:r>
+              <a:endParaRPr lang="zh-CN" altLang="en-US" dirty="0"/>
+            </a:p>
+          </p:txBody>
+        </p:sp>
+        <p:sp>
+          <p:nvSpPr>
+            <p:cNvPr id="27" name="文本框 26"/>
+            <p:cNvSpPr txBox="1"/>
+            <p:nvPr/>
+          </p:nvSpPr>
+          <p:spPr>
+            <a:xfrm>
+              <a:off x="5188678" y="4263848"/>
+              <a:ext cx="2389957" cy="646331"/>
+            </a:xfrm>
+            <a:prstGeom prst="rect">
+              <a:avLst/>
+            </a:prstGeom>
+            <a:noFill/>
+          </p:spPr>
+          <p:txBody>
+            <a:bodyPr wrap="square" rtlCol="0">
+              <a:spAutoFit/>
+            </a:bodyPr>
+            <a:lstStyle/>
+            <a:p>
+              <a:pPr algn="ctr"/>
+              <a:r>
+                <a:rPr lang="zh-CN" altLang="en-US" dirty="0" smtClean="0">
+                  <a:latin typeface="宋体" panose="02010600030101010101" pitchFamily="2" charset="-122"/>
+                  <a:ea typeface="宋体" panose="02010600030101010101" pitchFamily="2" charset="-122"/>
+                </a:rPr>
+                <a:t>决定系统运行基础运行状态</a:t>
+              </a:r>
+              <a:endParaRPr lang="en-US" altLang="zh-CN" dirty="0" smtClean="0">
+                <a:latin typeface="宋体" panose="02010600030101010101" pitchFamily="2" charset="-122"/>
+                <a:ea typeface="宋体" panose="02010600030101010101" pitchFamily="2" charset="-122"/>
+              </a:endParaRPr>
+            </a:p>
+          </p:txBody>
+        </p:sp>
+        <p:sp>
+          <p:nvSpPr>
+            <p:cNvPr id="28" name="文本框 27"/>
+            <p:cNvSpPr txBox="1"/>
+            <p:nvPr/>
+          </p:nvSpPr>
+          <p:spPr>
+            <a:xfrm>
+              <a:off x="2242593" y="4217905"/>
+              <a:ext cx="2574335" cy="646331"/>
+            </a:xfrm>
+            <a:prstGeom prst="rect">
+              <a:avLst/>
+            </a:prstGeom>
+            <a:noFill/>
+          </p:spPr>
+          <p:txBody>
+            <a:bodyPr wrap="square" rtlCol="0">
+              <a:spAutoFit/>
+            </a:bodyPr>
+            <a:lstStyle/>
+            <a:p>
+              <a:pPr algn="ctr"/>
+              <a:r>
+                <a:rPr lang="zh-CN" altLang="en-US" dirty="0">
+                  <a:latin typeface="宋体" panose="02010600030101010101" pitchFamily="2" charset="-122"/>
+                  <a:ea typeface="宋体" panose="02010600030101010101" pitchFamily="2" charset="-122"/>
+                </a:rPr>
+                <a:t>在</a:t>
+              </a:r>
+              <a:r>
+                <a:rPr lang="zh-CN" altLang="en-US" dirty="0" smtClean="0">
+                  <a:latin typeface="宋体" panose="02010600030101010101" pitchFamily="2" charset="-122"/>
+                  <a:ea typeface="宋体" panose="02010600030101010101" pitchFamily="2" charset="-122"/>
+                </a:rPr>
+                <a:t>基态上实时优化系统稳定性与经济性</a:t>
+              </a:r>
+              <a:endParaRPr lang="en-US" altLang="zh-CN" dirty="0" smtClean="0">
+                <a:latin typeface="宋体" panose="02010600030101010101" pitchFamily="2" charset="-122"/>
+                <a:ea typeface="宋体" panose="02010600030101010101" pitchFamily="2" charset="-122"/>
+              </a:endParaRPr>
+            </a:p>
+          </p:txBody>
+        </p:sp>
+        <p:sp>
+          <p:nvSpPr>
+            <p:cNvPr id="29" name="矩形 28"/>
+            <p:cNvSpPr/>
+            <p:nvPr/>
+          </p:nvSpPr>
+          <p:spPr>
+            <a:xfrm>
+              <a:off x="822960" y="4945059"/>
+              <a:ext cx="1214846" cy="369332"/>
+            </a:xfrm>
+            <a:prstGeom prst="rect">
+              <a:avLst/>
+            </a:prstGeom>
+          </p:spPr>
+          <p:style>
+            <a:lnRef idx="2">
+              <a:schemeClr val="accent1">
+                <a:shade val="50000"/>
+              </a:schemeClr>
+            </a:lnRef>
+            <a:fillRef idx="1">
+              <a:schemeClr val="accent1"/>
+            </a:fillRef>
+            <a:effectRef idx="0">
+              <a:schemeClr val="accent1"/>
+            </a:effectRef>
+            <a:fontRef idx="minor">
+              <a:schemeClr val="lt1"/>
+            </a:fontRef>
+          </p:style>
+          <p:txBody>
+            <a:bodyPr rtlCol="0" anchor="ctr"/>
+            <a:lstStyle/>
+            <a:p>
+              <a:pPr algn="ctr"/>
+              <a:r>
+                <a:rPr lang="zh-CN" altLang="en-US" dirty="0" smtClean="0"/>
+                <a:t>难点</a:t>
+              </a:r>
+              <a:endParaRPr lang="zh-CN" altLang="en-US" dirty="0"/>
+            </a:p>
+          </p:txBody>
+        </p:sp>
+        <p:sp>
+          <p:nvSpPr>
+            <p:cNvPr id="30" name="文本框 29"/>
+            <p:cNvSpPr txBox="1"/>
+            <p:nvPr/>
+          </p:nvSpPr>
+          <p:spPr>
+            <a:xfrm>
+              <a:off x="2455000" y="4977878"/>
+              <a:ext cx="5123635" cy="369332"/>
+            </a:xfrm>
+            <a:prstGeom prst="rect">
+              <a:avLst/>
+            </a:prstGeom>
+            <a:noFill/>
+          </p:spPr>
+          <p:txBody>
+            <a:bodyPr wrap="square" rtlCol="0">
+              <a:spAutoFit/>
+            </a:bodyPr>
+            <a:lstStyle/>
+            <a:p>
+              <a:pPr algn="ctr"/>
+              <a:r>
+                <a:rPr lang="zh-CN" altLang="en-US" dirty="0" smtClean="0">
+                  <a:latin typeface="宋体" panose="02010600030101010101" pitchFamily="2" charset="-122"/>
+                  <a:ea typeface="宋体" panose="02010600030101010101" pitchFamily="2" charset="-122"/>
+                </a:rPr>
+                <a:t>依赖于潮流模型的方法难以有效应用</a:t>
+              </a:r>
+              <a:endParaRPr lang="zh-CN" altLang="en-US" dirty="0">
+                <a:latin typeface="宋体" panose="02010600030101010101" pitchFamily="2" charset="-122"/>
+                <a:ea typeface="宋体" panose="02010600030101010101" pitchFamily="2" charset="-122"/>
+              </a:endParaRPr>
+            </a:p>
+          </p:txBody>
+        </p:sp>
+        <p:sp>
+          <p:nvSpPr>
+            <p:cNvPr id="32" name="矩形 31"/>
+            <p:cNvSpPr/>
+            <p:nvPr/>
+          </p:nvSpPr>
+          <p:spPr>
+            <a:xfrm>
+              <a:off x="822960" y="5889309"/>
+              <a:ext cx="1214846" cy="369332"/>
+            </a:xfrm>
+            <a:prstGeom prst="rect">
+              <a:avLst/>
+            </a:prstGeom>
+          </p:spPr>
+          <p:style>
+            <a:lnRef idx="2">
+              <a:schemeClr val="accent1">
+                <a:shade val="50000"/>
+              </a:schemeClr>
+            </a:lnRef>
+            <a:fillRef idx="1">
+              <a:schemeClr val="accent1"/>
+            </a:fillRef>
+            <a:effectRef idx="0">
+              <a:schemeClr val="accent1"/>
+            </a:effectRef>
+            <a:fontRef idx="minor">
+              <a:schemeClr val="lt1"/>
+            </a:fontRef>
+          </p:style>
+          <p:txBody>
+            <a:bodyPr rtlCol="0" anchor="ctr"/>
+            <a:lstStyle/>
+            <a:p>
+              <a:pPr algn="ctr"/>
+              <a:r>
+                <a:rPr lang="zh-CN" altLang="en-US" dirty="0" smtClean="0"/>
+                <a:t>研究内容</a:t>
+              </a:r>
+              <a:endParaRPr lang="zh-CN" altLang="en-US" dirty="0"/>
+            </a:p>
+          </p:txBody>
+        </p:sp>
+        <p:sp>
+          <p:nvSpPr>
+            <p:cNvPr id="34" name="任意多边形 33"/>
+            <p:cNvSpPr/>
+            <p:nvPr/>
+          </p:nvSpPr>
+          <p:spPr>
+            <a:xfrm rot="304633">
+              <a:off x="7486406" y="930205"/>
+              <a:ext cx="1059666" cy="4345822"/>
+            </a:xfrm>
+            <a:custGeom>
+              <a:avLst/>
+              <a:gdLst>
+                <a:gd name="connsiteX0" fmla="*/ 144379 w 1059666"/>
+                <a:gd name="connsiteY0" fmla="*/ 0 h 4475747"/>
+                <a:gd name="connsiteX1" fmla="*/ 1058779 w 1059666"/>
+                <a:gd name="connsiteY1" fmla="*/ 2326105 h 4475747"/>
+                <a:gd name="connsiteX2" fmla="*/ 0 w 1059666"/>
+                <a:gd name="connsiteY2" fmla="*/ 4475747 h 4475747"/>
+              </a:gdLst>
+              <a:ahLst/>
+              <a:cxnLst>
+                <a:cxn ang="0">
+                  <a:pos x="connsiteX0" y="connsiteY0"/>
+                </a:cxn>
+                <a:cxn ang="0">
+                  <a:pos x="connsiteX1" y="connsiteY1"/>
+                </a:cxn>
+                <a:cxn ang="0">
+                  <a:pos x="connsiteX2" y="connsiteY2"/>
+                </a:cxn>
+              </a:cxnLst>
+              <a:rect l="l" t="t" r="r" b="b"/>
+              <a:pathLst>
+                <a:path w="1059666" h="4475747">
+                  <a:moveTo>
+                    <a:pt x="144379" y="0"/>
+                  </a:moveTo>
+                  <a:cubicBezTo>
+                    <a:pt x="613610" y="790073"/>
+                    <a:pt x="1082842" y="1580147"/>
+                    <a:pt x="1058779" y="2326105"/>
+                  </a:cubicBezTo>
+                  <a:cubicBezTo>
+                    <a:pt x="1034716" y="3072063"/>
+                    <a:pt x="517358" y="3773905"/>
+                    <a:pt x="0" y="4475747"/>
+                  </a:cubicBezTo>
+                </a:path>
+              </a:pathLst>
+            </a:custGeom>
+            <a:ln>
+              <a:headEnd type="none" w="med" len="med"/>
+              <a:tailEnd type="arrow" w="med" len="med"/>
+            </a:ln>
+          </p:spPr>
+          <p:style>
+            <a:lnRef idx="1">
+              <a:schemeClr val="dk1"/>
+            </a:lnRef>
+            <a:fillRef idx="0">
+              <a:schemeClr val="dk1"/>
+            </a:fillRef>
+            <a:effectRef idx="0">
+              <a:schemeClr val="dk1"/>
+            </a:effectRef>
+            <a:fontRef idx="minor">
+              <a:schemeClr val="tx1"/>
+            </a:fontRef>
+          </p:style>
+          <p:txBody>
+            <a:bodyPr rtlCol="0" anchor="ctr"/>
+            <a:lstStyle/>
+            <a:p>
+              <a:pPr algn="ctr"/>
+              <a:endParaRPr lang="zh-CN" altLang="en-US"/>
+            </a:p>
+          </p:txBody>
+        </p:sp>
+        <p:sp>
+          <p:nvSpPr>
+            <p:cNvPr id="35" name="文本框 34"/>
+            <p:cNvSpPr txBox="1"/>
+            <p:nvPr/>
+          </p:nvSpPr>
+          <p:spPr>
+            <a:xfrm>
+              <a:off x="2159995" y="5489200"/>
+              <a:ext cx="2739391" cy="584775"/>
+            </a:xfrm>
+            <a:prstGeom prst="rect">
+              <a:avLst/>
+            </a:prstGeom>
+            <a:noFill/>
+            <a:ln>
+              <a:solidFill>
+                <a:schemeClr val="tx1"/>
+              </a:solidFill>
+            </a:ln>
+          </p:spPr>
+          <p:txBody>
+            <a:bodyPr wrap="square" rtlCol="0">
+              <a:spAutoFit/>
+            </a:bodyPr>
+            <a:lstStyle/>
+            <a:p>
+              <a:pPr algn="ctr"/>
+              <a:r>
+                <a:rPr lang="zh-CN" altLang="en-US" sz="1600" dirty="0" smtClean="0">
+                  <a:latin typeface="宋体" panose="02010600030101010101" pitchFamily="2" charset="-122"/>
+                  <a:ea typeface="宋体" panose="02010600030101010101" pitchFamily="2" charset="-122"/>
+                </a:rPr>
+                <a:t>基于深度卷积神经网络的</a:t>
+              </a:r>
+              <a:endParaRPr lang="en-US" altLang="zh-CN" sz="1600" dirty="0" smtClean="0">
+                <a:latin typeface="宋体" panose="02010600030101010101" pitchFamily="2" charset="-122"/>
+                <a:ea typeface="宋体" panose="02010600030101010101" pitchFamily="2" charset="-122"/>
+              </a:endParaRPr>
+            </a:p>
+            <a:p>
+              <a:pPr algn="ctr"/>
+              <a:r>
+                <a:rPr lang="zh-CN" altLang="en-US" sz="1600" dirty="0" smtClean="0">
+                  <a:solidFill>
+                    <a:srgbClr val="FF0000"/>
+                  </a:solidFill>
+                  <a:latin typeface="宋体" panose="02010600030101010101" pitchFamily="2" charset="-122"/>
+                  <a:ea typeface="宋体" panose="02010600030101010101" pitchFamily="2" charset="-122"/>
+                </a:rPr>
+                <a:t>节点电压拟合</a:t>
+              </a:r>
+              <a:endParaRPr lang="en-US" altLang="zh-CN" sz="1600" dirty="0" smtClean="0">
+                <a:solidFill>
+                  <a:srgbClr val="FF0000"/>
+                </a:solidFill>
+                <a:latin typeface="宋体" panose="02010600030101010101" pitchFamily="2" charset="-122"/>
+                <a:ea typeface="宋体" panose="02010600030101010101" pitchFamily="2" charset="-122"/>
+              </a:endParaRPr>
+            </a:p>
+          </p:txBody>
+        </p:sp>
+        <p:sp>
+          <p:nvSpPr>
+            <p:cNvPr id="36" name="任意多边形 35"/>
+            <p:cNvSpPr/>
+            <p:nvPr/>
+          </p:nvSpPr>
+          <p:spPr>
+            <a:xfrm>
+              <a:off x="3990702" y="3930692"/>
+              <a:ext cx="1894115" cy="274429"/>
+            </a:xfrm>
+            <a:custGeom>
+              <a:avLst/>
+              <a:gdLst>
+                <a:gd name="connsiteX0" fmla="*/ 0 w 1894115"/>
+                <a:gd name="connsiteY0" fmla="*/ 248303 h 274429"/>
+                <a:gd name="connsiteX1" fmla="*/ 901337 w 1894115"/>
+                <a:gd name="connsiteY1" fmla="*/ 109 h 274429"/>
+                <a:gd name="connsiteX2" fmla="*/ 1894115 w 1894115"/>
+                <a:gd name="connsiteY2" fmla="*/ 274429 h 274429"/>
+              </a:gdLst>
+              <a:ahLst/>
+              <a:cxnLst>
+                <a:cxn ang="0">
+                  <a:pos x="connsiteX0" y="connsiteY0"/>
+                </a:cxn>
+                <a:cxn ang="0">
+                  <a:pos x="connsiteX1" y="connsiteY1"/>
+                </a:cxn>
+                <a:cxn ang="0">
+                  <a:pos x="connsiteX2" y="connsiteY2"/>
+                </a:cxn>
+              </a:cxnLst>
+              <a:rect l="l" t="t" r="r" b="b"/>
+              <a:pathLst>
+                <a:path w="1894115" h="274429">
+                  <a:moveTo>
+                    <a:pt x="0" y="248303"/>
+                  </a:moveTo>
+                  <a:cubicBezTo>
+                    <a:pt x="292825" y="122029"/>
+                    <a:pt x="585651" y="-4245"/>
+                    <a:pt x="901337" y="109"/>
+                  </a:cubicBezTo>
+                  <a:cubicBezTo>
+                    <a:pt x="1217023" y="4463"/>
+                    <a:pt x="1706881" y="189521"/>
+                    <a:pt x="1894115" y="274429"/>
+                  </a:cubicBezTo>
+                </a:path>
+              </a:pathLst>
+            </a:custGeom>
+            <a:ln w="12700">
+              <a:prstDash val="dash"/>
+              <a:headEnd type="arrow" w="med" len="med"/>
+              <a:tailEnd type="arrow" w="med" len="med"/>
+            </a:ln>
+          </p:spPr>
+          <p:style>
+            <a:lnRef idx="1">
+              <a:schemeClr val="dk1"/>
+            </a:lnRef>
+            <a:fillRef idx="0">
+              <a:schemeClr val="dk1"/>
+            </a:fillRef>
+            <a:effectRef idx="0">
+              <a:schemeClr val="dk1"/>
+            </a:effectRef>
+            <a:fontRef idx="minor">
+              <a:schemeClr val="tx1"/>
+            </a:fontRef>
+          </p:style>
+          <p:txBody>
+            <a:bodyPr rtlCol="0" anchor="ctr"/>
+            <a:lstStyle/>
+            <a:p>
+              <a:pPr algn="ctr"/>
+              <a:endParaRPr lang="zh-CN" altLang="en-US"/>
+            </a:p>
+          </p:txBody>
+        </p:sp>
+        <p:sp>
+          <p:nvSpPr>
+            <p:cNvPr id="37" name="文本框 36"/>
+            <p:cNvSpPr txBox="1"/>
+            <p:nvPr/>
+          </p:nvSpPr>
+          <p:spPr>
+            <a:xfrm>
+              <a:off x="4223112" y="3547514"/>
+              <a:ext cx="1187631" cy="369332"/>
+            </a:xfrm>
+            <a:prstGeom prst="rect">
+              <a:avLst/>
+            </a:prstGeom>
+            <a:noFill/>
+          </p:spPr>
+          <p:txBody>
+            <a:bodyPr wrap="square" rtlCol="0">
+              <a:spAutoFit/>
+            </a:bodyPr>
+            <a:lstStyle/>
+            <a:p>
+              <a:r>
+                <a:rPr lang="zh-CN" altLang="en-US" b="1" dirty="0" smtClean="0">
+                  <a:latin typeface="宋体" panose="02010600030101010101" pitchFamily="2" charset="-122"/>
+                  <a:ea typeface="宋体" panose="02010600030101010101" pitchFamily="2" charset="-122"/>
+                </a:rPr>
+                <a:t>相互协调</a:t>
+              </a:r>
+              <a:endParaRPr lang="zh-CN" altLang="en-US" b="1" dirty="0">
+                <a:latin typeface="宋体" panose="02010600030101010101" pitchFamily="2" charset="-122"/>
+                <a:ea typeface="宋体" panose="02010600030101010101" pitchFamily="2" charset="-122"/>
+              </a:endParaRPr>
+            </a:p>
+          </p:txBody>
+        </p:sp>
+        <p:sp>
+          <p:nvSpPr>
+            <p:cNvPr id="38" name="文本框 37"/>
+            <p:cNvSpPr txBox="1"/>
+            <p:nvPr/>
+          </p:nvSpPr>
+          <p:spPr>
+            <a:xfrm>
+              <a:off x="2159994" y="6097561"/>
+              <a:ext cx="2739391" cy="584775"/>
+            </a:xfrm>
+            <a:prstGeom prst="rect">
+              <a:avLst/>
+            </a:prstGeom>
+            <a:noFill/>
+            <a:ln>
+              <a:solidFill>
+                <a:schemeClr val="tx1"/>
+              </a:solidFill>
+            </a:ln>
+          </p:spPr>
+          <p:txBody>
+            <a:bodyPr wrap="square" rtlCol="0">
+              <a:spAutoFit/>
+            </a:bodyPr>
+            <a:lstStyle/>
+            <a:p>
+              <a:pPr algn="ctr"/>
+              <a:r>
+                <a:rPr lang="zh-CN" altLang="en-US" sz="1600" dirty="0" smtClean="0">
+                  <a:latin typeface="宋体" panose="02010600030101010101" pitchFamily="2" charset="-122"/>
+                  <a:ea typeface="宋体" panose="02010600030101010101" pitchFamily="2" charset="-122"/>
+                </a:rPr>
+                <a:t>基于深度调压网络的连续动作设备电压控制</a:t>
+              </a:r>
+              <a:endParaRPr lang="en-US" altLang="zh-CN" sz="1600" dirty="0" smtClean="0">
+                <a:solidFill>
+                  <a:srgbClr val="FF0000"/>
+                </a:solidFill>
+                <a:latin typeface="宋体" panose="02010600030101010101" pitchFamily="2" charset="-122"/>
+                <a:ea typeface="宋体" panose="02010600030101010101" pitchFamily="2" charset="-122"/>
+              </a:endParaRPr>
+            </a:p>
+          </p:txBody>
+        </p:sp>
+        <p:sp>
+          <p:nvSpPr>
+            <p:cNvPr id="39" name="文本框 38"/>
+            <p:cNvSpPr txBox="1"/>
+            <p:nvPr/>
+          </p:nvSpPr>
+          <p:spPr>
+            <a:xfrm>
+              <a:off x="5399042" y="5781587"/>
+              <a:ext cx="2739391" cy="584775"/>
+            </a:xfrm>
+            <a:prstGeom prst="rect">
+              <a:avLst/>
+            </a:prstGeom>
+            <a:noFill/>
+            <a:ln>
+              <a:solidFill>
+                <a:schemeClr val="tx1"/>
+              </a:solidFill>
+            </a:ln>
+          </p:spPr>
+          <p:txBody>
+            <a:bodyPr wrap="square" rtlCol="0">
+              <a:spAutoFit/>
+            </a:bodyPr>
+            <a:lstStyle/>
+            <a:p>
+              <a:pPr algn="ctr"/>
+              <a:r>
+                <a:rPr lang="zh-CN" altLang="en-US" sz="1600" dirty="0" smtClean="0">
+                  <a:latin typeface="宋体" panose="02010600030101010101" pitchFamily="2" charset="-122"/>
+                  <a:ea typeface="宋体" panose="02010600030101010101" pitchFamily="2" charset="-122"/>
+                </a:rPr>
+                <a:t>基于深度强化学习的离散动作设备无功优化</a:t>
+              </a:r>
+              <a:endParaRPr lang="en-US" altLang="zh-CN" sz="1600" dirty="0" smtClean="0">
+                <a:latin typeface="宋体" panose="02010600030101010101" pitchFamily="2" charset="-122"/>
+                <a:ea typeface="宋体" panose="02010600030101010101" pitchFamily="2" charset="-122"/>
+              </a:endParaRPr>
+            </a:p>
+          </p:txBody>
+        </p:sp>
+      </p:grpSp>
+    </p:spTree>
+    <p:extLst>
+      <p:ext uri="{BB962C8B-B14F-4D97-AF65-F5344CB8AC3E}">
+        <p14:creationId xmlns:p14="http://schemas.microsoft.com/office/powerpoint/2010/main" val="2124347155"/>
+      </p:ext>
+    </p:extLst>
+  </p:cSld>
+  <p:clrMapOvr>
+    <a:masterClrMapping/>
+  </p:clrMapOvr>
+</p:sld>
+</file>
+
+<file path=ppt/slides/slide9.xml><?xml version="1.0" encoding="utf-8"?>
+<p:sld xmlns:a="http://schemas.openxmlformats.org/drawingml/2006/main" xmlns:r="http://schemas.openxmlformats.org/officeDocument/2006/relationships" xmlns:p="http://schemas.openxmlformats.org/presentationml/2006/main">
+  <p:cSld>
+    <p:spTree>
+      <p:nvGrpSpPr>
+        <p:cNvPr id="1" name=""/>
+        <p:cNvGrpSpPr/>
+        <p:nvPr/>
+      </p:nvGrpSpPr>
+      <p:grpSpPr>
+        <a:xfrm>
+          <a:off x="0" y="0"/>
+          <a:ext cx="0" cy="0"/>
+          <a:chOff x="0" y="0"/>
+          <a:chExt cx="0" cy="0"/>
+        </a:xfrm>
+      </p:grpSpPr>
+      <p:pic>
+        <p:nvPicPr>
+          <p:cNvPr id="12" name="图片 11"/>
+          <p:cNvPicPr>
+            <a:picLocks noChangeAspect="1"/>
+          </p:cNvPicPr>
+          <p:nvPr/>
+        </p:nvPicPr>
+        <p:blipFill>
+          <a:blip r:embed="rId2"/>
+          <a:stretch>
+            <a:fillRect/>
+          </a:stretch>
+        </p:blipFill>
+        <p:spPr>
+          <a:xfrm>
+            <a:off x="1619474" y="995803"/>
+            <a:ext cx="6179051" cy="4634289"/>
+          </a:xfrm>
+          <a:prstGeom prst="rect">
+            <a:avLst/>
+          </a:prstGeom>
+        </p:spPr>
+      </p:pic>
+    </p:spTree>
+    <p:extLst>
+      <p:ext uri="{BB962C8B-B14F-4D97-AF65-F5344CB8AC3E}">
+        <p14:creationId xmlns:p14="http://schemas.microsoft.com/office/powerpoint/2010/main" val="1215731034"/>
       </p:ext>
     </p:extLst>
   </p:cSld>

</xml_diff>

<commit_message>
daily commit 0408, finish c5, start to c1
</commit_message>
<xml_diff>
--- a/figures/演示文稿1.pptx
+++ b/figures/演示文稿1.pptx
@@ -12,8 +12,9 @@
     <p:sldId id="259" r:id="rId6"/>
     <p:sldId id="261" r:id="rId7"/>
     <p:sldId id="262" r:id="rId8"/>
-    <p:sldId id="263" r:id="rId9"/>
-    <p:sldId id="264" r:id="rId10"/>
+    <p:sldId id="265" r:id="rId9"/>
+    <p:sldId id="263" r:id="rId10"/>
+    <p:sldId id="264" r:id="rId11"/>
   </p:sldIdLst>
   <p:sldSz cx="9144000" cy="6858000" type="screen4x3"/>
   <p:notesSz cx="6858000" cy="9144000"/>
@@ -251,7 +252,7 @@
           <a:p>
             <a:fld id="{850289C4-C9C2-47F7-B72C-4F7E3D61DF21}" type="datetimeFigureOut">
               <a:rPr lang="zh-CN" altLang="en-US" smtClean="0"/>
-              <a:t>2019/4/4</a:t>
+              <a:t>2019/4/8</a:t>
             </a:fld>
             <a:endParaRPr lang="zh-CN" altLang="en-US"/>
           </a:p>
@@ -421,7 +422,7 @@
           <a:p>
             <a:fld id="{850289C4-C9C2-47F7-B72C-4F7E3D61DF21}" type="datetimeFigureOut">
               <a:rPr lang="zh-CN" altLang="en-US" smtClean="0"/>
-              <a:t>2019/4/4</a:t>
+              <a:t>2019/4/8</a:t>
             </a:fld>
             <a:endParaRPr lang="zh-CN" altLang="en-US"/>
           </a:p>
@@ -601,7 +602,7 @@
           <a:p>
             <a:fld id="{850289C4-C9C2-47F7-B72C-4F7E3D61DF21}" type="datetimeFigureOut">
               <a:rPr lang="zh-CN" altLang="en-US" smtClean="0"/>
-              <a:t>2019/4/4</a:t>
+              <a:t>2019/4/8</a:t>
             </a:fld>
             <a:endParaRPr lang="zh-CN" altLang="en-US"/>
           </a:p>
@@ -771,7 +772,7 @@
           <a:p>
             <a:fld id="{850289C4-C9C2-47F7-B72C-4F7E3D61DF21}" type="datetimeFigureOut">
               <a:rPr lang="zh-CN" altLang="en-US" smtClean="0"/>
-              <a:t>2019/4/4</a:t>
+              <a:t>2019/4/8</a:t>
             </a:fld>
             <a:endParaRPr lang="zh-CN" altLang="en-US"/>
           </a:p>
@@ -1015,7 +1016,7 @@
           <a:p>
             <a:fld id="{850289C4-C9C2-47F7-B72C-4F7E3D61DF21}" type="datetimeFigureOut">
               <a:rPr lang="zh-CN" altLang="en-US" smtClean="0"/>
-              <a:t>2019/4/4</a:t>
+              <a:t>2019/4/8</a:t>
             </a:fld>
             <a:endParaRPr lang="zh-CN" altLang="en-US"/>
           </a:p>
@@ -1247,7 +1248,7 @@
           <a:p>
             <a:fld id="{850289C4-C9C2-47F7-B72C-4F7E3D61DF21}" type="datetimeFigureOut">
               <a:rPr lang="zh-CN" altLang="en-US" smtClean="0"/>
-              <a:t>2019/4/4</a:t>
+              <a:t>2019/4/8</a:t>
             </a:fld>
             <a:endParaRPr lang="zh-CN" altLang="en-US"/>
           </a:p>
@@ -1614,7 +1615,7 @@
           <a:p>
             <a:fld id="{850289C4-C9C2-47F7-B72C-4F7E3D61DF21}" type="datetimeFigureOut">
               <a:rPr lang="zh-CN" altLang="en-US" smtClean="0"/>
-              <a:t>2019/4/4</a:t>
+              <a:t>2019/4/8</a:t>
             </a:fld>
             <a:endParaRPr lang="zh-CN" altLang="en-US"/>
           </a:p>
@@ -1732,7 +1733,7 @@
           <a:p>
             <a:fld id="{850289C4-C9C2-47F7-B72C-4F7E3D61DF21}" type="datetimeFigureOut">
               <a:rPr lang="zh-CN" altLang="en-US" smtClean="0"/>
-              <a:t>2019/4/4</a:t>
+              <a:t>2019/4/8</a:t>
             </a:fld>
             <a:endParaRPr lang="zh-CN" altLang="en-US"/>
           </a:p>
@@ -1827,7 +1828,7 @@
           <a:p>
             <a:fld id="{850289C4-C9C2-47F7-B72C-4F7E3D61DF21}" type="datetimeFigureOut">
               <a:rPr lang="zh-CN" altLang="en-US" smtClean="0"/>
-              <a:t>2019/4/4</a:t>
+              <a:t>2019/4/8</a:t>
             </a:fld>
             <a:endParaRPr lang="zh-CN" altLang="en-US"/>
           </a:p>
@@ -2104,7 +2105,7 @@
           <a:p>
             <a:fld id="{850289C4-C9C2-47F7-B72C-4F7E3D61DF21}" type="datetimeFigureOut">
               <a:rPr lang="zh-CN" altLang="en-US" smtClean="0"/>
-              <a:t>2019/4/4</a:t>
+              <a:t>2019/4/8</a:t>
             </a:fld>
             <a:endParaRPr lang="zh-CN" altLang="en-US"/>
           </a:p>
@@ -2361,7 +2362,7 @@
           <a:p>
             <a:fld id="{850289C4-C9C2-47F7-B72C-4F7E3D61DF21}" type="datetimeFigureOut">
               <a:rPr lang="zh-CN" altLang="en-US" smtClean="0"/>
-              <a:t>2019/4/4</a:t>
+              <a:t>2019/4/8</a:t>
             </a:fld>
             <a:endParaRPr lang="zh-CN" altLang="en-US"/>
           </a:p>
@@ -2574,7 +2575,7 @@
           <a:p>
             <a:fld id="{850289C4-C9C2-47F7-B72C-4F7E3D61DF21}" type="datetimeFigureOut">
               <a:rPr lang="zh-CN" altLang="en-US" smtClean="0"/>
-              <a:t>2019/4/4</a:t>
+              <a:t>2019/4/8</a:t>
             </a:fld>
             <a:endParaRPr lang="zh-CN" altLang="en-US"/>
           </a:p>
@@ -5191,6 +5192,60 @@
 </p:sld>
 </file>
 
+<file path=ppt/slides/slide10.xml><?xml version="1.0" encoding="utf-8"?>
+<p:sld xmlns:a="http://schemas.openxmlformats.org/drawingml/2006/main" xmlns:r="http://schemas.openxmlformats.org/officeDocument/2006/relationships" xmlns:p="http://schemas.openxmlformats.org/presentationml/2006/main">
+  <p:cSld>
+    <p:spTree>
+      <p:nvGrpSpPr>
+        <p:cNvPr id="1" name=""/>
+        <p:cNvGrpSpPr/>
+        <p:nvPr/>
+      </p:nvGrpSpPr>
+      <p:grpSpPr>
+        <a:xfrm>
+          <a:off x="0" y="0"/>
+          <a:ext cx="0" cy="0"/>
+          <a:chOff x="0" y="0"/>
+          <a:chExt cx="0" cy="0"/>
+        </a:xfrm>
+      </p:grpSpPr>
+      <p:pic>
+        <p:nvPicPr>
+          <p:cNvPr id="12" name="图片 11"/>
+          <p:cNvPicPr>
+            <a:picLocks noChangeAspect="1"/>
+          </p:cNvPicPr>
+          <p:nvPr/>
+        </p:nvPicPr>
+        <p:blipFill>
+          <a:blip r:embed="rId2"/>
+          <a:stretch>
+            <a:fillRect/>
+          </a:stretch>
+        </p:blipFill>
+        <p:spPr>
+          <a:xfrm>
+            <a:off x="1619474" y="995803"/>
+            <a:ext cx="6179051" cy="4634289"/>
+          </a:xfrm>
+          <a:prstGeom prst="rect">
+            <a:avLst/>
+          </a:prstGeom>
+        </p:spPr>
+      </p:pic>
+    </p:spTree>
+    <p:extLst>
+      <p:ext uri="{BB962C8B-B14F-4D97-AF65-F5344CB8AC3E}">
+        <p14:creationId xmlns:p14="http://schemas.microsoft.com/office/powerpoint/2010/main" val="1215731034"/>
+      </p:ext>
+    </p:extLst>
+  </p:cSld>
+  <p:clrMapOvr>
+    <a:masterClrMapping/>
+  </p:clrMapOvr>
+</p:sld>
+</file>
+
 <file path=ppt/slides/slide2.xml><?xml version="1.0" encoding="utf-8"?>
 <p:sld xmlns:a="http://schemas.openxmlformats.org/drawingml/2006/main" xmlns:r="http://schemas.openxmlformats.org/officeDocument/2006/relationships" xmlns:p="http://schemas.openxmlformats.org/presentationml/2006/main">
   <p:cSld>
@@ -11114,7 +11169,7 @@
             <a:graphicData uri="http://schemas.openxmlformats.org/presentationml/2006/ole">
               <mc:AlternateContent xmlns:mc="http://schemas.openxmlformats.org/markup-compatibility/2006">
                 <mc:Choice xmlns:v="urn:schemas-microsoft-com:vml" Requires="v">
-                  <p:oleObj spid="_x0000_s1063" name="Equation" r:id="rId12" imgW="330120" imgH="228600" progId="Equation.DSMT4">
+                  <p:oleObj spid="_x0000_s1071" name="Equation" r:id="rId12" imgW="330120" imgH="228600" progId="Equation.DSMT4">
                     <p:embed/>
                   </p:oleObj>
                 </mc:Choice>
@@ -11171,7 +11226,7 @@
             <a:graphicData uri="http://schemas.openxmlformats.org/presentationml/2006/ole">
               <mc:AlternateContent xmlns:mc="http://schemas.openxmlformats.org/markup-compatibility/2006">
                 <mc:Choice xmlns:v="urn:schemas-microsoft-com:vml" Requires="v">
-                  <p:oleObj spid="_x0000_s1064" name="Equation" r:id="rId14" imgW="139680" imgH="228600" progId="Equation.DSMT4">
+                  <p:oleObj spid="_x0000_s1072" name="Equation" r:id="rId14" imgW="139680" imgH="228600" progId="Equation.DSMT4">
                     <p:embed/>
                   </p:oleObj>
                 </mc:Choice>
@@ -11391,7 +11446,7 @@
             <a:graphicData uri="http://schemas.openxmlformats.org/presentationml/2006/ole">
               <mc:AlternateContent xmlns:mc="http://schemas.openxmlformats.org/markup-compatibility/2006">
                 <mc:Choice xmlns:v="urn:schemas-microsoft-com:vml" Requires="v">
-                  <p:oleObj spid="_x0000_s1065" name="Equation" r:id="rId16" imgW="228600" imgH="228600" progId="Equation.DSMT4">
+                  <p:oleObj spid="_x0000_s1073" name="Equation" r:id="rId16" imgW="228600" imgH="228600" progId="Equation.DSMT4">
                     <p:embed/>
                   </p:oleObj>
                 </mc:Choice>
@@ -11453,7 +11508,7 @@
             <a:graphicData uri="http://schemas.openxmlformats.org/presentationml/2006/ole">
               <mc:AlternateContent xmlns:mc="http://schemas.openxmlformats.org/markup-compatibility/2006">
                 <mc:Choice xmlns:v="urn:schemas-microsoft-com:vml" Requires="v">
-                  <p:oleObj spid="_x0000_s1066" name="Equation" r:id="rId18" imgW="114120" imgH="228600" progId="Equation.DSMT4">
+                  <p:oleObj spid="_x0000_s1074" name="Equation" r:id="rId18" imgW="114120" imgH="228600" progId="Equation.DSMT4">
                     <p:embed/>
                   </p:oleObj>
                 </mc:Choice>
@@ -11865,7 +11920,7 @@
             <a:graphicData uri="http://schemas.openxmlformats.org/presentationml/2006/ole">
               <mc:AlternateContent xmlns:mc="http://schemas.openxmlformats.org/markup-compatibility/2006">
                 <mc:Choice xmlns:v="urn:schemas-microsoft-com:vml" Requires="v">
-                  <p:oleObj spid="_x0000_s2141" name="Equation" r:id="rId3" imgW="139680" imgH="228600" progId="Equation.DSMT4">
+                  <p:oleObj spid="_x0000_s2167" name="Equation" r:id="rId3" imgW="139680" imgH="228600" progId="Equation.DSMT4">
                     <p:embed/>
                   </p:oleObj>
                 </mc:Choice>
@@ -11922,7 +11977,7 @@
             <a:graphicData uri="http://schemas.openxmlformats.org/presentationml/2006/ole">
               <mc:AlternateContent xmlns:mc="http://schemas.openxmlformats.org/markup-compatibility/2006">
                 <mc:Choice xmlns:v="urn:schemas-microsoft-com:vml" Requires="v">
-                  <p:oleObj spid="_x0000_s2142" name="Equation" r:id="rId5" imgW="152280" imgH="228600" progId="Equation.DSMT4">
+                  <p:oleObj spid="_x0000_s2168" name="Equation" r:id="rId5" imgW="152280" imgH="228600" progId="Equation.DSMT4">
                     <p:embed/>
                   </p:oleObj>
                 </mc:Choice>
@@ -11979,7 +12034,7 @@
             <a:graphicData uri="http://schemas.openxmlformats.org/presentationml/2006/ole">
               <mc:AlternateContent xmlns:mc="http://schemas.openxmlformats.org/markup-compatibility/2006">
                 <mc:Choice xmlns:v="urn:schemas-microsoft-com:vml" Requires="v">
-                  <p:oleObj spid="_x0000_s2143" name="Equation" r:id="rId7" imgW="368280" imgH="228600" progId="Equation.DSMT4">
+                  <p:oleObj spid="_x0000_s2169" name="Equation" r:id="rId7" imgW="368280" imgH="228600" progId="Equation.DSMT4">
                     <p:embed/>
                   </p:oleObj>
                 </mc:Choice>
@@ -12036,7 +12091,7 @@
             <a:graphicData uri="http://schemas.openxmlformats.org/presentationml/2006/ole">
               <mc:AlternateContent xmlns:mc="http://schemas.openxmlformats.org/markup-compatibility/2006">
                 <mc:Choice xmlns:v="urn:schemas-microsoft-com:vml" Requires="v">
-                  <p:oleObj spid="_x0000_s2144" name="Equation" r:id="rId9" imgW="266400" imgH="1206360" progId="Equation.DSMT4">
+                  <p:oleObj spid="_x0000_s2170" name="Equation" r:id="rId9" imgW="266400" imgH="1206360" progId="Equation.DSMT4">
                     <p:embed/>
                   </p:oleObj>
                 </mc:Choice>
@@ -12126,7 +12181,7 @@
             <a:graphicData uri="http://schemas.openxmlformats.org/presentationml/2006/ole">
               <mc:AlternateContent xmlns:mc="http://schemas.openxmlformats.org/markup-compatibility/2006">
                 <mc:Choice xmlns:v="urn:schemas-microsoft-com:vml" Requires="v">
-                  <p:oleObj spid="_x0000_s2145" name="Equation" r:id="rId11" imgW="139680" imgH="228600" progId="Equation.DSMT4">
+                  <p:oleObj spid="_x0000_s2171" name="Equation" r:id="rId11" imgW="139680" imgH="228600" progId="Equation.DSMT4">
                     <p:embed/>
                   </p:oleObj>
                 </mc:Choice>
@@ -12183,7 +12238,7 @@
             <a:graphicData uri="http://schemas.openxmlformats.org/presentationml/2006/ole">
               <mc:AlternateContent xmlns:mc="http://schemas.openxmlformats.org/markup-compatibility/2006">
                 <mc:Choice xmlns:v="urn:schemas-microsoft-com:vml" Requires="v">
-                  <p:oleObj spid="_x0000_s2146" name="Equation" r:id="rId13" imgW="139680" imgH="228600" progId="Equation.DSMT4">
+                  <p:oleObj spid="_x0000_s2172" name="Equation" r:id="rId13" imgW="139680" imgH="228600" progId="Equation.DSMT4">
                     <p:embed/>
                   </p:oleObj>
                 </mc:Choice>
@@ -12273,7 +12328,7 @@
             <a:graphicData uri="http://schemas.openxmlformats.org/presentationml/2006/ole">
               <mc:AlternateContent xmlns:mc="http://schemas.openxmlformats.org/markup-compatibility/2006">
                 <mc:Choice xmlns:v="urn:schemas-microsoft-com:vml" Requires="v">
-                  <p:oleObj spid="_x0000_s2147" name="Equation" r:id="rId15" imgW="164880" imgH="228600" progId="Equation.DSMT4">
+                  <p:oleObj spid="_x0000_s2173" name="Equation" r:id="rId15" imgW="164880" imgH="228600" progId="Equation.DSMT4">
                     <p:embed/>
                   </p:oleObj>
                 </mc:Choice>
@@ -12330,7 +12385,7 @@
             <a:graphicData uri="http://schemas.openxmlformats.org/presentationml/2006/ole">
               <mc:AlternateContent xmlns:mc="http://schemas.openxmlformats.org/markup-compatibility/2006">
                 <mc:Choice xmlns:v="urn:schemas-microsoft-com:vml" Requires="v">
-                  <p:oleObj spid="_x0000_s2148" name="Equation" r:id="rId17" imgW="126720" imgH="228600" progId="Equation.DSMT4">
+                  <p:oleObj spid="_x0000_s2174" name="Equation" r:id="rId17" imgW="126720" imgH="228600" progId="Equation.DSMT4">
                     <p:embed/>
                   </p:oleObj>
                 </mc:Choice>
@@ -12420,7 +12475,7 @@
             <a:graphicData uri="http://schemas.openxmlformats.org/presentationml/2006/ole">
               <mc:AlternateContent xmlns:mc="http://schemas.openxmlformats.org/markup-compatibility/2006">
                 <mc:Choice xmlns:v="urn:schemas-microsoft-com:vml" Requires="v">
-                  <p:oleObj spid="_x0000_s2149" name="Equation" r:id="rId19" imgW="279360" imgH="228600" progId="Equation.DSMT4">
+                  <p:oleObj spid="_x0000_s2175" name="Equation" r:id="rId19" imgW="279360" imgH="228600" progId="Equation.DSMT4">
                     <p:embed/>
                   </p:oleObj>
                 </mc:Choice>
@@ -12477,7 +12532,7 @@
             <a:graphicData uri="http://schemas.openxmlformats.org/presentationml/2006/ole">
               <mc:AlternateContent xmlns:mc="http://schemas.openxmlformats.org/markup-compatibility/2006">
                 <mc:Choice xmlns:v="urn:schemas-microsoft-com:vml" Requires="v">
-                  <p:oleObj spid="_x0000_s2150" name="Equation" r:id="rId21" imgW="253800" imgH="228600" progId="Equation.DSMT4">
+                  <p:oleObj spid="_x0000_s2176" name="Equation" r:id="rId21" imgW="253800" imgH="228600" progId="Equation.DSMT4">
                     <p:embed/>
                   </p:oleObj>
                 </mc:Choice>
@@ -12564,7 +12619,7 @@
             <a:graphicData uri="http://schemas.openxmlformats.org/presentationml/2006/ole">
               <mc:AlternateContent xmlns:mc="http://schemas.openxmlformats.org/markup-compatibility/2006">
                 <mc:Choice xmlns:v="urn:schemas-microsoft-com:vml" Requires="v">
-                  <p:oleObj spid="_x0000_s2151" name="Equation" r:id="rId23" imgW="253800" imgH="1206360" progId="Equation.DSMT4">
+                  <p:oleObj spid="_x0000_s2177" name="Equation" r:id="rId23" imgW="253800" imgH="1206360" progId="Equation.DSMT4">
                     <p:embed/>
                   </p:oleObj>
                 </mc:Choice>
@@ -12621,7 +12676,7 @@
             <a:graphicData uri="http://schemas.openxmlformats.org/presentationml/2006/ole">
               <mc:AlternateContent xmlns:mc="http://schemas.openxmlformats.org/markup-compatibility/2006">
                 <mc:Choice xmlns:v="urn:schemas-microsoft-com:vml" Requires="v">
-                  <p:oleObj spid="_x0000_s2152" name="Equation" r:id="rId25" imgW="266400" imgH="1206360" progId="Equation.DSMT4">
+                  <p:oleObj spid="_x0000_s2178" name="Equation" r:id="rId25" imgW="266400" imgH="1206360" progId="Equation.DSMT4">
                     <p:embed/>
                   </p:oleObj>
                 </mc:Choice>
@@ -12678,7 +12733,7 @@
             <a:graphicData uri="http://schemas.openxmlformats.org/presentationml/2006/ole">
               <mc:AlternateContent xmlns:mc="http://schemas.openxmlformats.org/markup-compatibility/2006">
                 <mc:Choice xmlns:v="urn:schemas-microsoft-com:vml" Requires="v">
-                  <p:oleObj spid="_x0000_s2153" name="Equation" r:id="rId27" imgW="291960" imgH="1206360" progId="Equation.DSMT4">
+                  <p:oleObj spid="_x0000_s2179" name="Equation" r:id="rId27" imgW="291960" imgH="1206360" progId="Equation.DSMT4">
                     <p:embed/>
                   </p:oleObj>
                 </mc:Choice>
@@ -12746,6 +12801,497 @@
       </p:grpSpPr>
       <p:grpSp>
         <p:nvGrpSpPr>
+          <p:cNvPr id="2" name="组合 1"/>
+          <p:cNvGrpSpPr/>
+          <p:nvPr/>
+        </p:nvGrpSpPr>
+        <p:grpSpPr>
+          <a:xfrm>
+            <a:off x="1515291" y="803526"/>
+            <a:ext cx="3829141" cy="2505360"/>
+            <a:chOff x="1515291" y="803526"/>
+            <a:chExt cx="3829141" cy="2505360"/>
+          </a:xfrm>
+        </p:grpSpPr>
+        <p:sp>
+          <p:nvSpPr>
+            <p:cNvPr id="5" name="椭圆 4"/>
+            <p:cNvSpPr/>
+            <p:nvPr/>
+          </p:nvSpPr>
+          <p:spPr>
+            <a:xfrm>
+              <a:off x="1515291" y="1299411"/>
+              <a:ext cx="1130511" cy="1888957"/>
+            </a:xfrm>
+            <a:prstGeom prst="ellipse">
+              <a:avLst/>
+            </a:prstGeom>
+            <a:solidFill>
+              <a:schemeClr val="bg1"/>
+            </a:solidFill>
+          </p:spPr>
+          <p:style>
+            <a:lnRef idx="2">
+              <a:schemeClr val="accent1">
+                <a:shade val="50000"/>
+              </a:schemeClr>
+            </a:lnRef>
+            <a:fillRef idx="1">
+              <a:schemeClr val="accent1"/>
+            </a:fillRef>
+            <a:effectRef idx="0">
+              <a:schemeClr val="accent1"/>
+            </a:effectRef>
+            <a:fontRef idx="minor">
+              <a:schemeClr val="lt1"/>
+            </a:fontRef>
+          </p:style>
+          <p:txBody>
+            <a:bodyPr rtlCol="0" anchor="ctr"/>
+            <a:lstStyle/>
+            <a:p>
+              <a:pPr algn="ctr"/>
+              <a:r>
+                <a:rPr lang="en-US" altLang="zh-CN" dirty="0" smtClean="0">
+                  <a:solidFill>
+                    <a:schemeClr val="tx1"/>
+                  </a:solidFill>
+                </a:rPr>
+                <a:t>Agent</a:t>
+              </a:r>
+              <a:endParaRPr lang="zh-CN" altLang="en-US" dirty="0">
+                <a:solidFill>
+                  <a:schemeClr val="tx1"/>
+                </a:solidFill>
+              </a:endParaRPr>
+            </a:p>
+          </p:txBody>
+        </p:sp>
+        <p:sp>
+          <p:nvSpPr>
+            <p:cNvPr id="55" name="椭圆 54"/>
+            <p:cNvSpPr/>
+            <p:nvPr/>
+          </p:nvSpPr>
+          <p:spPr>
+            <a:xfrm>
+              <a:off x="4213920" y="1299411"/>
+              <a:ext cx="1130512" cy="1888957"/>
+            </a:xfrm>
+            <a:prstGeom prst="ellipse">
+              <a:avLst/>
+            </a:prstGeom>
+            <a:solidFill>
+              <a:schemeClr val="bg1"/>
+            </a:solidFill>
+            <a:ln>
+              <a:solidFill>
+                <a:srgbClr val="FF0000"/>
+              </a:solidFill>
+            </a:ln>
+          </p:spPr>
+          <p:style>
+            <a:lnRef idx="2">
+              <a:schemeClr val="accent1">
+                <a:shade val="50000"/>
+              </a:schemeClr>
+            </a:lnRef>
+            <a:fillRef idx="1">
+              <a:schemeClr val="accent1"/>
+            </a:fillRef>
+            <a:effectRef idx="0">
+              <a:schemeClr val="accent1"/>
+            </a:effectRef>
+            <a:fontRef idx="minor">
+              <a:schemeClr val="lt1"/>
+            </a:fontRef>
+          </p:style>
+          <p:txBody>
+            <a:bodyPr rtlCol="0" anchor="ctr"/>
+            <a:lstStyle/>
+            <a:p>
+              <a:pPr algn="ctr"/>
+              <a:r>
+                <a:rPr lang="en-US" altLang="zh-CN" dirty="0" err="1" smtClean="0">
+                  <a:solidFill>
+                    <a:schemeClr val="tx1"/>
+                  </a:solidFill>
+                </a:rPr>
+                <a:t>Env</a:t>
+              </a:r>
+              <a:endParaRPr lang="zh-CN" altLang="en-US" dirty="0">
+                <a:solidFill>
+                  <a:schemeClr val="tx1"/>
+                </a:solidFill>
+              </a:endParaRPr>
+            </a:p>
+          </p:txBody>
+        </p:sp>
+        <p:sp>
+          <p:nvSpPr>
+            <p:cNvPr id="6" name="任意多边形 5"/>
+            <p:cNvSpPr/>
+            <p:nvPr/>
+          </p:nvSpPr>
+          <p:spPr>
+            <a:xfrm>
+              <a:off x="2557572" y="1287358"/>
+              <a:ext cx="1744579" cy="204558"/>
+            </a:xfrm>
+            <a:custGeom>
+              <a:avLst/>
+              <a:gdLst>
+                <a:gd name="connsiteX0" fmla="*/ 0 w 1744579"/>
+                <a:gd name="connsiteY0" fmla="*/ 204558 h 204558"/>
+                <a:gd name="connsiteX1" fmla="*/ 745958 w 1744579"/>
+                <a:gd name="connsiteY1" fmla="*/ 21 h 204558"/>
+                <a:gd name="connsiteX2" fmla="*/ 1744579 w 1744579"/>
+                <a:gd name="connsiteY2" fmla="*/ 192526 h 204558"/>
+              </a:gdLst>
+              <a:ahLst/>
+              <a:cxnLst>
+                <a:cxn ang="0">
+                  <a:pos x="connsiteX0" y="connsiteY0"/>
+                </a:cxn>
+                <a:cxn ang="0">
+                  <a:pos x="connsiteX1" y="connsiteY1"/>
+                </a:cxn>
+                <a:cxn ang="0">
+                  <a:pos x="connsiteX2" y="connsiteY2"/>
+                </a:cxn>
+              </a:cxnLst>
+              <a:rect l="l" t="t" r="r" b="b"/>
+              <a:pathLst>
+                <a:path w="1744579" h="204558">
+                  <a:moveTo>
+                    <a:pt x="0" y="204558"/>
+                  </a:moveTo>
+                  <a:cubicBezTo>
+                    <a:pt x="227597" y="103292"/>
+                    <a:pt x="455195" y="2026"/>
+                    <a:pt x="745958" y="21"/>
+                  </a:cubicBezTo>
+                  <a:cubicBezTo>
+                    <a:pt x="1036721" y="-1984"/>
+                    <a:pt x="1570121" y="136379"/>
+                    <a:pt x="1744579" y="192526"/>
+                  </a:cubicBezTo>
+                </a:path>
+              </a:pathLst>
+            </a:custGeom>
+            <a:ln>
+              <a:headEnd type="none" w="med" len="med"/>
+              <a:tailEnd type="arrow" w="med" len="med"/>
+            </a:ln>
+          </p:spPr>
+          <p:style>
+            <a:lnRef idx="1">
+              <a:schemeClr val="dk1"/>
+            </a:lnRef>
+            <a:fillRef idx="0">
+              <a:schemeClr val="dk1"/>
+            </a:fillRef>
+            <a:effectRef idx="0">
+              <a:schemeClr val="dk1"/>
+            </a:effectRef>
+            <a:fontRef idx="minor">
+              <a:schemeClr val="tx1"/>
+            </a:fontRef>
+          </p:style>
+          <p:txBody>
+            <a:bodyPr rtlCol="0" anchor="ctr"/>
+            <a:lstStyle/>
+            <a:p>
+              <a:pPr algn="ctr"/>
+              <a:endParaRPr lang="zh-CN" altLang="en-US"/>
+            </a:p>
+          </p:txBody>
+        </p:sp>
+        <p:sp>
+          <p:nvSpPr>
+            <p:cNvPr id="7" name="任意多边形 6"/>
+            <p:cNvSpPr/>
+            <p:nvPr/>
+          </p:nvSpPr>
+          <p:spPr>
+            <a:xfrm>
+              <a:off x="2557572" y="3019926"/>
+              <a:ext cx="1792705" cy="288960"/>
+            </a:xfrm>
+            <a:custGeom>
+              <a:avLst/>
+              <a:gdLst>
+                <a:gd name="connsiteX0" fmla="*/ 1792705 w 1792705"/>
+                <a:gd name="connsiteY0" fmla="*/ 36095 h 288960"/>
+                <a:gd name="connsiteX1" fmla="*/ 974558 w 1792705"/>
+                <a:gd name="connsiteY1" fmla="*/ 288758 h 288960"/>
+                <a:gd name="connsiteX2" fmla="*/ 0 w 1792705"/>
+                <a:gd name="connsiteY2" fmla="*/ 0 h 288960"/>
+              </a:gdLst>
+              <a:ahLst/>
+              <a:cxnLst>
+                <a:cxn ang="0">
+                  <a:pos x="connsiteX0" y="connsiteY0"/>
+                </a:cxn>
+                <a:cxn ang="0">
+                  <a:pos x="connsiteX1" y="connsiteY1"/>
+                </a:cxn>
+                <a:cxn ang="0">
+                  <a:pos x="connsiteX2" y="connsiteY2"/>
+                </a:cxn>
+              </a:cxnLst>
+              <a:rect l="l" t="t" r="r" b="b"/>
+              <a:pathLst>
+                <a:path w="1792705" h="288960">
+                  <a:moveTo>
+                    <a:pt x="1792705" y="36095"/>
+                  </a:moveTo>
+                  <a:cubicBezTo>
+                    <a:pt x="1533023" y="165434"/>
+                    <a:pt x="1273342" y="294774"/>
+                    <a:pt x="974558" y="288758"/>
+                  </a:cubicBezTo>
+                  <a:cubicBezTo>
+                    <a:pt x="675774" y="282742"/>
+                    <a:pt x="120316" y="78205"/>
+                    <a:pt x="0" y="0"/>
+                  </a:cubicBezTo>
+                </a:path>
+              </a:pathLst>
+            </a:custGeom>
+            <a:ln>
+              <a:headEnd type="none" w="med" len="med"/>
+              <a:tailEnd type="arrow" w="med" len="med"/>
+            </a:ln>
+          </p:spPr>
+          <p:style>
+            <a:lnRef idx="1">
+              <a:schemeClr val="dk1"/>
+            </a:lnRef>
+            <a:fillRef idx="0">
+              <a:schemeClr val="dk1"/>
+            </a:fillRef>
+            <a:effectRef idx="0">
+              <a:schemeClr val="dk1"/>
+            </a:effectRef>
+            <a:fontRef idx="minor">
+              <a:schemeClr val="tx1"/>
+            </a:fontRef>
+          </p:style>
+          <p:txBody>
+            <a:bodyPr rtlCol="0" anchor="ctr"/>
+            <a:lstStyle/>
+            <a:p>
+              <a:pPr algn="ctr"/>
+              <a:endParaRPr lang="zh-CN" altLang="en-US"/>
+            </a:p>
+          </p:txBody>
+        </p:sp>
+        <p:graphicFrame>
+          <p:nvGraphicFramePr>
+            <p:cNvPr id="8" name="对象 7"/>
+            <p:cNvGraphicFramePr>
+              <a:graphicFrameLocks noChangeAspect="1"/>
+            </p:cNvGraphicFramePr>
+            <p:nvPr>
+              <p:extLst>
+                <p:ext uri="{D42A27DB-BD31-4B8C-83A1-F6EECF244321}">
+                  <p14:modId xmlns:p14="http://schemas.microsoft.com/office/powerpoint/2010/main" val="3480688804"/>
+                </p:ext>
+              </p:extLst>
+            </p:nvPr>
+          </p:nvGraphicFramePr>
+          <p:xfrm>
+            <a:off x="2031451" y="2540418"/>
+            <a:ext cx="242000" cy="396000"/>
+          </p:xfrm>
+          <a:graphic>
+            <a:graphicData uri="http://schemas.openxmlformats.org/presentationml/2006/ole">
+              <mc:AlternateContent xmlns:mc="http://schemas.openxmlformats.org/markup-compatibility/2006">
+                <mc:Choice xmlns:v="urn:schemas-microsoft-com:vml" Requires="v">
+                  <p:oleObj spid="_x0000_s3077" name="Equation" r:id="rId3" imgW="139680" imgH="228600" progId="Equation.DSMT4">
+                    <p:embed/>
+                  </p:oleObj>
+                </mc:Choice>
+                <mc:Fallback>
+                  <p:oleObj name="Equation" r:id="rId3" imgW="139680" imgH="228600" progId="Equation.DSMT4">
+                    <p:embed/>
+                    <p:pic>
+                      <p:nvPicPr>
+                        <p:cNvPr id="8" name="对象 7"/>
+                        <p:cNvPicPr/>
+                        <p:nvPr/>
+                      </p:nvPicPr>
+                      <p:blipFill>
+                        <a:blip r:embed="rId4"/>
+                        <a:stretch>
+                          <a:fillRect/>
+                        </a:stretch>
+                      </p:blipFill>
+                      <p:spPr>
+                        <a:xfrm>
+                          <a:off x="2031451" y="2540418"/>
+                          <a:ext cx="242000" cy="396000"/>
+                        </a:xfrm>
+                        <a:prstGeom prst="rect">
+                          <a:avLst/>
+                        </a:prstGeom>
+                      </p:spPr>
+                    </p:pic>
+                  </p:oleObj>
+                </mc:Fallback>
+              </mc:AlternateContent>
+            </a:graphicData>
+          </a:graphic>
+        </p:graphicFrame>
+        <p:graphicFrame>
+          <p:nvGraphicFramePr>
+            <p:cNvPr id="61" name="对象 60"/>
+            <p:cNvGraphicFramePr>
+              <a:graphicFrameLocks noChangeAspect="1"/>
+            </p:cNvGraphicFramePr>
+            <p:nvPr>
+              <p:extLst>
+                <p:ext uri="{D42A27DB-BD31-4B8C-83A1-F6EECF244321}">
+                  <p14:modId xmlns:p14="http://schemas.microsoft.com/office/powerpoint/2010/main" val="1514830175"/>
+                </p:ext>
+              </p:extLst>
+            </p:nvPr>
+          </p:nvGraphicFramePr>
+          <p:xfrm>
+            <a:off x="3188811" y="803526"/>
+            <a:ext cx="265113" cy="396875"/>
+          </p:xfrm>
+          <a:graphic>
+            <a:graphicData uri="http://schemas.openxmlformats.org/presentationml/2006/ole">
+              <mc:AlternateContent xmlns:mc="http://schemas.openxmlformats.org/markup-compatibility/2006">
+                <mc:Choice xmlns:v="urn:schemas-microsoft-com:vml" Requires="v">
+                  <p:oleObj spid="_x0000_s3078" name="Equation" r:id="rId5" imgW="152280" imgH="228600" progId="Equation.DSMT4">
+                    <p:embed/>
+                  </p:oleObj>
+                </mc:Choice>
+                <mc:Fallback>
+                  <p:oleObj name="Equation" r:id="rId5" imgW="152280" imgH="228600" progId="Equation.DSMT4">
+                    <p:embed/>
+                    <p:pic>
+                      <p:nvPicPr>
+                        <p:cNvPr id="61" name="对象 60"/>
+                        <p:cNvPicPr/>
+                        <p:nvPr/>
+                      </p:nvPicPr>
+                      <p:blipFill>
+                        <a:blip r:embed="rId6"/>
+                        <a:stretch>
+                          <a:fillRect/>
+                        </a:stretch>
+                      </p:blipFill>
+                      <p:spPr>
+                        <a:xfrm>
+                          <a:off x="3188811" y="803526"/>
+                          <a:ext cx="265113" cy="396875"/>
+                        </a:xfrm>
+                        <a:prstGeom prst="rect">
+                          <a:avLst/>
+                        </a:prstGeom>
+                      </p:spPr>
+                    </p:pic>
+                  </p:oleObj>
+                </mc:Fallback>
+              </mc:AlternateContent>
+            </a:graphicData>
+          </a:graphic>
+        </p:graphicFrame>
+        <p:graphicFrame>
+          <p:nvGraphicFramePr>
+            <p:cNvPr id="62" name="对象 61"/>
+            <p:cNvGraphicFramePr>
+              <a:graphicFrameLocks noChangeAspect="1"/>
+            </p:cNvGraphicFramePr>
+            <p:nvPr>
+              <p:extLst>
+                <p:ext uri="{D42A27DB-BD31-4B8C-83A1-F6EECF244321}">
+                  <p14:modId xmlns:p14="http://schemas.microsoft.com/office/powerpoint/2010/main" val="858092817"/>
+                </p:ext>
+              </p:extLst>
+            </p:nvPr>
+          </p:nvGraphicFramePr>
+          <p:xfrm>
+            <a:off x="3109980" y="2848994"/>
+            <a:ext cx="639762" cy="396875"/>
+          </p:xfrm>
+          <a:graphic>
+            <a:graphicData uri="http://schemas.openxmlformats.org/presentationml/2006/ole">
+              <mc:AlternateContent xmlns:mc="http://schemas.openxmlformats.org/markup-compatibility/2006">
+                <mc:Choice xmlns:v="urn:schemas-microsoft-com:vml" Requires="v">
+                  <p:oleObj spid="_x0000_s3079" name="Equation" r:id="rId7" imgW="368280" imgH="228600" progId="Equation.DSMT4">
+                    <p:embed/>
+                  </p:oleObj>
+                </mc:Choice>
+                <mc:Fallback>
+                  <p:oleObj name="Equation" r:id="rId7" imgW="368280" imgH="228600" progId="Equation.DSMT4">
+                    <p:embed/>
+                    <p:pic>
+                      <p:nvPicPr>
+                        <p:cNvPr id="62" name="对象 61"/>
+                        <p:cNvPicPr/>
+                        <p:nvPr/>
+                      </p:nvPicPr>
+                      <p:blipFill>
+                        <a:blip r:embed="rId8"/>
+                        <a:stretch>
+                          <a:fillRect/>
+                        </a:stretch>
+                      </p:blipFill>
+                      <p:spPr>
+                        <a:xfrm>
+                          <a:off x="3109980" y="2848994"/>
+                          <a:ext cx="639762" cy="396875"/>
+                        </a:xfrm>
+                        <a:prstGeom prst="rect">
+                          <a:avLst/>
+                        </a:prstGeom>
+                      </p:spPr>
+                    </p:pic>
+                  </p:oleObj>
+                </mc:Fallback>
+              </mc:AlternateContent>
+            </a:graphicData>
+          </a:graphic>
+        </p:graphicFrame>
+      </p:grpSp>
+    </p:spTree>
+    <p:extLst>
+      <p:ext uri="{BB962C8B-B14F-4D97-AF65-F5344CB8AC3E}">
+        <p14:creationId xmlns:p14="http://schemas.microsoft.com/office/powerpoint/2010/main" val="3996947717"/>
+      </p:ext>
+    </p:extLst>
+  </p:cSld>
+  <p:clrMapOvr>
+    <a:masterClrMapping/>
+  </p:clrMapOvr>
+</p:sld>
+</file>
+
+<file path=ppt/slides/slide9.xml><?xml version="1.0" encoding="utf-8"?>
+<p:sld xmlns:a="http://schemas.openxmlformats.org/drawingml/2006/main" xmlns:r="http://schemas.openxmlformats.org/officeDocument/2006/relationships" xmlns:p="http://schemas.openxmlformats.org/presentationml/2006/main">
+  <p:cSld>
+    <p:spTree>
+      <p:nvGrpSpPr>
+        <p:cNvPr id="1" name=""/>
+        <p:cNvGrpSpPr/>
+        <p:nvPr/>
+      </p:nvGrpSpPr>
+      <p:grpSpPr>
+        <a:xfrm>
+          <a:off x="0" y="0"/>
+          <a:ext cx="0" cy="0"/>
+          <a:chOff x="0" y="0"/>
+          <a:chExt cx="0" cy="0"/>
+        </a:xfrm>
+      </p:grpSpPr>
+      <p:grpSp>
+        <p:nvGrpSpPr>
           <p:cNvPr id="40" name="组合 39"/>
           <p:cNvGrpSpPr/>
           <p:nvPr/>
@@ -14174,60 +14720,6 @@
     <p:extLst>
       <p:ext uri="{BB962C8B-B14F-4D97-AF65-F5344CB8AC3E}">
         <p14:creationId xmlns:p14="http://schemas.microsoft.com/office/powerpoint/2010/main" val="2124347155"/>
-      </p:ext>
-    </p:extLst>
-  </p:cSld>
-  <p:clrMapOvr>
-    <a:masterClrMapping/>
-  </p:clrMapOvr>
-</p:sld>
-</file>
-
-<file path=ppt/slides/slide9.xml><?xml version="1.0" encoding="utf-8"?>
-<p:sld xmlns:a="http://schemas.openxmlformats.org/drawingml/2006/main" xmlns:r="http://schemas.openxmlformats.org/officeDocument/2006/relationships" xmlns:p="http://schemas.openxmlformats.org/presentationml/2006/main">
-  <p:cSld>
-    <p:spTree>
-      <p:nvGrpSpPr>
-        <p:cNvPr id="1" name=""/>
-        <p:cNvGrpSpPr/>
-        <p:nvPr/>
-      </p:nvGrpSpPr>
-      <p:grpSpPr>
-        <a:xfrm>
-          <a:off x="0" y="0"/>
-          <a:ext cx="0" cy="0"/>
-          <a:chOff x="0" y="0"/>
-          <a:chExt cx="0" cy="0"/>
-        </a:xfrm>
-      </p:grpSpPr>
-      <p:pic>
-        <p:nvPicPr>
-          <p:cNvPr id="12" name="图片 11"/>
-          <p:cNvPicPr>
-            <a:picLocks noChangeAspect="1"/>
-          </p:cNvPicPr>
-          <p:nvPr/>
-        </p:nvPicPr>
-        <p:blipFill>
-          <a:blip r:embed="rId2"/>
-          <a:stretch>
-            <a:fillRect/>
-          </a:stretch>
-        </p:blipFill>
-        <p:spPr>
-          <a:xfrm>
-            <a:off x="1619474" y="995803"/>
-            <a:ext cx="6179051" cy="4634289"/>
-          </a:xfrm>
-          <a:prstGeom prst="rect">
-            <a:avLst/>
-          </a:prstGeom>
-        </p:spPr>
-      </p:pic>
-    </p:spTree>
-    <p:extLst>
-      <p:ext uri="{BB962C8B-B14F-4D97-AF65-F5344CB8AC3E}">
-        <p14:creationId xmlns:p14="http://schemas.microsoft.com/office/powerpoint/2010/main" val="1215731034"/>
       </p:ext>
     </p:extLst>
   </p:cSld>

</xml_diff>